<commit_message>
Trabajo final de diplomado v1
</commit_message>
<xml_diff>
--- a/Diplomado_DS_Proyecto_Final/Proyecto_final_Diplomado_DS_UNAM_v2.pptx
+++ b/Diplomado_DS_Proyecto_Final/Proyecto_final_Diplomado_DS_UNAM_v2.pptx
@@ -5,7 +5,7 @@
     <p:sldMasterId id="2147483648" r:id="rId1"/>
   </p:sldMasterIdLst>
   <p:notesMasterIdLst>
-    <p:notesMasterId r:id="rId14"/>
+    <p:notesMasterId r:id="rId15"/>
   </p:notesMasterIdLst>
   <p:sldIdLst>
     <p:sldId id="256" r:id="rId2"/>
@@ -18,8 +18,9 @@
     <p:sldId id="262" r:id="rId9"/>
     <p:sldId id="265" r:id="rId10"/>
     <p:sldId id="268" r:id="rId11"/>
-    <p:sldId id="269" r:id="rId12"/>
-    <p:sldId id="270" r:id="rId13"/>
+    <p:sldId id="271" r:id="rId12"/>
+    <p:sldId id="269" r:id="rId13"/>
+    <p:sldId id="270" r:id="rId14"/>
   </p:sldIdLst>
   <p:sldSz cx="12192000" cy="6858000"/>
   <p:notesSz cx="6858000" cy="9144000"/>
@@ -255,7 +256,7 @@
   <p:extLst>
     <p:ext uri="{EFAFB233-063F-42B5-8137-9DF3F51BA10A}">
       <p15:sldGuideLst xmlns:p15="http://schemas.microsoft.com/office/powerpoint/2012/main">
-        <p15:guide id="1" orient="horz" pos="3552" userDrawn="1">
+        <p15:guide id="1" orient="horz" pos="3504" userDrawn="1">
           <p15:clr>
             <a:srgbClr val="A4A3A4"/>
           </p15:clr>
@@ -268,7 +269,7 @@
       </p15:sldGuideLst>
     </p:ext>
     <p:ext uri="GoogleSlidesCustomDataVersion2">
-      <go:slidesCustomData xmlns:go="http://customooxmlschemas.google.com/" xmlns:ahyp="http://schemas.microsoft.com/office/drawing/2018/hyperlinkcolor" xmlns:p15="http://schemas.microsoft.com/office/powerpoint/2012/main" xmlns:p14="http://schemas.microsoft.com/office/powerpoint/2010/main" xmlns:com="http://schemas.openxmlformats.org/drawingml/2006/compatibility" xmlns:pvml="urn:schemas-microsoft-com:office:powerpoint" xmlns:v="urn:schemas-microsoft-com:vml" xmlns:o="urn:schemas-microsoft-com:office:office" xmlns:dgm="http://schemas.openxmlformats.org/drawingml/2006/diagram" xmlns:c="http://schemas.openxmlformats.org/drawingml/2006/chart" xmlns:mv="urn:schemas-microsoft-com:mac:vml" xmlns:mc="http://schemas.openxmlformats.org/markup-compatibility/2006" xmlns="" r:id="rId15" roundtripDataSignature="AMtx7mgHnMHIZxhnZr2j+tVR2DpQdbinhg=="/>
+      <go:slidesCustomData xmlns="" xmlns:mc="http://schemas.openxmlformats.org/markup-compatibility/2006" xmlns:mv="urn:schemas-microsoft-com:mac:vml" xmlns:c="http://schemas.openxmlformats.org/drawingml/2006/chart" xmlns:dgm="http://schemas.openxmlformats.org/drawingml/2006/diagram" xmlns:o="urn:schemas-microsoft-com:office:office" xmlns:v="urn:schemas-microsoft-com:vml" xmlns:pvml="urn:schemas-microsoft-com:office:powerpoint" xmlns:com="http://schemas.openxmlformats.org/drawingml/2006/compatibility" xmlns:p14="http://schemas.microsoft.com/office/powerpoint/2010/main" xmlns:p15="http://schemas.microsoft.com/office/powerpoint/2012/main" xmlns:ahyp="http://schemas.microsoft.com/office/drawing/2018/hyperlinkcolor" xmlns:go="http://customooxmlschemas.google.com/" r:id="rId16" roundtripDataSignature="AMtx7mgHnMHIZxhnZr2j+tVR2DpQdbinhg=="/>
     </p:ext>
   </p:extLst>
 </p:presentation>
@@ -1779,6 +1780,115 @@
     </p:spTree>
     <p:extLst>
       <p:ext uri="{BB962C8B-B14F-4D97-AF65-F5344CB8AC3E}">
+        <p14:creationId xmlns:p14="http://schemas.microsoft.com/office/powerpoint/2010/main" val="1031294349"/>
+      </p:ext>
+    </p:extLst>
+  </p:cSld>
+  <p:clrMapOvr>
+    <a:masterClrMapping/>
+  </p:clrMapOvr>
+</p:notes>
+</file>
+
+<file path=ppt/notesSlides/notesSlide12.xml><?xml version="1.0" encoding="utf-8"?>
+<p:notes xmlns:a="http://schemas.openxmlformats.org/drawingml/2006/main" xmlns:r="http://schemas.openxmlformats.org/officeDocument/2006/relationships" xmlns:p="http://schemas.openxmlformats.org/presentationml/2006/main" showMasterSp="0" showMasterPhAnim="0">
+  <p:cSld>
+    <p:spTree>
+      <p:nvGrpSpPr>
+        <p:cNvPr id="1" name="Shape 107"/>
+        <p:cNvGrpSpPr/>
+        <p:nvPr/>
+      </p:nvGrpSpPr>
+      <p:grpSpPr>
+        <a:xfrm>
+          <a:off x="0" y="0"/>
+          <a:ext cx="0" cy="0"/>
+          <a:chOff x="0" y="0"/>
+          <a:chExt cx="0" cy="0"/>
+        </a:xfrm>
+      </p:grpSpPr>
+      <p:sp>
+        <p:nvSpPr>
+          <p:cNvPr id="108" name="Google Shape;108;p4:notes"/>
+          <p:cNvSpPr txBox="1">
+            <a:spLocks noGrp="1"/>
+          </p:cNvSpPr>
+          <p:nvPr>
+            <p:ph type="body" idx="1"/>
+          </p:nvPr>
+        </p:nvSpPr>
+        <p:spPr>
+          <a:xfrm>
+            <a:off x="685800" y="4400550"/>
+            <a:ext cx="5486400" cy="3600450"/>
+          </a:xfrm>
+          <a:prstGeom prst="rect">
+            <a:avLst/>
+          </a:prstGeom>
+        </p:spPr>
+        <p:txBody>
+          <a:bodyPr spcFirstLastPara="1" wrap="square" lIns="91425" tIns="45700" rIns="91425" bIns="45700" anchor="t" anchorCtr="0">
+            <a:noAutofit/>
+          </a:bodyPr>
+          <a:lstStyle/>
+          <a:p>
+            <a:pPr marL="0" lvl="0" indent="0" algn="l" rtl="0">
+              <a:spcBef>
+                <a:spcPts val="0"/>
+              </a:spcBef>
+              <a:spcAft>
+                <a:spcPts val="0"/>
+              </a:spcAft>
+              <a:buNone/>
+            </a:pPr>
+            <a:endParaRPr/>
+          </a:p>
+        </p:txBody>
+      </p:sp>
+      <p:sp>
+        <p:nvSpPr>
+          <p:cNvPr id="109" name="Google Shape;109;p4:notes"/>
+          <p:cNvSpPr>
+            <a:spLocks noGrp="1" noRot="1" noChangeAspect="1"/>
+          </p:cNvSpPr>
+          <p:nvPr>
+            <p:ph type="sldImg" idx="2"/>
+          </p:nvPr>
+        </p:nvSpPr>
+        <p:spPr>
+          <a:xfrm>
+            <a:off x="685800" y="1143000"/>
+            <a:ext cx="5486400" cy="3086100"/>
+          </a:xfrm>
+          <a:custGeom>
+            <a:avLst/>
+            <a:gdLst/>
+            <a:ahLst/>
+            <a:cxnLst/>
+            <a:rect l="l" t="t" r="r" b="b"/>
+            <a:pathLst>
+              <a:path w="120000" h="120000" extrusionOk="0">
+                <a:moveTo>
+                  <a:pt x="0" y="0"/>
+                </a:moveTo>
+                <a:lnTo>
+                  <a:pt x="120000" y="0"/>
+                </a:lnTo>
+                <a:lnTo>
+                  <a:pt x="120000" y="120000"/>
+                </a:lnTo>
+                <a:lnTo>
+                  <a:pt x="0" y="120000"/>
+                </a:lnTo>
+                <a:close/>
+              </a:path>
+            </a:pathLst>
+          </a:custGeom>
+        </p:spPr>
+      </p:sp>
+    </p:spTree>
+    <p:extLst>
+      <p:ext uri="{BB962C8B-B14F-4D97-AF65-F5344CB8AC3E}">
         <p14:creationId xmlns:p14="http://schemas.microsoft.com/office/powerpoint/2010/main" val="184454105"/>
       </p:ext>
     </p:extLst>
@@ -1789,7 +1899,7 @@
 </p:notes>
 </file>
 
-<file path=ppt/notesSlides/notesSlide12.xml><?xml version="1.0" encoding="utf-8"?>
+<file path=ppt/notesSlides/notesSlide13.xml><?xml version="1.0" encoding="utf-8"?>
 <p:notes xmlns:a="http://schemas.openxmlformats.org/drawingml/2006/main" xmlns:r="http://schemas.openxmlformats.org/officeDocument/2006/relationships" xmlns:p="http://schemas.openxmlformats.org/presentationml/2006/main" showMasterSp="0" showMasterPhAnim="0">
   <p:cSld>
     <p:spTree>
@@ -9672,14 +9782,14 @@
           <p:nvPr>
             <p:extLst>
               <p:ext uri="{D42A27DB-BD31-4B8C-83A1-F6EECF244321}">
-                <p14:modId xmlns:p14="http://schemas.microsoft.com/office/powerpoint/2010/main" val="1692238400"/>
+                <p14:modId xmlns:p14="http://schemas.microsoft.com/office/powerpoint/2010/main" val="1798880139"/>
               </p:ext>
             </p:extLst>
           </p:nvPr>
         </p:nvGraphicFramePr>
         <p:xfrm>
-          <a:off x="169332" y="982133"/>
-          <a:ext cx="11512109" cy="3347720"/>
+          <a:off x="331892" y="700767"/>
+          <a:ext cx="11349550" cy="3642360"/>
         </p:xfrm>
         <a:graphic>
           <a:graphicData uri="http://schemas.openxmlformats.org/drawingml/2006/table">
@@ -9688,49 +9798,49 @@
                 <a:tableStyleId>{5C22544A-7EE6-4342-B048-85BDC9FD1C3A}</a:tableStyleId>
               </a:tblPr>
               <a:tblGrid>
-                <a:gridCol w="1644587">
+                <a:gridCol w="1804733">
                   <a:extLst>
                     <a:ext uri="{9D8B030D-6E8A-4147-A177-3AD203B41FA5}">
                       <a16:colId xmlns:a16="http://schemas.microsoft.com/office/drawing/2014/main" val="896100951"/>
                     </a:ext>
                   </a:extLst>
                 </a:gridCol>
-                <a:gridCol w="1644587">
+                <a:gridCol w="1804733">
                   <a:extLst>
                     <a:ext uri="{9D8B030D-6E8A-4147-A177-3AD203B41FA5}">
                       <a16:colId xmlns:a16="http://schemas.microsoft.com/office/drawing/2014/main" val="1128444383"/>
                     </a:ext>
                   </a:extLst>
                 </a:gridCol>
-                <a:gridCol w="1644587">
+                <a:gridCol w="2097069">
                   <a:extLst>
                     <a:ext uri="{9D8B030D-6E8A-4147-A177-3AD203B41FA5}">
                       <a16:colId xmlns:a16="http://schemas.microsoft.com/office/drawing/2014/main" val="3823021968"/>
                     </a:ext>
                   </a:extLst>
                 </a:gridCol>
-                <a:gridCol w="1644587">
+                <a:gridCol w="1097280">
                   <a:extLst>
                     <a:ext uri="{9D8B030D-6E8A-4147-A177-3AD203B41FA5}">
                       <a16:colId xmlns:a16="http://schemas.microsoft.com/office/drawing/2014/main" val="938150115"/>
                     </a:ext>
                   </a:extLst>
                 </a:gridCol>
-                <a:gridCol w="1644587">
+                <a:gridCol w="1097280">
                   <a:extLst>
                     <a:ext uri="{9D8B030D-6E8A-4147-A177-3AD203B41FA5}">
                       <a16:colId xmlns:a16="http://schemas.microsoft.com/office/drawing/2014/main" val="4020079597"/>
                     </a:ext>
                   </a:extLst>
                 </a:gridCol>
-                <a:gridCol w="1644587">
+                <a:gridCol w="1097280">
                   <a:extLst>
                     <a:ext uri="{9D8B030D-6E8A-4147-A177-3AD203B41FA5}">
                       <a16:colId xmlns:a16="http://schemas.microsoft.com/office/drawing/2014/main" val="1155112631"/>
                     </a:ext>
                   </a:extLst>
                 </a:gridCol>
-                <a:gridCol w="1644587">
+                <a:gridCol w="2351175">
                   <a:extLst>
                     <a:ext uri="{9D8B030D-6E8A-4147-A177-3AD203B41FA5}">
                       <a16:colId xmlns:a16="http://schemas.microsoft.com/office/drawing/2014/main" val="725785473"/>
@@ -9907,7 +10017,7 @@
                     <a:lstStyle/>
                     <a:p>
                       <a:r>
-                        <a:rPr lang="es-ES" dirty="0"/>
+                        <a:rPr lang="es-ES"/>
                         <a:t>Comentario</a:t>
                       </a:r>
                       <a:endParaRPr lang="es-MX" dirty="0"/>
@@ -9942,7 +10052,7 @@
                     <a:p>
                       <a:r>
                         <a:rPr lang="es-ES" sz="1300" dirty="0"/>
-                        <a:t>Petrolero</a:t>
+                        <a:t>Eléctrico </a:t>
                       </a:r>
                       <a:endParaRPr lang="es-MX" sz="1300" dirty="0"/>
                     </a:p>
@@ -10285,6 +10395,29 @@
                     <a:bodyPr/>
                     <a:lstStyle/>
                     <a:p>
+                      <a:pPr marL="0" marR="0" lvl="0" indent="0" algn="l" defTabSz="914400" rtl="0" eaLnBrk="1" fontAlgn="auto" latinLnBrk="0" hangingPunct="1">
+                        <a:lnSpc>
+                          <a:spcPct val="100000"/>
+                        </a:lnSpc>
+                        <a:spcBef>
+                          <a:spcPts val="0"/>
+                        </a:spcBef>
+                        <a:spcAft>
+                          <a:spcPts val="0"/>
+                        </a:spcAft>
+                        <a:buClr>
+                          <a:srgbClr val="000000"/>
+                        </a:buClr>
+                        <a:buSzTx/>
+                        <a:buFont typeface="Arial"/>
+                        <a:buNone/>
+                        <a:tabLst/>
+                        <a:defRPr/>
+                      </a:pPr>
+                      <a:r>
+                        <a:rPr lang="es-ES" sz="1300" dirty="0"/>
+                        <a:t>Pronóstico sobreestima en general el valor real </a:t>
+                      </a:r>
                       <a:endParaRPr lang="es-MX" sz="1300" dirty="0"/>
                     </a:p>
                   </a:txBody>
@@ -10346,7 +10479,7 @@
                     <a:p>
                       <a:r>
                         <a:rPr lang="es-ES" sz="1300" dirty="0"/>
-                        <a:t>Petrolero</a:t>
+                        <a:t>Eléctrico </a:t>
                       </a:r>
                       <a:endParaRPr lang="es-MX" sz="1300" dirty="0"/>
                     </a:p>
@@ -10689,6 +10822,10 @@
                     <a:bodyPr/>
                     <a:lstStyle/>
                     <a:p>
+                      <a:r>
+                        <a:rPr lang="es-ES" sz="1300" dirty="0"/>
+                        <a:t>Pronóstico muy lineal sin considerar estacionalidad</a:t>
+                      </a:r>
                       <a:endParaRPr lang="es-MX" sz="1300" dirty="0"/>
                     </a:p>
                   </a:txBody>
@@ -10750,7 +10887,7 @@
                     <a:p>
                       <a:r>
                         <a:rPr lang="es-ES" sz="1300" dirty="0"/>
-                        <a:t>Petrolero</a:t>
+                        <a:t>Eléctrico </a:t>
                       </a:r>
                       <a:endParaRPr lang="es-MX" sz="1300" dirty="0"/>
                     </a:p>
@@ -11165,7 +11302,11 @@
                     <a:bodyPr/>
                     <a:lstStyle/>
                     <a:p>
-                      <a:endParaRPr lang="es-MX"/>
+                      <a:r>
+                        <a:rPr lang="es-ES" sz="1300" dirty="0"/>
+                        <a:t>Eléctrico </a:t>
+                      </a:r>
+                      <a:endParaRPr lang="es-MX" sz="1300" dirty="0"/>
                     </a:p>
                   </a:txBody>
                   <a:tcPr>
@@ -11217,7 +11358,20 @@
                     <a:bodyPr/>
                     <a:lstStyle/>
                     <a:p>
-                      <a:endParaRPr lang="es-MX"/>
+                      <a:r>
+                        <a:rPr lang="es-MX" sz="1300" b="0" i="0" u="none" strike="noStrike" cap="none" dirty="0">
+                          <a:solidFill>
+                            <a:schemeClr val="dk1"/>
+                          </a:solidFill>
+                          <a:effectLst/>
+                          <a:latin typeface="+mn-lt"/>
+                          <a:ea typeface="+mn-ea"/>
+                          <a:cs typeface="+mn-cs"/>
+                          <a:sym typeface="Arial"/>
+                        </a:rPr>
+                        <a:t>ARIMA(3, 1, 1)</a:t>
+                      </a:r>
+                      <a:endParaRPr lang="es-MX" sz="1300" dirty="0"/>
                     </a:p>
                   </a:txBody>
                   <a:tcPr>
@@ -11269,7 +11423,11 @@
                     <a:bodyPr/>
                     <a:lstStyle/>
                     <a:p>
-                      <a:endParaRPr lang="es-MX" dirty="0"/>
+                      <a:r>
+                        <a:rPr lang="es-ES" sz="1300" dirty="0"/>
+                        <a:t>Ajuste de atípicos por la mediana</a:t>
+                      </a:r>
+                      <a:endParaRPr lang="es-MX" sz="1300" dirty="0"/>
                     </a:p>
                   </a:txBody>
                   <a:tcPr>
@@ -11321,7 +11479,11 @@
                     <a:bodyPr/>
                     <a:lstStyle/>
                     <a:p>
-                      <a:endParaRPr lang="es-MX"/>
+                      <a:r>
+                        <a:rPr lang="es-ES" sz="1300" dirty="0"/>
+                        <a:t>578.67</a:t>
+                      </a:r>
+                      <a:endParaRPr lang="es-MX" sz="1300" dirty="0"/>
                     </a:p>
                   </a:txBody>
                   <a:tcPr>
@@ -11373,7 +11535,11 @@
                     <a:bodyPr/>
                     <a:lstStyle/>
                     <a:p>
-                      <a:endParaRPr lang="es-MX" dirty="0"/>
+                      <a:r>
+                        <a:rPr lang="es-ES" sz="1300" dirty="0"/>
+                        <a:t>9.01</a:t>
+                      </a:r>
+                      <a:endParaRPr lang="es-MX" sz="1300" dirty="0"/>
                     </a:p>
                   </a:txBody>
                   <a:tcPr>
@@ -11425,7 +11591,11 @@
                     <a:bodyPr/>
                     <a:lstStyle/>
                     <a:p>
-                      <a:endParaRPr lang="es-MX" dirty="0"/>
+                      <a:r>
+                        <a:rPr lang="es-ES" sz="1300" dirty="0"/>
+                        <a:t>2845</a:t>
+                      </a:r>
+                      <a:endParaRPr lang="es-MX" sz="1300" dirty="0"/>
                     </a:p>
                   </a:txBody>
                   <a:tcPr>
@@ -11477,7 +11647,30 @@
                     <a:bodyPr/>
                     <a:lstStyle/>
                     <a:p>
-                      <a:endParaRPr lang="es-MX" dirty="0"/>
+                      <a:pPr marL="0" marR="0" lvl="0" indent="0" algn="l" defTabSz="914400" rtl="0" eaLnBrk="1" fontAlgn="auto" latinLnBrk="0" hangingPunct="1">
+                        <a:lnSpc>
+                          <a:spcPct val="100000"/>
+                        </a:lnSpc>
+                        <a:spcBef>
+                          <a:spcPts val="0"/>
+                        </a:spcBef>
+                        <a:spcAft>
+                          <a:spcPts val="0"/>
+                        </a:spcAft>
+                        <a:buClr>
+                          <a:srgbClr val="000000"/>
+                        </a:buClr>
+                        <a:buSzTx/>
+                        <a:buFont typeface="Arial"/>
+                        <a:buNone/>
+                        <a:tabLst/>
+                        <a:defRPr/>
+                      </a:pPr>
+                      <a:r>
+                        <a:rPr lang="es-ES" sz="1400" dirty="0"/>
+                        <a:t>Pronóstico sobreestima en general el valor real </a:t>
+                      </a:r>
+                      <a:endParaRPr lang="es-MX" sz="1400" dirty="0"/>
                     </a:p>
                   </a:txBody>
                   <a:tcPr>
@@ -11536,7 +11729,11 @@
                     <a:bodyPr/>
                     <a:lstStyle/>
                     <a:p>
-                      <a:endParaRPr lang="es-MX"/>
+                      <a:r>
+                        <a:rPr lang="es-ES" sz="1300" dirty="0"/>
+                        <a:t>Eléctrico </a:t>
+                      </a:r>
+                      <a:endParaRPr lang="es-MX" sz="1300" dirty="0"/>
                     </a:p>
                   </a:txBody>
                   <a:tcPr>
@@ -11588,7 +11785,33 @@
                     <a:bodyPr/>
                     <a:lstStyle/>
                     <a:p>
-                      <a:endParaRPr lang="es-MX"/>
+                      <a:r>
+                        <a:rPr lang="es-MX" sz="1300" b="0" i="0" u="none" strike="noStrike" cap="none" dirty="0">
+                          <a:solidFill>
+                            <a:schemeClr val="dk1"/>
+                          </a:solidFill>
+                          <a:effectLst/>
+                          <a:latin typeface="+mn-lt"/>
+                          <a:ea typeface="+mn-ea"/>
+                          <a:cs typeface="+mn-cs"/>
+                          <a:sym typeface="Arial"/>
+                        </a:rPr>
+                        <a:t>SARIMA(3, 1, 1)</a:t>
+                      </a:r>
+                      <a:r>
+                        <a:rPr lang="es-MX" sz="1400" b="0" i="0" u="none" strike="noStrike" cap="none" dirty="0">
+                          <a:solidFill>
+                            <a:schemeClr val="dk1"/>
+                          </a:solidFill>
+                          <a:effectLst/>
+                          <a:latin typeface="+mn-lt"/>
+                          <a:ea typeface="+mn-ea"/>
+                          <a:cs typeface="+mn-cs"/>
+                          <a:sym typeface="Arial"/>
+                        </a:rPr>
+                        <a:t> x(0, 1, [], 12) </a:t>
+                      </a:r>
+                      <a:endParaRPr lang="es-MX" sz="1300" dirty="0"/>
                     </a:p>
                   </a:txBody>
                   <a:tcPr>
@@ -11640,7 +11863,11 @@
                     <a:bodyPr/>
                     <a:lstStyle/>
                     <a:p>
-                      <a:endParaRPr lang="es-MX"/>
+                      <a:r>
+                        <a:rPr lang="es-ES" sz="1300" dirty="0"/>
+                        <a:t>Ajuste de atípicos por la mediana</a:t>
+                      </a:r>
+                      <a:endParaRPr lang="es-MX" sz="1300" dirty="0"/>
                     </a:p>
                   </a:txBody>
                   <a:tcPr>
@@ -11692,7 +11919,11 @@
                     <a:bodyPr/>
                     <a:lstStyle/>
                     <a:p>
-                      <a:endParaRPr lang="es-MX"/>
+                      <a:r>
+                        <a:rPr lang="es-ES" sz="1300" dirty="0"/>
+                        <a:t>580</a:t>
+                      </a:r>
+                      <a:endParaRPr lang="es-MX" sz="1300" dirty="0"/>
                     </a:p>
                   </a:txBody>
                   <a:tcPr>
@@ -11744,7 +11975,11 @@
                     <a:bodyPr/>
                     <a:lstStyle/>
                     <a:p>
-                      <a:endParaRPr lang="es-MX" dirty="0"/>
+                      <a:r>
+                        <a:rPr lang="es-ES" sz="1300" dirty="0"/>
+                        <a:t>14.2</a:t>
+                      </a:r>
+                      <a:endParaRPr lang="es-MX" sz="1300" dirty="0"/>
                     </a:p>
                   </a:txBody>
                   <a:tcPr>
@@ -11796,7 +12031,11 @@
                     <a:bodyPr/>
                     <a:lstStyle/>
                     <a:p>
-                      <a:endParaRPr lang="es-MX" dirty="0"/>
+                      <a:r>
+                        <a:rPr lang="es-ES" sz="1300" dirty="0"/>
+                        <a:t>2732</a:t>
+                      </a:r>
+                      <a:endParaRPr lang="es-MX" sz="1300" dirty="0"/>
                     </a:p>
                   </a:txBody>
                   <a:tcPr>
@@ -11848,7 +12087,30 @@
                     <a:bodyPr/>
                     <a:lstStyle/>
                     <a:p>
-                      <a:endParaRPr lang="es-MX" dirty="0"/>
+                      <a:pPr marL="0" marR="0" lvl="0" indent="0" algn="l" defTabSz="914400" rtl="0" eaLnBrk="1" fontAlgn="auto" latinLnBrk="0" hangingPunct="1">
+                        <a:lnSpc>
+                          <a:spcPct val="100000"/>
+                        </a:lnSpc>
+                        <a:spcBef>
+                          <a:spcPts val="0"/>
+                        </a:spcBef>
+                        <a:spcAft>
+                          <a:spcPts val="0"/>
+                        </a:spcAft>
+                        <a:buClr>
+                          <a:srgbClr val="000000"/>
+                        </a:buClr>
+                        <a:buSzTx/>
+                        <a:buFont typeface="Arial"/>
+                        <a:buNone/>
+                        <a:tabLst/>
+                        <a:defRPr/>
+                      </a:pPr>
+                      <a:r>
+                        <a:rPr lang="es-ES" sz="1400" dirty="0"/>
+                        <a:t>Pronóstico sobreestima en general el valor real </a:t>
+                      </a:r>
+                      <a:endParaRPr lang="es-MX" sz="1400" dirty="0"/>
                     </a:p>
                   </a:txBody>
                   <a:tcPr>
@@ -12669,8 +12931,38 @@
         </p:blipFill>
         <p:spPr>
           <a:xfrm>
-            <a:off x="510558" y="4803585"/>
-            <a:ext cx="3846723" cy="1314826"/>
+            <a:off x="510558" y="4716331"/>
+            <a:ext cx="3339895" cy="1141590"/>
+          </a:xfrm>
+          <a:prstGeom prst="rect">
+            <a:avLst/>
+          </a:prstGeom>
+        </p:spPr>
+      </p:pic>
+      <p:pic>
+        <p:nvPicPr>
+          <p:cNvPr id="6" name="Imagen 5">
+            <a:extLst>
+              <a:ext uri="{FF2B5EF4-FFF2-40B4-BE49-F238E27FC236}">
+                <a16:creationId xmlns:a16="http://schemas.microsoft.com/office/drawing/2014/main" id="{4459AAA5-40FF-5E94-7A69-2D899E4861BB}"/>
+              </a:ext>
+            </a:extLst>
+          </p:cNvPr>
+          <p:cNvPicPr>
+            <a:picLocks noChangeAspect="1"/>
+          </p:cNvPicPr>
+          <p:nvPr/>
+        </p:nvPicPr>
+        <p:blipFill>
+          <a:blip r:embed="rId4"/>
+          <a:stretch>
+            <a:fillRect/>
+          </a:stretch>
+        </p:blipFill>
+        <p:spPr>
+          <a:xfrm>
+            <a:off x="4373002" y="4716331"/>
+            <a:ext cx="3445995" cy="1141591"/>
           </a:xfrm>
           <a:prstGeom prst="rect">
             <a:avLst/>
@@ -12775,6 +13067,3116 @@
                 <a:cs typeface="Calibri"/>
                 <a:sym typeface="Calibri"/>
               </a:rPr>
+              <a:t> demanda en sector eléctrico</a:t>
+            </a:r>
+            <a:endParaRPr sz="3200" b="1" dirty="0">
+              <a:solidFill>
+                <a:schemeClr val="accent1"/>
+              </a:solidFill>
+              <a:latin typeface="Calibri"/>
+              <a:ea typeface="Calibri"/>
+              <a:cs typeface="Calibri"/>
+              <a:sym typeface="Calibri"/>
+            </a:endParaRPr>
+          </a:p>
+        </p:txBody>
+      </p:sp>
+      <p:graphicFrame>
+        <p:nvGraphicFramePr>
+          <p:cNvPr id="2" name="Tabla 1">
+            <a:extLst>
+              <a:ext uri="{FF2B5EF4-FFF2-40B4-BE49-F238E27FC236}">
+                <a16:creationId xmlns:a16="http://schemas.microsoft.com/office/drawing/2014/main" id="{832D81AC-38EB-FB46-FD18-4D1419ADC5E5}"/>
+              </a:ext>
+            </a:extLst>
+          </p:cNvPr>
+          <p:cNvGraphicFramePr>
+            <a:graphicFrameLocks noGrp="1"/>
+          </p:cNvGraphicFramePr>
+          <p:nvPr>
+            <p:extLst>
+              <p:ext uri="{D42A27DB-BD31-4B8C-83A1-F6EECF244321}">
+                <p14:modId xmlns:p14="http://schemas.microsoft.com/office/powerpoint/2010/main" val="2063263082"/>
+              </p:ext>
+            </p:extLst>
+          </p:nvPr>
+        </p:nvGraphicFramePr>
+        <p:xfrm>
+          <a:off x="331892" y="700767"/>
+          <a:ext cx="11349550" cy="3083560"/>
+        </p:xfrm>
+        <a:graphic>
+          <a:graphicData uri="http://schemas.openxmlformats.org/drawingml/2006/table">
+            <a:tbl>
+              <a:tblPr firstRow="1" bandRow="1">
+                <a:tableStyleId>{5C22544A-7EE6-4342-B048-85BDC9FD1C3A}</a:tableStyleId>
+              </a:tblPr>
+              <a:tblGrid>
+                <a:gridCol w="1804733">
+                  <a:extLst>
+                    <a:ext uri="{9D8B030D-6E8A-4147-A177-3AD203B41FA5}">
+                      <a16:colId xmlns:a16="http://schemas.microsoft.com/office/drawing/2014/main" val="896100951"/>
+                    </a:ext>
+                  </a:extLst>
+                </a:gridCol>
+                <a:gridCol w="1804733">
+                  <a:extLst>
+                    <a:ext uri="{9D8B030D-6E8A-4147-A177-3AD203B41FA5}">
+                      <a16:colId xmlns:a16="http://schemas.microsoft.com/office/drawing/2014/main" val="1128444383"/>
+                    </a:ext>
+                  </a:extLst>
+                </a:gridCol>
+                <a:gridCol w="2097069">
+                  <a:extLst>
+                    <a:ext uri="{9D8B030D-6E8A-4147-A177-3AD203B41FA5}">
+                      <a16:colId xmlns:a16="http://schemas.microsoft.com/office/drawing/2014/main" val="3823021968"/>
+                    </a:ext>
+                  </a:extLst>
+                </a:gridCol>
+                <a:gridCol w="1097280">
+                  <a:extLst>
+                    <a:ext uri="{9D8B030D-6E8A-4147-A177-3AD203B41FA5}">
+                      <a16:colId xmlns:a16="http://schemas.microsoft.com/office/drawing/2014/main" val="938150115"/>
+                    </a:ext>
+                  </a:extLst>
+                </a:gridCol>
+                <a:gridCol w="1097280">
+                  <a:extLst>
+                    <a:ext uri="{9D8B030D-6E8A-4147-A177-3AD203B41FA5}">
+                      <a16:colId xmlns:a16="http://schemas.microsoft.com/office/drawing/2014/main" val="4020079597"/>
+                    </a:ext>
+                  </a:extLst>
+                </a:gridCol>
+                <a:gridCol w="1097280">
+                  <a:extLst>
+                    <a:ext uri="{9D8B030D-6E8A-4147-A177-3AD203B41FA5}">
+                      <a16:colId xmlns:a16="http://schemas.microsoft.com/office/drawing/2014/main" val="1155112631"/>
+                    </a:ext>
+                  </a:extLst>
+                </a:gridCol>
+                <a:gridCol w="2351175">
+                  <a:extLst>
+                    <a:ext uri="{9D8B030D-6E8A-4147-A177-3AD203B41FA5}">
+                      <a16:colId xmlns:a16="http://schemas.microsoft.com/office/drawing/2014/main" val="725785473"/>
+                    </a:ext>
+                  </a:extLst>
+                </a:gridCol>
+              </a:tblGrid>
+              <a:tr h="370840">
+                <a:tc>
+                  <a:txBody>
+                    <a:bodyPr/>
+                    <a:lstStyle/>
+                    <a:p>
+                      <a:r>
+                        <a:rPr lang="es-ES" dirty="0"/>
+                        <a:t>Sector</a:t>
+                      </a:r>
+                      <a:endParaRPr lang="es-MX" dirty="0"/>
+                    </a:p>
+                  </a:txBody>
+                  <a:tcPr>
+                    <a:lnB w="6350" cap="flat" cmpd="sng" algn="ctr">
+                      <a:solidFill>
+                        <a:schemeClr val="tx1"/>
+                      </a:solidFill>
+                      <a:prstDash val="solid"/>
+                      <a:round/>
+                      <a:headEnd type="none" w="med" len="med"/>
+                      <a:tailEnd type="none" w="med" len="med"/>
+                    </a:lnB>
+                    <a:solidFill>
+                      <a:srgbClr val="009900"/>
+                    </a:solidFill>
+                  </a:tcPr>
+                </a:tc>
+                <a:tc>
+                  <a:txBody>
+                    <a:bodyPr/>
+                    <a:lstStyle/>
+                    <a:p>
+                      <a:r>
+                        <a:rPr lang="es-ES" dirty="0"/>
+                        <a:t>Modelo </a:t>
+                      </a:r>
+                      <a:endParaRPr lang="es-MX" dirty="0"/>
+                    </a:p>
+                  </a:txBody>
+                  <a:tcPr>
+                    <a:lnB w="6350" cap="flat" cmpd="sng" algn="ctr">
+                      <a:solidFill>
+                        <a:schemeClr val="tx1"/>
+                      </a:solidFill>
+                      <a:prstDash val="solid"/>
+                      <a:round/>
+                      <a:headEnd type="none" w="med" len="med"/>
+                      <a:tailEnd type="none" w="med" len="med"/>
+                    </a:lnB>
+                    <a:solidFill>
+                      <a:srgbClr val="009900"/>
+                    </a:solidFill>
+                  </a:tcPr>
+                </a:tc>
+                <a:tc>
+                  <a:txBody>
+                    <a:bodyPr/>
+                    <a:lstStyle/>
+                    <a:p>
+                      <a:r>
+                        <a:rPr lang="es-ES" dirty="0"/>
+                        <a:t>Especificación </a:t>
+                      </a:r>
+                      <a:endParaRPr lang="es-MX" dirty="0"/>
+                    </a:p>
+                  </a:txBody>
+                  <a:tcPr>
+                    <a:lnB w="6350" cap="flat" cmpd="sng" algn="ctr">
+                      <a:solidFill>
+                        <a:schemeClr val="tx1"/>
+                      </a:solidFill>
+                      <a:prstDash val="solid"/>
+                      <a:round/>
+                      <a:headEnd type="none" w="med" len="med"/>
+                      <a:tailEnd type="none" w="med" len="med"/>
+                    </a:lnB>
+                    <a:solidFill>
+                      <a:srgbClr val="009900"/>
+                    </a:solidFill>
+                  </a:tcPr>
+                </a:tc>
+                <a:tc>
+                  <a:txBody>
+                    <a:bodyPr/>
+                    <a:lstStyle/>
+                    <a:p>
+                      <a:r>
+                        <a:rPr lang="es-ES" dirty="0"/>
+                        <a:t>RMSE</a:t>
+                      </a:r>
+                      <a:endParaRPr lang="es-MX" dirty="0"/>
+                    </a:p>
+                  </a:txBody>
+                  <a:tcPr>
+                    <a:lnB w="6350" cap="flat" cmpd="sng" algn="ctr">
+                      <a:solidFill>
+                        <a:schemeClr val="tx1"/>
+                      </a:solidFill>
+                      <a:prstDash val="solid"/>
+                      <a:round/>
+                      <a:headEnd type="none" w="med" len="med"/>
+                      <a:tailEnd type="none" w="med" len="med"/>
+                    </a:lnB>
+                    <a:solidFill>
+                      <a:srgbClr val="009900"/>
+                    </a:solidFill>
+                  </a:tcPr>
+                </a:tc>
+                <a:tc>
+                  <a:txBody>
+                    <a:bodyPr/>
+                    <a:lstStyle/>
+                    <a:p>
+                      <a:r>
+                        <a:rPr lang="es-ES" dirty="0"/>
+                        <a:t>MAPE[%]</a:t>
+                      </a:r>
+                      <a:endParaRPr lang="es-MX" dirty="0"/>
+                    </a:p>
+                  </a:txBody>
+                  <a:tcPr>
+                    <a:lnB w="6350" cap="flat" cmpd="sng" algn="ctr">
+                      <a:solidFill>
+                        <a:schemeClr val="tx1"/>
+                      </a:solidFill>
+                      <a:prstDash val="solid"/>
+                      <a:round/>
+                      <a:headEnd type="none" w="med" len="med"/>
+                      <a:tailEnd type="none" w="med" len="med"/>
+                    </a:lnB>
+                    <a:solidFill>
+                      <a:srgbClr val="009900"/>
+                    </a:solidFill>
+                  </a:tcPr>
+                </a:tc>
+                <a:tc>
+                  <a:txBody>
+                    <a:bodyPr/>
+                    <a:lstStyle/>
+                    <a:p>
+                      <a:r>
+                        <a:rPr lang="es-ES" dirty="0"/>
+                        <a:t>AIC</a:t>
+                      </a:r>
+                      <a:endParaRPr lang="es-MX" dirty="0"/>
+                    </a:p>
+                  </a:txBody>
+                  <a:tcPr>
+                    <a:lnB w="6350" cap="flat" cmpd="sng" algn="ctr">
+                      <a:solidFill>
+                        <a:schemeClr val="tx1"/>
+                      </a:solidFill>
+                      <a:prstDash val="solid"/>
+                      <a:round/>
+                      <a:headEnd type="none" w="med" len="med"/>
+                      <a:tailEnd type="none" w="med" len="med"/>
+                    </a:lnB>
+                    <a:solidFill>
+                      <a:srgbClr val="009900"/>
+                    </a:solidFill>
+                  </a:tcPr>
+                </a:tc>
+                <a:tc>
+                  <a:txBody>
+                    <a:bodyPr/>
+                    <a:lstStyle/>
+                    <a:p>
+                      <a:r>
+                        <a:rPr lang="es-ES"/>
+                        <a:t>Comentario</a:t>
+                      </a:r>
+                      <a:endParaRPr lang="es-MX" dirty="0"/>
+                    </a:p>
+                  </a:txBody>
+                  <a:tcPr>
+                    <a:lnB w="6350" cap="flat" cmpd="sng" algn="ctr">
+                      <a:solidFill>
+                        <a:schemeClr val="tx1"/>
+                      </a:solidFill>
+                      <a:prstDash val="solid"/>
+                      <a:round/>
+                      <a:headEnd type="none" w="med" len="med"/>
+                      <a:tailEnd type="none" w="med" len="med"/>
+                    </a:lnB>
+                    <a:solidFill>
+                      <a:srgbClr val="009900"/>
+                    </a:solidFill>
+                  </a:tcPr>
+                </a:tc>
+                <a:extLst>
+                  <a:ext uri="{0D108BD9-81ED-4DB2-BD59-A6C34878D82A}">
+                    <a16:rowId xmlns:a16="http://schemas.microsoft.com/office/drawing/2014/main" val="490167761"/>
+                  </a:ext>
+                </a:extLst>
+              </a:tr>
+              <a:tr h="370840">
+                <a:tc>
+                  <a:txBody>
+                    <a:bodyPr/>
+                    <a:lstStyle/>
+                    <a:p>
+                      <a:r>
+                        <a:rPr lang="es-ES" sz="1300" dirty="0"/>
+                        <a:t>Eléctrico </a:t>
+                      </a:r>
+                      <a:endParaRPr lang="es-MX" sz="1300" dirty="0"/>
+                    </a:p>
+                  </a:txBody>
+                  <a:tcPr>
+                    <a:lnL w="6350" cap="flat" cmpd="sng" algn="ctr">
+                      <a:solidFill>
+                        <a:schemeClr val="tx1"/>
+                      </a:solidFill>
+                      <a:prstDash val="solid"/>
+                      <a:round/>
+                      <a:headEnd type="none" w="med" len="med"/>
+                      <a:tailEnd type="none" w="med" len="med"/>
+                    </a:lnL>
+                    <a:lnR w="6350" cap="flat" cmpd="sng" algn="ctr">
+                      <a:solidFill>
+                        <a:schemeClr val="tx1"/>
+                      </a:solidFill>
+                      <a:prstDash val="solid"/>
+                      <a:round/>
+                      <a:headEnd type="none" w="med" len="med"/>
+                      <a:tailEnd type="none" w="med" len="med"/>
+                    </a:lnR>
+                    <a:lnT w="6350" cap="flat" cmpd="sng" algn="ctr">
+                      <a:solidFill>
+                        <a:schemeClr val="tx1"/>
+                      </a:solidFill>
+                      <a:prstDash val="solid"/>
+                      <a:round/>
+                      <a:headEnd type="none" w="med" len="med"/>
+                      <a:tailEnd type="none" w="med" len="med"/>
+                    </a:lnT>
+                    <a:lnB w="6350" cap="flat" cmpd="sng" algn="ctr">
+                      <a:solidFill>
+                        <a:schemeClr val="tx1"/>
+                      </a:solidFill>
+                      <a:prstDash val="solid"/>
+                      <a:round/>
+                      <a:headEnd type="none" w="med" len="med"/>
+                      <a:tailEnd type="none" w="med" len="med"/>
+                    </a:lnB>
+                    <a:solidFill>
+                      <a:schemeClr val="bg1">
+                        <a:lumMod val="85000"/>
+                      </a:schemeClr>
+                    </a:solidFill>
+                  </a:tcPr>
+                </a:tc>
+                <a:tc>
+                  <a:txBody>
+                    <a:bodyPr/>
+                    <a:lstStyle/>
+                    <a:p>
+                      <a:r>
+                        <a:rPr lang="es-MX" sz="1300" b="0" i="0" u="none" strike="noStrike" cap="none" dirty="0">
+                          <a:solidFill>
+                            <a:schemeClr val="dk1"/>
+                          </a:solidFill>
+                          <a:effectLst/>
+                          <a:latin typeface="+mn-lt"/>
+                          <a:ea typeface="+mn-ea"/>
+                          <a:cs typeface="+mn-cs"/>
+                          <a:sym typeface="Arial"/>
+                        </a:rPr>
+                        <a:t>LSTM (100, 1, </a:t>
+                      </a:r>
+                      <a:r>
+                        <a:rPr lang="es-MX" sz="1300" b="0" i="0" u="none" strike="noStrike" cap="none" dirty="0" err="1">
+                          <a:solidFill>
+                            <a:schemeClr val="dk1"/>
+                          </a:solidFill>
+                          <a:effectLst/>
+                          <a:latin typeface="+mn-lt"/>
+                          <a:ea typeface="+mn-ea"/>
+                          <a:cs typeface="+mn-cs"/>
+                          <a:sym typeface="Arial"/>
+                        </a:rPr>
+                        <a:t>relu</a:t>
+                      </a:r>
+                      <a:r>
+                        <a:rPr lang="es-MX" sz="1300" b="0" i="0" u="none" strike="noStrike" cap="none" dirty="0">
+                          <a:solidFill>
+                            <a:schemeClr val="dk1"/>
+                          </a:solidFill>
+                          <a:effectLst/>
+                          <a:latin typeface="+mn-lt"/>
+                          <a:ea typeface="+mn-ea"/>
+                          <a:cs typeface="+mn-cs"/>
+                          <a:sym typeface="Arial"/>
+                        </a:rPr>
+                        <a:t>, Adam)</a:t>
+                      </a:r>
+                      <a:endParaRPr lang="es-MX" sz="1300" dirty="0"/>
+                    </a:p>
+                  </a:txBody>
+                  <a:tcPr>
+                    <a:lnL w="6350" cap="flat" cmpd="sng" algn="ctr">
+                      <a:solidFill>
+                        <a:schemeClr val="tx1"/>
+                      </a:solidFill>
+                      <a:prstDash val="solid"/>
+                      <a:round/>
+                      <a:headEnd type="none" w="med" len="med"/>
+                      <a:tailEnd type="none" w="med" len="med"/>
+                    </a:lnL>
+                    <a:lnR w="6350" cap="flat" cmpd="sng" algn="ctr">
+                      <a:solidFill>
+                        <a:schemeClr val="tx1"/>
+                      </a:solidFill>
+                      <a:prstDash val="solid"/>
+                      <a:round/>
+                      <a:headEnd type="none" w="med" len="med"/>
+                      <a:tailEnd type="none" w="med" len="med"/>
+                    </a:lnR>
+                    <a:lnT w="6350" cap="flat" cmpd="sng" algn="ctr">
+                      <a:solidFill>
+                        <a:schemeClr val="tx1"/>
+                      </a:solidFill>
+                      <a:prstDash val="solid"/>
+                      <a:round/>
+                      <a:headEnd type="none" w="med" len="med"/>
+                      <a:tailEnd type="none" w="med" len="med"/>
+                    </a:lnT>
+                    <a:lnB w="6350" cap="flat" cmpd="sng" algn="ctr">
+                      <a:solidFill>
+                        <a:schemeClr val="tx1"/>
+                      </a:solidFill>
+                      <a:prstDash val="solid"/>
+                      <a:round/>
+                      <a:headEnd type="none" w="med" len="med"/>
+                      <a:tailEnd type="none" w="med" len="med"/>
+                    </a:lnB>
+                    <a:solidFill>
+                      <a:schemeClr val="bg1">
+                        <a:lumMod val="85000"/>
+                      </a:schemeClr>
+                    </a:solidFill>
+                  </a:tcPr>
+                </a:tc>
+                <a:tc>
+                  <a:txBody>
+                    <a:bodyPr/>
+                    <a:lstStyle/>
+                    <a:p>
+                      <a:r>
+                        <a:rPr lang="es-ES" sz="1300" dirty="0"/>
+                        <a:t>Sin pretratamiento alguno</a:t>
+                      </a:r>
+                      <a:endParaRPr lang="es-MX" sz="1300" dirty="0"/>
+                    </a:p>
+                  </a:txBody>
+                  <a:tcPr>
+                    <a:lnL w="6350" cap="flat" cmpd="sng" algn="ctr">
+                      <a:solidFill>
+                        <a:schemeClr val="tx1"/>
+                      </a:solidFill>
+                      <a:prstDash val="solid"/>
+                      <a:round/>
+                      <a:headEnd type="none" w="med" len="med"/>
+                      <a:tailEnd type="none" w="med" len="med"/>
+                    </a:lnL>
+                    <a:lnR w="6350" cap="flat" cmpd="sng" algn="ctr">
+                      <a:solidFill>
+                        <a:schemeClr val="tx1"/>
+                      </a:solidFill>
+                      <a:prstDash val="solid"/>
+                      <a:round/>
+                      <a:headEnd type="none" w="med" len="med"/>
+                      <a:tailEnd type="none" w="med" len="med"/>
+                    </a:lnR>
+                    <a:lnT w="6350" cap="flat" cmpd="sng" algn="ctr">
+                      <a:solidFill>
+                        <a:schemeClr val="tx1"/>
+                      </a:solidFill>
+                      <a:prstDash val="solid"/>
+                      <a:round/>
+                      <a:headEnd type="none" w="med" len="med"/>
+                      <a:tailEnd type="none" w="med" len="med"/>
+                    </a:lnT>
+                    <a:lnB w="6350" cap="flat" cmpd="sng" algn="ctr">
+                      <a:solidFill>
+                        <a:schemeClr val="tx1"/>
+                      </a:solidFill>
+                      <a:prstDash val="solid"/>
+                      <a:round/>
+                      <a:headEnd type="none" w="med" len="med"/>
+                      <a:tailEnd type="none" w="med" len="med"/>
+                    </a:lnB>
+                    <a:solidFill>
+                      <a:schemeClr val="bg1">
+                        <a:lumMod val="85000"/>
+                      </a:schemeClr>
+                    </a:solidFill>
+                  </a:tcPr>
+                </a:tc>
+                <a:tc>
+                  <a:txBody>
+                    <a:bodyPr/>
+                    <a:lstStyle/>
+                    <a:p>
+                      <a:r>
+                        <a:rPr lang="es-ES" sz="1300" dirty="0"/>
+                        <a:t>1055</a:t>
+                      </a:r>
+                      <a:endParaRPr lang="es-MX" sz="1300" dirty="0"/>
+                    </a:p>
+                  </a:txBody>
+                  <a:tcPr>
+                    <a:lnL w="6350" cap="flat" cmpd="sng" algn="ctr">
+                      <a:solidFill>
+                        <a:schemeClr val="tx1"/>
+                      </a:solidFill>
+                      <a:prstDash val="solid"/>
+                      <a:round/>
+                      <a:headEnd type="none" w="med" len="med"/>
+                      <a:tailEnd type="none" w="med" len="med"/>
+                    </a:lnL>
+                    <a:lnR w="6350" cap="flat" cmpd="sng" algn="ctr">
+                      <a:solidFill>
+                        <a:schemeClr val="tx1"/>
+                      </a:solidFill>
+                      <a:prstDash val="solid"/>
+                      <a:round/>
+                      <a:headEnd type="none" w="med" len="med"/>
+                      <a:tailEnd type="none" w="med" len="med"/>
+                    </a:lnR>
+                    <a:lnT w="6350" cap="flat" cmpd="sng" algn="ctr">
+                      <a:solidFill>
+                        <a:schemeClr val="tx1"/>
+                      </a:solidFill>
+                      <a:prstDash val="solid"/>
+                      <a:round/>
+                      <a:headEnd type="none" w="med" len="med"/>
+                      <a:tailEnd type="none" w="med" len="med"/>
+                    </a:lnT>
+                    <a:lnB w="6350" cap="flat" cmpd="sng" algn="ctr">
+                      <a:solidFill>
+                        <a:schemeClr val="tx1"/>
+                      </a:solidFill>
+                      <a:prstDash val="solid"/>
+                      <a:round/>
+                      <a:headEnd type="none" w="med" len="med"/>
+                      <a:tailEnd type="none" w="med" len="med"/>
+                    </a:lnB>
+                    <a:solidFill>
+                      <a:schemeClr val="bg1">
+                        <a:lumMod val="85000"/>
+                      </a:schemeClr>
+                    </a:solidFill>
+                  </a:tcPr>
+                </a:tc>
+                <a:tc>
+                  <a:txBody>
+                    <a:bodyPr/>
+                    <a:lstStyle/>
+                    <a:p>
+                      <a:r>
+                        <a:rPr lang="es-ES" sz="1300" dirty="0"/>
+                        <a:t>28</a:t>
+                      </a:r>
+                      <a:endParaRPr lang="es-MX" sz="1300" dirty="0"/>
+                    </a:p>
+                  </a:txBody>
+                  <a:tcPr>
+                    <a:lnL w="6350" cap="flat" cmpd="sng" algn="ctr">
+                      <a:solidFill>
+                        <a:schemeClr val="tx1"/>
+                      </a:solidFill>
+                      <a:prstDash val="solid"/>
+                      <a:round/>
+                      <a:headEnd type="none" w="med" len="med"/>
+                      <a:tailEnd type="none" w="med" len="med"/>
+                    </a:lnL>
+                    <a:lnR w="6350" cap="flat" cmpd="sng" algn="ctr">
+                      <a:solidFill>
+                        <a:schemeClr val="tx1"/>
+                      </a:solidFill>
+                      <a:prstDash val="solid"/>
+                      <a:round/>
+                      <a:headEnd type="none" w="med" len="med"/>
+                      <a:tailEnd type="none" w="med" len="med"/>
+                    </a:lnR>
+                    <a:lnT w="6350" cap="flat" cmpd="sng" algn="ctr">
+                      <a:solidFill>
+                        <a:schemeClr val="tx1"/>
+                      </a:solidFill>
+                      <a:prstDash val="solid"/>
+                      <a:round/>
+                      <a:headEnd type="none" w="med" len="med"/>
+                      <a:tailEnd type="none" w="med" len="med"/>
+                    </a:lnT>
+                    <a:lnB w="6350" cap="flat" cmpd="sng" algn="ctr">
+                      <a:solidFill>
+                        <a:schemeClr val="tx1"/>
+                      </a:solidFill>
+                      <a:prstDash val="solid"/>
+                      <a:round/>
+                      <a:headEnd type="none" w="med" len="med"/>
+                      <a:tailEnd type="none" w="med" len="med"/>
+                    </a:lnB>
+                    <a:solidFill>
+                      <a:schemeClr val="bg1">
+                        <a:lumMod val="85000"/>
+                      </a:schemeClr>
+                    </a:solidFill>
+                  </a:tcPr>
+                </a:tc>
+                <a:tc>
+                  <a:txBody>
+                    <a:bodyPr/>
+                    <a:lstStyle/>
+                    <a:p>
+                      <a:r>
+                        <a:rPr lang="es-ES" sz="1300" dirty="0"/>
+                        <a:t>2684</a:t>
+                      </a:r>
+                      <a:endParaRPr lang="es-MX" sz="1300" dirty="0"/>
+                    </a:p>
+                  </a:txBody>
+                  <a:tcPr>
+                    <a:lnL w="6350" cap="flat" cmpd="sng" algn="ctr">
+                      <a:solidFill>
+                        <a:schemeClr val="tx1"/>
+                      </a:solidFill>
+                      <a:prstDash val="solid"/>
+                      <a:round/>
+                      <a:headEnd type="none" w="med" len="med"/>
+                      <a:tailEnd type="none" w="med" len="med"/>
+                    </a:lnL>
+                    <a:lnR w="6350" cap="flat" cmpd="sng" algn="ctr">
+                      <a:solidFill>
+                        <a:schemeClr val="tx1"/>
+                      </a:solidFill>
+                      <a:prstDash val="solid"/>
+                      <a:round/>
+                      <a:headEnd type="none" w="med" len="med"/>
+                      <a:tailEnd type="none" w="med" len="med"/>
+                    </a:lnR>
+                    <a:lnT w="6350" cap="flat" cmpd="sng" algn="ctr">
+                      <a:solidFill>
+                        <a:schemeClr val="tx1"/>
+                      </a:solidFill>
+                      <a:prstDash val="solid"/>
+                      <a:round/>
+                      <a:headEnd type="none" w="med" len="med"/>
+                      <a:tailEnd type="none" w="med" len="med"/>
+                    </a:lnT>
+                    <a:lnB w="6350" cap="flat" cmpd="sng" algn="ctr">
+                      <a:solidFill>
+                        <a:schemeClr val="tx1"/>
+                      </a:solidFill>
+                      <a:prstDash val="solid"/>
+                      <a:round/>
+                      <a:headEnd type="none" w="med" len="med"/>
+                      <a:tailEnd type="none" w="med" len="med"/>
+                    </a:lnB>
+                    <a:solidFill>
+                      <a:schemeClr val="bg1">
+                        <a:lumMod val="85000"/>
+                      </a:schemeClr>
+                    </a:solidFill>
+                  </a:tcPr>
+                </a:tc>
+                <a:tc>
+                  <a:txBody>
+                    <a:bodyPr/>
+                    <a:lstStyle/>
+                    <a:p>
+                      <a:pPr marL="0" marR="0" lvl="0" indent="0" algn="l" defTabSz="914400" rtl="0" eaLnBrk="1" fontAlgn="auto" latinLnBrk="0" hangingPunct="1">
+                        <a:lnSpc>
+                          <a:spcPct val="100000"/>
+                        </a:lnSpc>
+                        <a:spcBef>
+                          <a:spcPts val="0"/>
+                        </a:spcBef>
+                        <a:spcAft>
+                          <a:spcPts val="0"/>
+                        </a:spcAft>
+                        <a:buClr>
+                          <a:srgbClr val="000000"/>
+                        </a:buClr>
+                        <a:buSzTx/>
+                        <a:buFont typeface="Arial"/>
+                        <a:buNone/>
+                        <a:tabLst/>
+                        <a:defRPr/>
+                      </a:pPr>
+                      <a:r>
+                        <a:rPr lang="es-ES" sz="1300" dirty="0"/>
+                        <a:t>Pronóstico sobreestima demasiado el valor real </a:t>
+                      </a:r>
+                      <a:endParaRPr lang="es-MX" sz="1300" dirty="0"/>
+                    </a:p>
+                  </a:txBody>
+                  <a:tcPr>
+                    <a:lnL w="6350" cap="flat" cmpd="sng" algn="ctr">
+                      <a:solidFill>
+                        <a:schemeClr val="tx1"/>
+                      </a:solidFill>
+                      <a:prstDash val="solid"/>
+                      <a:round/>
+                      <a:headEnd type="none" w="med" len="med"/>
+                      <a:tailEnd type="none" w="med" len="med"/>
+                    </a:lnL>
+                    <a:lnR w="6350" cap="flat" cmpd="sng" algn="ctr">
+                      <a:solidFill>
+                        <a:schemeClr val="tx1"/>
+                      </a:solidFill>
+                      <a:prstDash val="solid"/>
+                      <a:round/>
+                      <a:headEnd type="none" w="med" len="med"/>
+                      <a:tailEnd type="none" w="med" len="med"/>
+                    </a:lnR>
+                    <a:lnT w="6350" cap="flat" cmpd="sng" algn="ctr">
+                      <a:solidFill>
+                        <a:schemeClr val="tx1"/>
+                      </a:solidFill>
+                      <a:prstDash val="solid"/>
+                      <a:round/>
+                      <a:headEnd type="none" w="med" len="med"/>
+                      <a:tailEnd type="none" w="med" len="med"/>
+                    </a:lnT>
+                    <a:lnB w="6350" cap="flat" cmpd="sng" algn="ctr">
+                      <a:solidFill>
+                        <a:schemeClr val="tx1"/>
+                      </a:solidFill>
+                      <a:prstDash val="solid"/>
+                      <a:round/>
+                      <a:headEnd type="none" w="med" len="med"/>
+                      <a:tailEnd type="none" w="med" len="med"/>
+                    </a:lnB>
+                    <a:solidFill>
+                      <a:schemeClr val="bg1">
+                        <a:lumMod val="85000"/>
+                      </a:schemeClr>
+                    </a:solidFill>
+                  </a:tcPr>
+                </a:tc>
+                <a:extLst>
+                  <a:ext uri="{0D108BD9-81ED-4DB2-BD59-A6C34878D82A}">
+                    <a16:rowId xmlns:a16="http://schemas.microsoft.com/office/drawing/2014/main" val="2374654446"/>
+                  </a:ext>
+                </a:extLst>
+              </a:tr>
+              <a:tr h="370840">
+                <a:tc>
+                  <a:txBody>
+                    <a:bodyPr/>
+                    <a:lstStyle/>
+                    <a:p>
+                      <a:endParaRPr lang="es-MX" sz="1300" dirty="0"/>
+                    </a:p>
+                  </a:txBody>
+                  <a:tcPr>
+                    <a:lnL w="6350" cap="flat" cmpd="sng" algn="ctr">
+                      <a:solidFill>
+                        <a:schemeClr val="tx1"/>
+                      </a:solidFill>
+                      <a:prstDash val="solid"/>
+                      <a:round/>
+                      <a:headEnd type="none" w="med" len="med"/>
+                      <a:tailEnd type="none" w="med" len="med"/>
+                    </a:lnL>
+                    <a:lnR w="6350" cap="flat" cmpd="sng" algn="ctr">
+                      <a:solidFill>
+                        <a:schemeClr val="tx1"/>
+                      </a:solidFill>
+                      <a:prstDash val="solid"/>
+                      <a:round/>
+                      <a:headEnd type="none" w="med" len="med"/>
+                      <a:tailEnd type="none" w="med" len="med"/>
+                    </a:lnR>
+                    <a:lnT w="6350" cap="flat" cmpd="sng" algn="ctr">
+                      <a:solidFill>
+                        <a:schemeClr val="tx1"/>
+                      </a:solidFill>
+                      <a:prstDash val="solid"/>
+                      <a:round/>
+                      <a:headEnd type="none" w="med" len="med"/>
+                      <a:tailEnd type="none" w="med" len="med"/>
+                    </a:lnT>
+                    <a:lnB w="6350" cap="flat" cmpd="sng" algn="ctr">
+                      <a:solidFill>
+                        <a:schemeClr val="tx1"/>
+                      </a:solidFill>
+                      <a:prstDash val="solid"/>
+                      <a:round/>
+                      <a:headEnd type="none" w="med" len="med"/>
+                      <a:tailEnd type="none" w="med" len="med"/>
+                    </a:lnB>
+                    <a:solidFill>
+                      <a:schemeClr val="bg1">
+                        <a:lumMod val="85000"/>
+                      </a:schemeClr>
+                    </a:solidFill>
+                  </a:tcPr>
+                </a:tc>
+                <a:tc>
+                  <a:txBody>
+                    <a:bodyPr/>
+                    <a:lstStyle/>
+                    <a:p>
+                      <a:endParaRPr lang="es-MX" sz="1300" dirty="0"/>
+                    </a:p>
+                  </a:txBody>
+                  <a:tcPr>
+                    <a:lnL w="6350" cap="flat" cmpd="sng" algn="ctr">
+                      <a:solidFill>
+                        <a:schemeClr val="tx1"/>
+                      </a:solidFill>
+                      <a:prstDash val="solid"/>
+                      <a:round/>
+                      <a:headEnd type="none" w="med" len="med"/>
+                      <a:tailEnd type="none" w="med" len="med"/>
+                    </a:lnL>
+                    <a:lnR w="6350" cap="flat" cmpd="sng" algn="ctr">
+                      <a:solidFill>
+                        <a:schemeClr val="tx1"/>
+                      </a:solidFill>
+                      <a:prstDash val="solid"/>
+                      <a:round/>
+                      <a:headEnd type="none" w="med" len="med"/>
+                      <a:tailEnd type="none" w="med" len="med"/>
+                    </a:lnR>
+                    <a:lnT w="6350" cap="flat" cmpd="sng" algn="ctr">
+                      <a:solidFill>
+                        <a:schemeClr val="tx1"/>
+                      </a:solidFill>
+                      <a:prstDash val="solid"/>
+                      <a:round/>
+                      <a:headEnd type="none" w="med" len="med"/>
+                      <a:tailEnd type="none" w="med" len="med"/>
+                    </a:lnT>
+                    <a:lnB w="6350" cap="flat" cmpd="sng" algn="ctr">
+                      <a:solidFill>
+                        <a:schemeClr val="tx1"/>
+                      </a:solidFill>
+                      <a:prstDash val="solid"/>
+                      <a:round/>
+                      <a:headEnd type="none" w="med" len="med"/>
+                      <a:tailEnd type="none" w="med" len="med"/>
+                    </a:lnB>
+                    <a:solidFill>
+                      <a:schemeClr val="bg1">
+                        <a:lumMod val="85000"/>
+                      </a:schemeClr>
+                    </a:solidFill>
+                  </a:tcPr>
+                </a:tc>
+                <a:tc>
+                  <a:txBody>
+                    <a:bodyPr/>
+                    <a:lstStyle/>
+                    <a:p>
+                      <a:endParaRPr lang="es-MX" sz="1300" dirty="0"/>
+                    </a:p>
+                  </a:txBody>
+                  <a:tcPr>
+                    <a:lnL w="6350" cap="flat" cmpd="sng" algn="ctr">
+                      <a:solidFill>
+                        <a:schemeClr val="tx1"/>
+                      </a:solidFill>
+                      <a:prstDash val="solid"/>
+                      <a:round/>
+                      <a:headEnd type="none" w="med" len="med"/>
+                      <a:tailEnd type="none" w="med" len="med"/>
+                    </a:lnL>
+                    <a:lnR w="6350" cap="flat" cmpd="sng" algn="ctr">
+                      <a:solidFill>
+                        <a:schemeClr val="tx1"/>
+                      </a:solidFill>
+                      <a:prstDash val="solid"/>
+                      <a:round/>
+                      <a:headEnd type="none" w="med" len="med"/>
+                      <a:tailEnd type="none" w="med" len="med"/>
+                    </a:lnR>
+                    <a:lnT w="6350" cap="flat" cmpd="sng" algn="ctr">
+                      <a:solidFill>
+                        <a:schemeClr val="tx1"/>
+                      </a:solidFill>
+                      <a:prstDash val="solid"/>
+                      <a:round/>
+                      <a:headEnd type="none" w="med" len="med"/>
+                      <a:tailEnd type="none" w="med" len="med"/>
+                    </a:lnT>
+                    <a:lnB w="6350" cap="flat" cmpd="sng" algn="ctr">
+                      <a:solidFill>
+                        <a:schemeClr val="tx1"/>
+                      </a:solidFill>
+                      <a:prstDash val="solid"/>
+                      <a:round/>
+                      <a:headEnd type="none" w="med" len="med"/>
+                      <a:tailEnd type="none" w="med" len="med"/>
+                    </a:lnB>
+                    <a:solidFill>
+                      <a:schemeClr val="bg1">
+                        <a:lumMod val="85000"/>
+                      </a:schemeClr>
+                    </a:solidFill>
+                  </a:tcPr>
+                </a:tc>
+                <a:tc>
+                  <a:txBody>
+                    <a:bodyPr/>
+                    <a:lstStyle/>
+                    <a:p>
+                      <a:endParaRPr lang="es-MX" sz="1300" dirty="0"/>
+                    </a:p>
+                  </a:txBody>
+                  <a:tcPr>
+                    <a:lnL w="6350" cap="flat" cmpd="sng" algn="ctr">
+                      <a:solidFill>
+                        <a:schemeClr val="tx1"/>
+                      </a:solidFill>
+                      <a:prstDash val="solid"/>
+                      <a:round/>
+                      <a:headEnd type="none" w="med" len="med"/>
+                      <a:tailEnd type="none" w="med" len="med"/>
+                    </a:lnL>
+                    <a:lnR w="6350" cap="flat" cmpd="sng" algn="ctr">
+                      <a:solidFill>
+                        <a:schemeClr val="tx1"/>
+                      </a:solidFill>
+                      <a:prstDash val="solid"/>
+                      <a:round/>
+                      <a:headEnd type="none" w="med" len="med"/>
+                      <a:tailEnd type="none" w="med" len="med"/>
+                    </a:lnR>
+                    <a:lnT w="6350" cap="flat" cmpd="sng" algn="ctr">
+                      <a:solidFill>
+                        <a:schemeClr val="tx1"/>
+                      </a:solidFill>
+                      <a:prstDash val="solid"/>
+                      <a:round/>
+                      <a:headEnd type="none" w="med" len="med"/>
+                      <a:tailEnd type="none" w="med" len="med"/>
+                    </a:lnT>
+                    <a:lnB w="6350" cap="flat" cmpd="sng" algn="ctr">
+                      <a:solidFill>
+                        <a:schemeClr val="tx1"/>
+                      </a:solidFill>
+                      <a:prstDash val="solid"/>
+                      <a:round/>
+                      <a:headEnd type="none" w="med" len="med"/>
+                      <a:tailEnd type="none" w="med" len="med"/>
+                    </a:lnB>
+                    <a:solidFill>
+                      <a:schemeClr val="bg1">
+                        <a:lumMod val="85000"/>
+                      </a:schemeClr>
+                    </a:solidFill>
+                  </a:tcPr>
+                </a:tc>
+                <a:tc>
+                  <a:txBody>
+                    <a:bodyPr/>
+                    <a:lstStyle/>
+                    <a:p>
+                      <a:endParaRPr lang="es-MX" sz="1300" dirty="0"/>
+                    </a:p>
+                  </a:txBody>
+                  <a:tcPr>
+                    <a:lnL w="6350" cap="flat" cmpd="sng" algn="ctr">
+                      <a:solidFill>
+                        <a:schemeClr val="tx1"/>
+                      </a:solidFill>
+                      <a:prstDash val="solid"/>
+                      <a:round/>
+                      <a:headEnd type="none" w="med" len="med"/>
+                      <a:tailEnd type="none" w="med" len="med"/>
+                    </a:lnL>
+                    <a:lnR w="6350" cap="flat" cmpd="sng" algn="ctr">
+                      <a:solidFill>
+                        <a:schemeClr val="tx1"/>
+                      </a:solidFill>
+                      <a:prstDash val="solid"/>
+                      <a:round/>
+                      <a:headEnd type="none" w="med" len="med"/>
+                      <a:tailEnd type="none" w="med" len="med"/>
+                    </a:lnR>
+                    <a:lnT w="6350" cap="flat" cmpd="sng" algn="ctr">
+                      <a:solidFill>
+                        <a:schemeClr val="tx1"/>
+                      </a:solidFill>
+                      <a:prstDash val="solid"/>
+                      <a:round/>
+                      <a:headEnd type="none" w="med" len="med"/>
+                      <a:tailEnd type="none" w="med" len="med"/>
+                    </a:lnT>
+                    <a:lnB w="6350" cap="flat" cmpd="sng" algn="ctr">
+                      <a:solidFill>
+                        <a:schemeClr val="tx1"/>
+                      </a:solidFill>
+                      <a:prstDash val="solid"/>
+                      <a:round/>
+                      <a:headEnd type="none" w="med" len="med"/>
+                      <a:tailEnd type="none" w="med" len="med"/>
+                    </a:lnB>
+                    <a:solidFill>
+                      <a:schemeClr val="bg1">
+                        <a:lumMod val="85000"/>
+                      </a:schemeClr>
+                    </a:solidFill>
+                  </a:tcPr>
+                </a:tc>
+                <a:tc>
+                  <a:txBody>
+                    <a:bodyPr/>
+                    <a:lstStyle/>
+                    <a:p>
+                      <a:endParaRPr lang="es-MX" sz="1300" dirty="0"/>
+                    </a:p>
+                  </a:txBody>
+                  <a:tcPr>
+                    <a:lnL w="6350" cap="flat" cmpd="sng" algn="ctr">
+                      <a:solidFill>
+                        <a:schemeClr val="tx1"/>
+                      </a:solidFill>
+                      <a:prstDash val="solid"/>
+                      <a:round/>
+                      <a:headEnd type="none" w="med" len="med"/>
+                      <a:tailEnd type="none" w="med" len="med"/>
+                    </a:lnL>
+                    <a:lnR w="6350" cap="flat" cmpd="sng" algn="ctr">
+                      <a:solidFill>
+                        <a:schemeClr val="tx1"/>
+                      </a:solidFill>
+                      <a:prstDash val="solid"/>
+                      <a:round/>
+                      <a:headEnd type="none" w="med" len="med"/>
+                      <a:tailEnd type="none" w="med" len="med"/>
+                    </a:lnR>
+                    <a:lnT w="6350" cap="flat" cmpd="sng" algn="ctr">
+                      <a:solidFill>
+                        <a:schemeClr val="tx1"/>
+                      </a:solidFill>
+                      <a:prstDash val="solid"/>
+                      <a:round/>
+                      <a:headEnd type="none" w="med" len="med"/>
+                      <a:tailEnd type="none" w="med" len="med"/>
+                    </a:lnT>
+                    <a:lnB w="6350" cap="flat" cmpd="sng" algn="ctr">
+                      <a:solidFill>
+                        <a:schemeClr val="tx1"/>
+                      </a:solidFill>
+                      <a:prstDash val="solid"/>
+                      <a:round/>
+                      <a:headEnd type="none" w="med" len="med"/>
+                      <a:tailEnd type="none" w="med" len="med"/>
+                    </a:lnB>
+                    <a:solidFill>
+                      <a:schemeClr val="bg1">
+                        <a:lumMod val="85000"/>
+                      </a:schemeClr>
+                    </a:solidFill>
+                  </a:tcPr>
+                </a:tc>
+                <a:tc>
+                  <a:txBody>
+                    <a:bodyPr/>
+                    <a:lstStyle/>
+                    <a:p>
+                      <a:endParaRPr lang="es-MX" sz="1300" dirty="0"/>
+                    </a:p>
+                  </a:txBody>
+                  <a:tcPr>
+                    <a:lnL w="6350" cap="flat" cmpd="sng" algn="ctr">
+                      <a:solidFill>
+                        <a:schemeClr val="tx1"/>
+                      </a:solidFill>
+                      <a:prstDash val="solid"/>
+                      <a:round/>
+                      <a:headEnd type="none" w="med" len="med"/>
+                      <a:tailEnd type="none" w="med" len="med"/>
+                    </a:lnL>
+                    <a:lnR w="6350" cap="flat" cmpd="sng" algn="ctr">
+                      <a:solidFill>
+                        <a:schemeClr val="tx1"/>
+                      </a:solidFill>
+                      <a:prstDash val="solid"/>
+                      <a:round/>
+                      <a:headEnd type="none" w="med" len="med"/>
+                      <a:tailEnd type="none" w="med" len="med"/>
+                    </a:lnR>
+                    <a:lnT w="6350" cap="flat" cmpd="sng" algn="ctr">
+                      <a:solidFill>
+                        <a:schemeClr val="tx1"/>
+                      </a:solidFill>
+                      <a:prstDash val="solid"/>
+                      <a:round/>
+                      <a:headEnd type="none" w="med" len="med"/>
+                      <a:tailEnd type="none" w="med" len="med"/>
+                    </a:lnT>
+                    <a:lnB w="6350" cap="flat" cmpd="sng" algn="ctr">
+                      <a:solidFill>
+                        <a:schemeClr val="tx1"/>
+                      </a:solidFill>
+                      <a:prstDash val="solid"/>
+                      <a:round/>
+                      <a:headEnd type="none" w="med" len="med"/>
+                      <a:tailEnd type="none" w="med" len="med"/>
+                    </a:lnB>
+                    <a:solidFill>
+                      <a:schemeClr val="bg1">
+                        <a:lumMod val="85000"/>
+                      </a:schemeClr>
+                    </a:solidFill>
+                  </a:tcPr>
+                </a:tc>
+                <a:extLst>
+                  <a:ext uri="{0D108BD9-81ED-4DB2-BD59-A6C34878D82A}">
+                    <a16:rowId xmlns:a16="http://schemas.microsoft.com/office/drawing/2014/main" val="215204710"/>
+                  </a:ext>
+                </a:extLst>
+              </a:tr>
+              <a:tr h="370840">
+                <a:tc>
+                  <a:txBody>
+                    <a:bodyPr/>
+                    <a:lstStyle/>
+                    <a:p>
+                      <a:endParaRPr lang="es-MX" sz="1300" dirty="0"/>
+                    </a:p>
+                  </a:txBody>
+                  <a:tcPr>
+                    <a:lnL w="6350" cap="flat" cmpd="sng" algn="ctr">
+                      <a:solidFill>
+                        <a:schemeClr val="tx1"/>
+                      </a:solidFill>
+                      <a:prstDash val="solid"/>
+                      <a:round/>
+                      <a:headEnd type="none" w="med" len="med"/>
+                      <a:tailEnd type="none" w="med" len="med"/>
+                    </a:lnL>
+                    <a:lnR w="6350" cap="flat" cmpd="sng" algn="ctr">
+                      <a:solidFill>
+                        <a:schemeClr val="tx1"/>
+                      </a:solidFill>
+                      <a:prstDash val="solid"/>
+                      <a:round/>
+                      <a:headEnd type="none" w="med" len="med"/>
+                      <a:tailEnd type="none" w="med" len="med"/>
+                    </a:lnR>
+                    <a:lnT w="6350" cap="flat" cmpd="sng" algn="ctr">
+                      <a:solidFill>
+                        <a:schemeClr val="tx1"/>
+                      </a:solidFill>
+                      <a:prstDash val="solid"/>
+                      <a:round/>
+                      <a:headEnd type="none" w="med" len="med"/>
+                      <a:tailEnd type="none" w="med" len="med"/>
+                    </a:lnT>
+                    <a:lnB w="6350" cap="flat" cmpd="sng" algn="ctr">
+                      <a:solidFill>
+                        <a:schemeClr val="tx1"/>
+                      </a:solidFill>
+                      <a:prstDash val="solid"/>
+                      <a:round/>
+                      <a:headEnd type="none" w="med" len="med"/>
+                      <a:tailEnd type="none" w="med" len="med"/>
+                    </a:lnB>
+                    <a:solidFill>
+                      <a:schemeClr val="bg1">
+                        <a:lumMod val="85000"/>
+                      </a:schemeClr>
+                    </a:solidFill>
+                  </a:tcPr>
+                </a:tc>
+                <a:tc>
+                  <a:txBody>
+                    <a:bodyPr/>
+                    <a:lstStyle/>
+                    <a:p>
+                      <a:endParaRPr lang="es-MX" sz="1300" dirty="0"/>
+                    </a:p>
+                  </a:txBody>
+                  <a:tcPr>
+                    <a:lnL w="6350" cap="flat" cmpd="sng" algn="ctr">
+                      <a:solidFill>
+                        <a:schemeClr val="tx1"/>
+                      </a:solidFill>
+                      <a:prstDash val="solid"/>
+                      <a:round/>
+                      <a:headEnd type="none" w="med" len="med"/>
+                      <a:tailEnd type="none" w="med" len="med"/>
+                    </a:lnL>
+                    <a:lnR w="6350" cap="flat" cmpd="sng" algn="ctr">
+                      <a:solidFill>
+                        <a:schemeClr val="tx1"/>
+                      </a:solidFill>
+                      <a:prstDash val="solid"/>
+                      <a:round/>
+                      <a:headEnd type="none" w="med" len="med"/>
+                      <a:tailEnd type="none" w="med" len="med"/>
+                    </a:lnR>
+                    <a:lnT w="6350" cap="flat" cmpd="sng" algn="ctr">
+                      <a:solidFill>
+                        <a:schemeClr val="tx1"/>
+                      </a:solidFill>
+                      <a:prstDash val="solid"/>
+                      <a:round/>
+                      <a:headEnd type="none" w="med" len="med"/>
+                      <a:tailEnd type="none" w="med" len="med"/>
+                    </a:lnT>
+                    <a:lnB w="6350" cap="flat" cmpd="sng" algn="ctr">
+                      <a:solidFill>
+                        <a:schemeClr val="tx1"/>
+                      </a:solidFill>
+                      <a:prstDash val="solid"/>
+                      <a:round/>
+                      <a:headEnd type="none" w="med" len="med"/>
+                      <a:tailEnd type="none" w="med" len="med"/>
+                    </a:lnB>
+                    <a:solidFill>
+                      <a:schemeClr val="bg1">
+                        <a:lumMod val="85000"/>
+                      </a:schemeClr>
+                    </a:solidFill>
+                  </a:tcPr>
+                </a:tc>
+                <a:tc>
+                  <a:txBody>
+                    <a:bodyPr/>
+                    <a:lstStyle/>
+                    <a:p>
+                      <a:endParaRPr lang="es-MX" sz="1300" dirty="0"/>
+                    </a:p>
+                  </a:txBody>
+                  <a:tcPr>
+                    <a:lnL w="6350" cap="flat" cmpd="sng" algn="ctr">
+                      <a:solidFill>
+                        <a:schemeClr val="tx1"/>
+                      </a:solidFill>
+                      <a:prstDash val="solid"/>
+                      <a:round/>
+                      <a:headEnd type="none" w="med" len="med"/>
+                      <a:tailEnd type="none" w="med" len="med"/>
+                    </a:lnL>
+                    <a:lnR w="6350" cap="flat" cmpd="sng" algn="ctr">
+                      <a:solidFill>
+                        <a:schemeClr val="tx1"/>
+                      </a:solidFill>
+                      <a:prstDash val="solid"/>
+                      <a:round/>
+                      <a:headEnd type="none" w="med" len="med"/>
+                      <a:tailEnd type="none" w="med" len="med"/>
+                    </a:lnR>
+                    <a:lnT w="6350" cap="flat" cmpd="sng" algn="ctr">
+                      <a:solidFill>
+                        <a:schemeClr val="tx1"/>
+                      </a:solidFill>
+                      <a:prstDash val="solid"/>
+                      <a:round/>
+                      <a:headEnd type="none" w="med" len="med"/>
+                      <a:tailEnd type="none" w="med" len="med"/>
+                    </a:lnT>
+                    <a:lnB w="6350" cap="flat" cmpd="sng" algn="ctr">
+                      <a:solidFill>
+                        <a:schemeClr val="tx1"/>
+                      </a:solidFill>
+                      <a:prstDash val="solid"/>
+                      <a:round/>
+                      <a:headEnd type="none" w="med" len="med"/>
+                      <a:tailEnd type="none" w="med" len="med"/>
+                    </a:lnB>
+                    <a:solidFill>
+                      <a:schemeClr val="bg1">
+                        <a:lumMod val="85000"/>
+                      </a:schemeClr>
+                    </a:solidFill>
+                  </a:tcPr>
+                </a:tc>
+                <a:tc>
+                  <a:txBody>
+                    <a:bodyPr/>
+                    <a:lstStyle/>
+                    <a:p>
+                      <a:endParaRPr lang="es-MX" sz="1300" dirty="0"/>
+                    </a:p>
+                  </a:txBody>
+                  <a:tcPr>
+                    <a:lnL w="6350" cap="flat" cmpd="sng" algn="ctr">
+                      <a:solidFill>
+                        <a:schemeClr val="tx1"/>
+                      </a:solidFill>
+                      <a:prstDash val="solid"/>
+                      <a:round/>
+                      <a:headEnd type="none" w="med" len="med"/>
+                      <a:tailEnd type="none" w="med" len="med"/>
+                    </a:lnL>
+                    <a:lnR w="6350" cap="flat" cmpd="sng" algn="ctr">
+                      <a:solidFill>
+                        <a:schemeClr val="tx1"/>
+                      </a:solidFill>
+                      <a:prstDash val="solid"/>
+                      <a:round/>
+                      <a:headEnd type="none" w="med" len="med"/>
+                      <a:tailEnd type="none" w="med" len="med"/>
+                    </a:lnR>
+                    <a:lnT w="6350" cap="flat" cmpd="sng" algn="ctr">
+                      <a:solidFill>
+                        <a:schemeClr val="tx1"/>
+                      </a:solidFill>
+                      <a:prstDash val="solid"/>
+                      <a:round/>
+                      <a:headEnd type="none" w="med" len="med"/>
+                      <a:tailEnd type="none" w="med" len="med"/>
+                    </a:lnT>
+                    <a:lnB w="6350" cap="flat" cmpd="sng" algn="ctr">
+                      <a:solidFill>
+                        <a:schemeClr val="tx1"/>
+                      </a:solidFill>
+                      <a:prstDash val="solid"/>
+                      <a:round/>
+                      <a:headEnd type="none" w="med" len="med"/>
+                      <a:tailEnd type="none" w="med" len="med"/>
+                    </a:lnB>
+                    <a:solidFill>
+                      <a:schemeClr val="bg1">
+                        <a:lumMod val="85000"/>
+                      </a:schemeClr>
+                    </a:solidFill>
+                  </a:tcPr>
+                </a:tc>
+                <a:tc>
+                  <a:txBody>
+                    <a:bodyPr/>
+                    <a:lstStyle/>
+                    <a:p>
+                      <a:endParaRPr lang="es-MX" sz="1300" dirty="0"/>
+                    </a:p>
+                  </a:txBody>
+                  <a:tcPr>
+                    <a:lnL w="6350" cap="flat" cmpd="sng" algn="ctr">
+                      <a:solidFill>
+                        <a:schemeClr val="tx1"/>
+                      </a:solidFill>
+                      <a:prstDash val="solid"/>
+                      <a:round/>
+                      <a:headEnd type="none" w="med" len="med"/>
+                      <a:tailEnd type="none" w="med" len="med"/>
+                    </a:lnL>
+                    <a:lnR w="6350" cap="flat" cmpd="sng" algn="ctr">
+                      <a:solidFill>
+                        <a:schemeClr val="tx1"/>
+                      </a:solidFill>
+                      <a:prstDash val="solid"/>
+                      <a:round/>
+                      <a:headEnd type="none" w="med" len="med"/>
+                      <a:tailEnd type="none" w="med" len="med"/>
+                    </a:lnR>
+                    <a:lnT w="6350" cap="flat" cmpd="sng" algn="ctr">
+                      <a:solidFill>
+                        <a:schemeClr val="tx1"/>
+                      </a:solidFill>
+                      <a:prstDash val="solid"/>
+                      <a:round/>
+                      <a:headEnd type="none" w="med" len="med"/>
+                      <a:tailEnd type="none" w="med" len="med"/>
+                    </a:lnT>
+                    <a:lnB w="6350" cap="flat" cmpd="sng" algn="ctr">
+                      <a:solidFill>
+                        <a:schemeClr val="tx1"/>
+                      </a:solidFill>
+                      <a:prstDash val="solid"/>
+                      <a:round/>
+                      <a:headEnd type="none" w="med" len="med"/>
+                      <a:tailEnd type="none" w="med" len="med"/>
+                    </a:lnB>
+                    <a:solidFill>
+                      <a:schemeClr val="bg1">
+                        <a:lumMod val="85000"/>
+                      </a:schemeClr>
+                    </a:solidFill>
+                  </a:tcPr>
+                </a:tc>
+                <a:tc>
+                  <a:txBody>
+                    <a:bodyPr/>
+                    <a:lstStyle/>
+                    <a:p>
+                      <a:endParaRPr lang="es-MX" sz="1300" dirty="0"/>
+                    </a:p>
+                  </a:txBody>
+                  <a:tcPr>
+                    <a:lnL w="6350" cap="flat" cmpd="sng" algn="ctr">
+                      <a:solidFill>
+                        <a:schemeClr val="tx1"/>
+                      </a:solidFill>
+                      <a:prstDash val="solid"/>
+                      <a:round/>
+                      <a:headEnd type="none" w="med" len="med"/>
+                      <a:tailEnd type="none" w="med" len="med"/>
+                    </a:lnL>
+                    <a:lnR w="6350" cap="flat" cmpd="sng" algn="ctr">
+                      <a:solidFill>
+                        <a:schemeClr val="tx1"/>
+                      </a:solidFill>
+                      <a:prstDash val="solid"/>
+                      <a:round/>
+                      <a:headEnd type="none" w="med" len="med"/>
+                      <a:tailEnd type="none" w="med" len="med"/>
+                    </a:lnR>
+                    <a:lnT w="6350" cap="flat" cmpd="sng" algn="ctr">
+                      <a:solidFill>
+                        <a:schemeClr val="tx1"/>
+                      </a:solidFill>
+                      <a:prstDash val="solid"/>
+                      <a:round/>
+                      <a:headEnd type="none" w="med" len="med"/>
+                      <a:tailEnd type="none" w="med" len="med"/>
+                    </a:lnT>
+                    <a:lnB w="6350" cap="flat" cmpd="sng" algn="ctr">
+                      <a:solidFill>
+                        <a:schemeClr val="tx1"/>
+                      </a:solidFill>
+                      <a:prstDash val="solid"/>
+                      <a:round/>
+                      <a:headEnd type="none" w="med" len="med"/>
+                      <a:tailEnd type="none" w="med" len="med"/>
+                    </a:lnB>
+                    <a:solidFill>
+                      <a:schemeClr val="bg1">
+                        <a:lumMod val="85000"/>
+                      </a:schemeClr>
+                    </a:solidFill>
+                  </a:tcPr>
+                </a:tc>
+                <a:tc>
+                  <a:txBody>
+                    <a:bodyPr/>
+                    <a:lstStyle/>
+                    <a:p>
+                      <a:endParaRPr lang="es-MX" dirty="0"/>
+                    </a:p>
+                  </a:txBody>
+                  <a:tcPr>
+                    <a:lnL w="6350" cap="flat" cmpd="sng" algn="ctr">
+                      <a:solidFill>
+                        <a:schemeClr val="tx1"/>
+                      </a:solidFill>
+                      <a:prstDash val="solid"/>
+                      <a:round/>
+                      <a:headEnd type="none" w="med" len="med"/>
+                      <a:tailEnd type="none" w="med" len="med"/>
+                    </a:lnL>
+                    <a:lnR w="6350" cap="flat" cmpd="sng" algn="ctr">
+                      <a:solidFill>
+                        <a:schemeClr val="tx1"/>
+                      </a:solidFill>
+                      <a:prstDash val="solid"/>
+                      <a:round/>
+                      <a:headEnd type="none" w="med" len="med"/>
+                      <a:tailEnd type="none" w="med" len="med"/>
+                    </a:lnR>
+                    <a:lnT w="6350" cap="flat" cmpd="sng" algn="ctr">
+                      <a:solidFill>
+                        <a:schemeClr val="tx1"/>
+                      </a:solidFill>
+                      <a:prstDash val="solid"/>
+                      <a:round/>
+                      <a:headEnd type="none" w="med" len="med"/>
+                      <a:tailEnd type="none" w="med" len="med"/>
+                    </a:lnT>
+                    <a:lnB w="6350" cap="flat" cmpd="sng" algn="ctr">
+                      <a:solidFill>
+                        <a:schemeClr val="tx1"/>
+                      </a:solidFill>
+                      <a:prstDash val="solid"/>
+                      <a:round/>
+                      <a:headEnd type="none" w="med" len="med"/>
+                      <a:tailEnd type="none" w="med" len="med"/>
+                    </a:lnB>
+                    <a:solidFill>
+                      <a:schemeClr val="bg1">
+                        <a:lumMod val="85000"/>
+                      </a:schemeClr>
+                    </a:solidFill>
+                  </a:tcPr>
+                </a:tc>
+                <a:extLst>
+                  <a:ext uri="{0D108BD9-81ED-4DB2-BD59-A6C34878D82A}">
+                    <a16:rowId xmlns:a16="http://schemas.microsoft.com/office/drawing/2014/main" val="649816840"/>
+                  </a:ext>
+                </a:extLst>
+              </a:tr>
+              <a:tr h="370840">
+                <a:tc>
+                  <a:txBody>
+                    <a:bodyPr/>
+                    <a:lstStyle/>
+                    <a:p>
+                      <a:endParaRPr lang="es-MX" sz="1300" dirty="0"/>
+                    </a:p>
+                  </a:txBody>
+                  <a:tcPr>
+                    <a:lnL w="6350" cap="flat" cmpd="sng" algn="ctr">
+                      <a:solidFill>
+                        <a:schemeClr val="tx1"/>
+                      </a:solidFill>
+                      <a:prstDash val="solid"/>
+                      <a:round/>
+                      <a:headEnd type="none" w="med" len="med"/>
+                      <a:tailEnd type="none" w="med" len="med"/>
+                    </a:lnL>
+                    <a:lnR w="6350" cap="flat" cmpd="sng" algn="ctr">
+                      <a:solidFill>
+                        <a:schemeClr val="tx1"/>
+                      </a:solidFill>
+                      <a:prstDash val="solid"/>
+                      <a:round/>
+                      <a:headEnd type="none" w="med" len="med"/>
+                      <a:tailEnd type="none" w="med" len="med"/>
+                    </a:lnR>
+                    <a:lnT w="6350" cap="flat" cmpd="sng" algn="ctr">
+                      <a:solidFill>
+                        <a:schemeClr val="tx1"/>
+                      </a:solidFill>
+                      <a:prstDash val="solid"/>
+                      <a:round/>
+                      <a:headEnd type="none" w="med" len="med"/>
+                      <a:tailEnd type="none" w="med" len="med"/>
+                    </a:lnT>
+                    <a:lnB w="6350" cap="flat" cmpd="sng" algn="ctr">
+                      <a:solidFill>
+                        <a:schemeClr val="tx1"/>
+                      </a:solidFill>
+                      <a:prstDash val="solid"/>
+                      <a:round/>
+                      <a:headEnd type="none" w="med" len="med"/>
+                      <a:tailEnd type="none" w="med" len="med"/>
+                    </a:lnB>
+                    <a:solidFill>
+                      <a:schemeClr val="bg1">
+                        <a:lumMod val="85000"/>
+                      </a:schemeClr>
+                    </a:solidFill>
+                  </a:tcPr>
+                </a:tc>
+                <a:tc>
+                  <a:txBody>
+                    <a:bodyPr/>
+                    <a:lstStyle/>
+                    <a:p>
+                      <a:endParaRPr lang="es-MX" sz="1300" dirty="0"/>
+                    </a:p>
+                  </a:txBody>
+                  <a:tcPr>
+                    <a:lnL w="6350" cap="flat" cmpd="sng" algn="ctr">
+                      <a:solidFill>
+                        <a:schemeClr val="tx1"/>
+                      </a:solidFill>
+                      <a:prstDash val="solid"/>
+                      <a:round/>
+                      <a:headEnd type="none" w="med" len="med"/>
+                      <a:tailEnd type="none" w="med" len="med"/>
+                    </a:lnL>
+                    <a:lnR w="6350" cap="flat" cmpd="sng" algn="ctr">
+                      <a:solidFill>
+                        <a:schemeClr val="tx1"/>
+                      </a:solidFill>
+                      <a:prstDash val="solid"/>
+                      <a:round/>
+                      <a:headEnd type="none" w="med" len="med"/>
+                      <a:tailEnd type="none" w="med" len="med"/>
+                    </a:lnR>
+                    <a:lnT w="6350" cap="flat" cmpd="sng" algn="ctr">
+                      <a:solidFill>
+                        <a:schemeClr val="tx1"/>
+                      </a:solidFill>
+                      <a:prstDash val="solid"/>
+                      <a:round/>
+                      <a:headEnd type="none" w="med" len="med"/>
+                      <a:tailEnd type="none" w="med" len="med"/>
+                    </a:lnT>
+                    <a:lnB w="6350" cap="flat" cmpd="sng" algn="ctr">
+                      <a:solidFill>
+                        <a:schemeClr val="tx1"/>
+                      </a:solidFill>
+                      <a:prstDash val="solid"/>
+                      <a:round/>
+                      <a:headEnd type="none" w="med" len="med"/>
+                      <a:tailEnd type="none" w="med" len="med"/>
+                    </a:lnB>
+                    <a:solidFill>
+                      <a:schemeClr val="bg1">
+                        <a:lumMod val="85000"/>
+                      </a:schemeClr>
+                    </a:solidFill>
+                  </a:tcPr>
+                </a:tc>
+                <a:tc>
+                  <a:txBody>
+                    <a:bodyPr/>
+                    <a:lstStyle/>
+                    <a:p>
+                      <a:endParaRPr lang="es-MX" sz="1300" dirty="0"/>
+                    </a:p>
+                  </a:txBody>
+                  <a:tcPr>
+                    <a:lnL w="6350" cap="flat" cmpd="sng" algn="ctr">
+                      <a:solidFill>
+                        <a:schemeClr val="tx1"/>
+                      </a:solidFill>
+                      <a:prstDash val="solid"/>
+                      <a:round/>
+                      <a:headEnd type="none" w="med" len="med"/>
+                      <a:tailEnd type="none" w="med" len="med"/>
+                    </a:lnL>
+                    <a:lnR w="6350" cap="flat" cmpd="sng" algn="ctr">
+                      <a:solidFill>
+                        <a:schemeClr val="tx1"/>
+                      </a:solidFill>
+                      <a:prstDash val="solid"/>
+                      <a:round/>
+                      <a:headEnd type="none" w="med" len="med"/>
+                      <a:tailEnd type="none" w="med" len="med"/>
+                    </a:lnR>
+                    <a:lnT w="6350" cap="flat" cmpd="sng" algn="ctr">
+                      <a:solidFill>
+                        <a:schemeClr val="tx1"/>
+                      </a:solidFill>
+                      <a:prstDash val="solid"/>
+                      <a:round/>
+                      <a:headEnd type="none" w="med" len="med"/>
+                      <a:tailEnd type="none" w="med" len="med"/>
+                    </a:lnT>
+                    <a:lnB w="6350" cap="flat" cmpd="sng" algn="ctr">
+                      <a:solidFill>
+                        <a:schemeClr val="tx1"/>
+                      </a:solidFill>
+                      <a:prstDash val="solid"/>
+                      <a:round/>
+                      <a:headEnd type="none" w="med" len="med"/>
+                      <a:tailEnd type="none" w="med" len="med"/>
+                    </a:lnB>
+                    <a:solidFill>
+                      <a:schemeClr val="bg1">
+                        <a:lumMod val="85000"/>
+                      </a:schemeClr>
+                    </a:solidFill>
+                  </a:tcPr>
+                </a:tc>
+                <a:tc>
+                  <a:txBody>
+                    <a:bodyPr/>
+                    <a:lstStyle/>
+                    <a:p>
+                      <a:endParaRPr lang="es-MX" sz="1300" dirty="0"/>
+                    </a:p>
+                  </a:txBody>
+                  <a:tcPr>
+                    <a:lnL w="6350" cap="flat" cmpd="sng" algn="ctr">
+                      <a:solidFill>
+                        <a:schemeClr val="tx1"/>
+                      </a:solidFill>
+                      <a:prstDash val="solid"/>
+                      <a:round/>
+                      <a:headEnd type="none" w="med" len="med"/>
+                      <a:tailEnd type="none" w="med" len="med"/>
+                    </a:lnL>
+                    <a:lnR w="6350" cap="flat" cmpd="sng" algn="ctr">
+                      <a:solidFill>
+                        <a:schemeClr val="tx1"/>
+                      </a:solidFill>
+                      <a:prstDash val="solid"/>
+                      <a:round/>
+                      <a:headEnd type="none" w="med" len="med"/>
+                      <a:tailEnd type="none" w="med" len="med"/>
+                    </a:lnR>
+                    <a:lnT w="6350" cap="flat" cmpd="sng" algn="ctr">
+                      <a:solidFill>
+                        <a:schemeClr val="tx1"/>
+                      </a:solidFill>
+                      <a:prstDash val="solid"/>
+                      <a:round/>
+                      <a:headEnd type="none" w="med" len="med"/>
+                      <a:tailEnd type="none" w="med" len="med"/>
+                    </a:lnT>
+                    <a:lnB w="6350" cap="flat" cmpd="sng" algn="ctr">
+                      <a:solidFill>
+                        <a:schemeClr val="tx1"/>
+                      </a:solidFill>
+                      <a:prstDash val="solid"/>
+                      <a:round/>
+                      <a:headEnd type="none" w="med" len="med"/>
+                      <a:tailEnd type="none" w="med" len="med"/>
+                    </a:lnB>
+                    <a:solidFill>
+                      <a:schemeClr val="bg1">
+                        <a:lumMod val="85000"/>
+                      </a:schemeClr>
+                    </a:solidFill>
+                  </a:tcPr>
+                </a:tc>
+                <a:tc>
+                  <a:txBody>
+                    <a:bodyPr/>
+                    <a:lstStyle/>
+                    <a:p>
+                      <a:endParaRPr lang="es-MX" sz="1300" dirty="0"/>
+                    </a:p>
+                  </a:txBody>
+                  <a:tcPr>
+                    <a:lnL w="6350" cap="flat" cmpd="sng" algn="ctr">
+                      <a:solidFill>
+                        <a:schemeClr val="tx1"/>
+                      </a:solidFill>
+                      <a:prstDash val="solid"/>
+                      <a:round/>
+                      <a:headEnd type="none" w="med" len="med"/>
+                      <a:tailEnd type="none" w="med" len="med"/>
+                    </a:lnL>
+                    <a:lnR w="6350" cap="flat" cmpd="sng" algn="ctr">
+                      <a:solidFill>
+                        <a:schemeClr val="tx1"/>
+                      </a:solidFill>
+                      <a:prstDash val="solid"/>
+                      <a:round/>
+                      <a:headEnd type="none" w="med" len="med"/>
+                      <a:tailEnd type="none" w="med" len="med"/>
+                    </a:lnR>
+                    <a:lnT w="6350" cap="flat" cmpd="sng" algn="ctr">
+                      <a:solidFill>
+                        <a:schemeClr val="tx1"/>
+                      </a:solidFill>
+                      <a:prstDash val="solid"/>
+                      <a:round/>
+                      <a:headEnd type="none" w="med" len="med"/>
+                      <a:tailEnd type="none" w="med" len="med"/>
+                    </a:lnT>
+                    <a:lnB w="6350" cap="flat" cmpd="sng" algn="ctr">
+                      <a:solidFill>
+                        <a:schemeClr val="tx1"/>
+                      </a:solidFill>
+                      <a:prstDash val="solid"/>
+                      <a:round/>
+                      <a:headEnd type="none" w="med" len="med"/>
+                      <a:tailEnd type="none" w="med" len="med"/>
+                    </a:lnB>
+                    <a:solidFill>
+                      <a:schemeClr val="bg1">
+                        <a:lumMod val="85000"/>
+                      </a:schemeClr>
+                    </a:solidFill>
+                  </a:tcPr>
+                </a:tc>
+                <a:tc>
+                  <a:txBody>
+                    <a:bodyPr/>
+                    <a:lstStyle/>
+                    <a:p>
+                      <a:endParaRPr lang="es-MX" sz="1300" dirty="0"/>
+                    </a:p>
+                  </a:txBody>
+                  <a:tcPr>
+                    <a:lnL w="6350" cap="flat" cmpd="sng" algn="ctr">
+                      <a:solidFill>
+                        <a:schemeClr val="tx1"/>
+                      </a:solidFill>
+                      <a:prstDash val="solid"/>
+                      <a:round/>
+                      <a:headEnd type="none" w="med" len="med"/>
+                      <a:tailEnd type="none" w="med" len="med"/>
+                    </a:lnL>
+                    <a:lnR w="6350" cap="flat" cmpd="sng" algn="ctr">
+                      <a:solidFill>
+                        <a:schemeClr val="tx1"/>
+                      </a:solidFill>
+                      <a:prstDash val="solid"/>
+                      <a:round/>
+                      <a:headEnd type="none" w="med" len="med"/>
+                      <a:tailEnd type="none" w="med" len="med"/>
+                    </a:lnR>
+                    <a:lnT w="6350" cap="flat" cmpd="sng" algn="ctr">
+                      <a:solidFill>
+                        <a:schemeClr val="tx1"/>
+                      </a:solidFill>
+                      <a:prstDash val="solid"/>
+                      <a:round/>
+                      <a:headEnd type="none" w="med" len="med"/>
+                      <a:tailEnd type="none" w="med" len="med"/>
+                    </a:lnT>
+                    <a:lnB w="6350" cap="flat" cmpd="sng" algn="ctr">
+                      <a:solidFill>
+                        <a:schemeClr val="tx1"/>
+                      </a:solidFill>
+                      <a:prstDash val="solid"/>
+                      <a:round/>
+                      <a:headEnd type="none" w="med" len="med"/>
+                      <a:tailEnd type="none" w="med" len="med"/>
+                    </a:lnB>
+                    <a:solidFill>
+                      <a:schemeClr val="bg1">
+                        <a:lumMod val="85000"/>
+                      </a:schemeClr>
+                    </a:solidFill>
+                  </a:tcPr>
+                </a:tc>
+                <a:tc>
+                  <a:txBody>
+                    <a:bodyPr/>
+                    <a:lstStyle/>
+                    <a:p>
+                      <a:pPr marL="0" marR="0" lvl="0" indent="0" algn="l" defTabSz="914400" rtl="0" eaLnBrk="1" fontAlgn="auto" latinLnBrk="0" hangingPunct="1">
+                        <a:lnSpc>
+                          <a:spcPct val="100000"/>
+                        </a:lnSpc>
+                        <a:spcBef>
+                          <a:spcPts val="0"/>
+                        </a:spcBef>
+                        <a:spcAft>
+                          <a:spcPts val="0"/>
+                        </a:spcAft>
+                        <a:buClr>
+                          <a:srgbClr val="000000"/>
+                        </a:buClr>
+                        <a:buSzTx/>
+                        <a:buFont typeface="Arial"/>
+                        <a:buNone/>
+                        <a:tabLst/>
+                        <a:defRPr/>
+                      </a:pPr>
+                      <a:endParaRPr lang="es-MX" sz="1400" dirty="0"/>
+                    </a:p>
+                  </a:txBody>
+                  <a:tcPr>
+                    <a:lnL w="6350" cap="flat" cmpd="sng" algn="ctr">
+                      <a:solidFill>
+                        <a:schemeClr val="tx1"/>
+                      </a:solidFill>
+                      <a:prstDash val="solid"/>
+                      <a:round/>
+                      <a:headEnd type="none" w="med" len="med"/>
+                      <a:tailEnd type="none" w="med" len="med"/>
+                    </a:lnL>
+                    <a:lnR w="6350" cap="flat" cmpd="sng" algn="ctr">
+                      <a:solidFill>
+                        <a:schemeClr val="tx1"/>
+                      </a:solidFill>
+                      <a:prstDash val="solid"/>
+                      <a:round/>
+                      <a:headEnd type="none" w="med" len="med"/>
+                      <a:tailEnd type="none" w="med" len="med"/>
+                    </a:lnR>
+                    <a:lnT w="6350" cap="flat" cmpd="sng" algn="ctr">
+                      <a:solidFill>
+                        <a:schemeClr val="tx1"/>
+                      </a:solidFill>
+                      <a:prstDash val="solid"/>
+                      <a:round/>
+                      <a:headEnd type="none" w="med" len="med"/>
+                      <a:tailEnd type="none" w="med" len="med"/>
+                    </a:lnT>
+                    <a:lnB w="6350" cap="flat" cmpd="sng" algn="ctr">
+                      <a:solidFill>
+                        <a:schemeClr val="tx1"/>
+                      </a:solidFill>
+                      <a:prstDash val="solid"/>
+                      <a:round/>
+                      <a:headEnd type="none" w="med" len="med"/>
+                      <a:tailEnd type="none" w="med" len="med"/>
+                    </a:lnB>
+                    <a:solidFill>
+                      <a:schemeClr val="bg1">
+                        <a:lumMod val="85000"/>
+                      </a:schemeClr>
+                    </a:solidFill>
+                  </a:tcPr>
+                </a:tc>
+                <a:extLst>
+                  <a:ext uri="{0D108BD9-81ED-4DB2-BD59-A6C34878D82A}">
+                    <a16:rowId xmlns:a16="http://schemas.microsoft.com/office/drawing/2014/main" val="98873745"/>
+                  </a:ext>
+                </a:extLst>
+              </a:tr>
+              <a:tr h="370840">
+                <a:tc>
+                  <a:txBody>
+                    <a:bodyPr/>
+                    <a:lstStyle/>
+                    <a:p>
+                      <a:endParaRPr lang="es-MX" sz="1300" dirty="0"/>
+                    </a:p>
+                  </a:txBody>
+                  <a:tcPr>
+                    <a:lnL w="6350" cap="flat" cmpd="sng" algn="ctr">
+                      <a:solidFill>
+                        <a:schemeClr val="tx1"/>
+                      </a:solidFill>
+                      <a:prstDash val="solid"/>
+                      <a:round/>
+                      <a:headEnd type="none" w="med" len="med"/>
+                      <a:tailEnd type="none" w="med" len="med"/>
+                    </a:lnL>
+                    <a:lnR w="6350" cap="flat" cmpd="sng" algn="ctr">
+                      <a:solidFill>
+                        <a:schemeClr val="tx1"/>
+                      </a:solidFill>
+                      <a:prstDash val="solid"/>
+                      <a:round/>
+                      <a:headEnd type="none" w="med" len="med"/>
+                      <a:tailEnd type="none" w="med" len="med"/>
+                    </a:lnR>
+                    <a:lnT w="6350" cap="flat" cmpd="sng" algn="ctr">
+                      <a:solidFill>
+                        <a:schemeClr val="tx1"/>
+                      </a:solidFill>
+                      <a:prstDash val="solid"/>
+                      <a:round/>
+                      <a:headEnd type="none" w="med" len="med"/>
+                      <a:tailEnd type="none" w="med" len="med"/>
+                    </a:lnT>
+                    <a:lnB w="6350" cap="flat" cmpd="sng" algn="ctr">
+                      <a:solidFill>
+                        <a:schemeClr val="tx1"/>
+                      </a:solidFill>
+                      <a:prstDash val="solid"/>
+                      <a:round/>
+                      <a:headEnd type="none" w="med" len="med"/>
+                      <a:tailEnd type="none" w="med" len="med"/>
+                    </a:lnB>
+                    <a:solidFill>
+                      <a:schemeClr val="bg1">
+                        <a:lumMod val="85000"/>
+                      </a:schemeClr>
+                    </a:solidFill>
+                  </a:tcPr>
+                </a:tc>
+                <a:tc>
+                  <a:txBody>
+                    <a:bodyPr/>
+                    <a:lstStyle/>
+                    <a:p>
+                      <a:endParaRPr lang="es-MX" sz="1300" dirty="0"/>
+                    </a:p>
+                  </a:txBody>
+                  <a:tcPr>
+                    <a:lnL w="6350" cap="flat" cmpd="sng" algn="ctr">
+                      <a:solidFill>
+                        <a:schemeClr val="tx1"/>
+                      </a:solidFill>
+                      <a:prstDash val="solid"/>
+                      <a:round/>
+                      <a:headEnd type="none" w="med" len="med"/>
+                      <a:tailEnd type="none" w="med" len="med"/>
+                    </a:lnL>
+                    <a:lnR w="6350" cap="flat" cmpd="sng" algn="ctr">
+                      <a:solidFill>
+                        <a:schemeClr val="tx1"/>
+                      </a:solidFill>
+                      <a:prstDash val="solid"/>
+                      <a:round/>
+                      <a:headEnd type="none" w="med" len="med"/>
+                      <a:tailEnd type="none" w="med" len="med"/>
+                    </a:lnR>
+                    <a:lnT w="6350" cap="flat" cmpd="sng" algn="ctr">
+                      <a:solidFill>
+                        <a:schemeClr val="tx1"/>
+                      </a:solidFill>
+                      <a:prstDash val="solid"/>
+                      <a:round/>
+                      <a:headEnd type="none" w="med" len="med"/>
+                      <a:tailEnd type="none" w="med" len="med"/>
+                    </a:lnT>
+                    <a:lnB w="6350" cap="flat" cmpd="sng" algn="ctr">
+                      <a:solidFill>
+                        <a:schemeClr val="tx1"/>
+                      </a:solidFill>
+                      <a:prstDash val="solid"/>
+                      <a:round/>
+                      <a:headEnd type="none" w="med" len="med"/>
+                      <a:tailEnd type="none" w="med" len="med"/>
+                    </a:lnB>
+                    <a:solidFill>
+                      <a:schemeClr val="bg1">
+                        <a:lumMod val="85000"/>
+                      </a:schemeClr>
+                    </a:solidFill>
+                  </a:tcPr>
+                </a:tc>
+                <a:tc>
+                  <a:txBody>
+                    <a:bodyPr/>
+                    <a:lstStyle/>
+                    <a:p>
+                      <a:endParaRPr lang="es-MX" sz="1300" dirty="0"/>
+                    </a:p>
+                  </a:txBody>
+                  <a:tcPr>
+                    <a:lnL w="6350" cap="flat" cmpd="sng" algn="ctr">
+                      <a:solidFill>
+                        <a:schemeClr val="tx1"/>
+                      </a:solidFill>
+                      <a:prstDash val="solid"/>
+                      <a:round/>
+                      <a:headEnd type="none" w="med" len="med"/>
+                      <a:tailEnd type="none" w="med" len="med"/>
+                    </a:lnL>
+                    <a:lnR w="6350" cap="flat" cmpd="sng" algn="ctr">
+                      <a:solidFill>
+                        <a:schemeClr val="tx1"/>
+                      </a:solidFill>
+                      <a:prstDash val="solid"/>
+                      <a:round/>
+                      <a:headEnd type="none" w="med" len="med"/>
+                      <a:tailEnd type="none" w="med" len="med"/>
+                    </a:lnR>
+                    <a:lnT w="6350" cap="flat" cmpd="sng" algn="ctr">
+                      <a:solidFill>
+                        <a:schemeClr val="tx1"/>
+                      </a:solidFill>
+                      <a:prstDash val="solid"/>
+                      <a:round/>
+                      <a:headEnd type="none" w="med" len="med"/>
+                      <a:tailEnd type="none" w="med" len="med"/>
+                    </a:lnT>
+                    <a:lnB w="6350" cap="flat" cmpd="sng" algn="ctr">
+                      <a:solidFill>
+                        <a:schemeClr val="tx1"/>
+                      </a:solidFill>
+                      <a:prstDash val="solid"/>
+                      <a:round/>
+                      <a:headEnd type="none" w="med" len="med"/>
+                      <a:tailEnd type="none" w="med" len="med"/>
+                    </a:lnB>
+                    <a:solidFill>
+                      <a:schemeClr val="bg1">
+                        <a:lumMod val="85000"/>
+                      </a:schemeClr>
+                    </a:solidFill>
+                  </a:tcPr>
+                </a:tc>
+                <a:tc>
+                  <a:txBody>
+                    <a:bodyPr/>
+                    <a:lstStyle/>
+                    <a:p>
+                      <a:endParaRPr lang="es-MX" sz="1300" dirty="0"/>
+                    </a:p>
+                  </a:txBody>
+                  <a:tcPr>
+                    <a:lnL w="6350" cap="flat" cmpd="sng" algn="ctr">
+                      <a:solidFill>
+                        <a:schemeClr val="tx1"/>
+                      </a:solidFill>
+                      <a:prstDash val="solid"/>
+                      <a:round/>
+                      <a:headEnd type="none" w="med" len="med"/>
+                      <a:tailEnd type="none" w="med" len="med"/>
+                    </a:lnL>
+                    <a:lnR w="6350" cap="flat" cmpd="sng" algn="ctr">
+                      <a:solidFill>
+                        <a:schemeClr val="tx1"/>
+                      </a:solidFill>
+                      <a:prstDash val="solid"/>
+                      <a:round/>
+                      <a:headEnd type="none" w="med" len="med"/>
+                      <a:tailEnd type="none" w="med" len="med"/>
+                    </a:lnR>
+                    <a:lnT w="6350" cap="flat" cmpd="sng" algn="ctr">
+                      <a:solidFill>
+                        <a:schemeClr val="tx1"/>
+                      </a:solidFill>
+                      <a:prstDash val="solid"/>
+                      <a:round/>
+                      <a:headEnd type="none" w="med" len="med"/>
+                      <a:tailEnd type="none" w="med" len="med"/>
+                    </a:lnT>
+                    <a:lnB w="6350" cap="flat" cmpd="sng" algn="ctr">
+                      <a:solidFill>
+                        <a:schemeClr val="tx1"/>
+                      </a:solidFill>
+                      <a:prstDash val="solid"/>
+                      <a:round/>
+                      <a:headEnd type="none" w="med" len="med"/>
+                      <a:tailEnd type="none" w="med" len="med"/>
+                    </a:lnB>
+                    <a:solidFill>
+                      <a:schemeClr val="bg1">
+                        <a:lumMod val="85000"/>
+                      </a:schemeClr>
+                    </a:solidFill>
+                  </a:tcPr>
+                </a:tc>
+                <a:tc>
+                  <a:txBody>
+                    <a:bodyPr/>
+                    <a:lstStyle/>
+                    <a:p>
+                      <a:endParaRPr lang="es-MX" sz="1300" dirty="0"/>
+                    </a:p>
+                  </a:txBody>
+                  <a:tcPr>
+                    <a:lnL w="6350" cap="flat" cmpd="sng" algn="ctr">
+                      <a:solidFill>
+                        <a:schemeClr val="tx1"/>
+                      </a:solidFill>
+                      <a:prstDash val="solid"/>
+                      <a:round/>
+                      <a:headEnd type="none" w="med" len="med"/>
+                      <a:tailEnd type="none" w="med" len="med"/>
+                    </a:lnL>
+                    <a:lnR w="6350" cap="flat" cmpd="sng" algn="ctr">
+                      <a:solidFill>
+                        <a:schemeClr val="tx1"/>
+                      </a:solidFill>
+                      <a:prstDash val="solid"/>
+                      <a:round/>
+                      <a:headEnd type="none" w="med" len="med"/>
+                      <a:tailEnd type="none" w="med" len="med"/>
+                    </a:lnR>
+                    <a:lnT w="6350" cap="flat" cmpd="sng" algn="ctr">
+                      <a:solidFill>
+                        <a:schemeClr val="tx1"/>
+                      </a:solidFill>
+                      <a:prstDash val="solid"/>
+                      <a:round/>
+                      <a:headEnd type="none" w="med" len="med"/>
+                      <a:tailEnd type="none" w="med" len="med"/>
+                    </a:lnT>
+                    <a:lnB w="6350" cap="flat" cmpd="sng" algn="ctr">
+                      <a:solidFill>
+                        <a:schemeClr val="tx1"/>
+                      </a:solidFill>
+                      <a:prstDash val="solid"/>
+                      <a:round/>
+                      <a:headEnd type="none" w="med" len="med"/>
+                      <a:tailEnd type="none" w="med" len="med"/>
+                    </a:lnB>
+                    <a:solidFill>
+                      <a:schemeClr val="bg1">
+                        <a:lumMod val="85000"/>
+                      </a:schemeClr>
+                    </a:solidFill>
+                  </a:tcPr>
+                </a:tc>
+                <a:tc>
+                  <a:txBody>
+                    <a:bodyPr/>
+                    <a:lstStyle/>
+                    <a:p>
+                      <a:endParaRPr lang="es-MX" sz="1300" dirty="0"/>
+                    </a:p>
+                  </a:txBody>
+                  <a:tcPr>
+                    <a:lnL w="6350" cap="flat" cmpd="sng" algn="ctr">
+                      <a:solidFill>
+                        <a:schemeClr val="tx1"/>
+                      </a:solidFill>
+                      <a:prstDash val="solid"/>
+                      <a:round/>
+                      <a:headEnd type="none" w="med" len="med"/>
+                      <a:tailEnd type="none" w="med" len="med"/>
+                    </a:lnL>
+                    <a:lnR w="6350" cap="flat" cmpd="sng" algn="ctr">
+                      <a:solidFill>
+                        <a:schemeClr val="tx1"/>
+                      </a:solidFill>
+                      <a:prstDash val="solid"/>
+                      <a:round/>
+                      <a:headEnd type="none" w="med" len="med"/>
+                      <a:tailEnd type="none" w="med" len="med"/>
+                    </a:lnR>
+                    <a:lnT w="6350" cap="flat" cmpd="sng" algn="ctr">
+                      <a:solidFill>
+                        <a:schemeClr val="tx1"/>
+                      </a:solidFill>
+                      <a:prstDash val="solid"/>
+                      <a:round/>
+                      <a:headEnd type="none" w="med" len="med"/>
+                      <a:tailEnd type="none" w="med" len="med"/>
+                    </a:lnT>
+                    <a:lnB w="6350" cap="flat" cmpd="sng" algn="ctr">
+                      <a:solidFill>
+                        <a:schemeClr val="tx1"/>
+                      </a:solidFill>
+                      <a:prstDash val="solid"/>
+                      <a:round/>
+                      <a:headEnd type="none" w="med" len="med"/>
+                      <a:tailEnd type="none" w="med" len="med"/>
+                    </a:lnB>
+                    <a:solidFill>
+                      <a:schemeClr val="bg1">
+                        <a:lumMod val="85000"/>
+                      </a:schemeClr>
+                    </a:solidFill>
+                  </a:tcPr>
+                </a:tc>
+                <a:tc>
+                  <a:txBody>
+                    <a:bodyPr/>
+                    <a:lstStyle/>
+                    <a:p>
+                      <a:pPr marL="0" marR="0" lvl="0" indent="0" algn="l" defTabSz="914400" rtl="0" eaLnBrk="1" fontAlgn="auto" latinLnBrk="0" hangingPunct="1">
+                        <a:lnSpc>
+                          <a:spcPct val="100000"/>
+                        </a:lnSpc>
+                        <a:spcBef>
+                          <a:spcPts val="0"/>
+                        </a:spcBef>
+                        <a:spcAft>
+                          <a:spcPts val="0"/>
+                        </a:spcAft>
+                        <a:buClr>
+                          <a:srgbClr val="000000"/>
+                        </a:buClr>
+                        <a:buSzTx/>
+                        <a:buFont typeface="Arial"/>
+                        <a:buNone/>
+                        <a:tabLst/>
+                        <a:defRPr/>
+                      </a:pPr>
+                      <a:endParaRPr lang="es-MX" sz="1400" dirty="0"/>
+                    </a:p>
+                  </a:txBody>
+                  <a:tcPr>
+                    <a:lnL w="6350" cap="flat" cmpd="sng" algn="ctr">
+                      <a:solidFill>
+                        <a:schemeClr val="tx1"/>
+                      </a:solidFill>
+                      <a:prstDash val="solid"/>
+                      <a:round/>
+                      <a:headEnd type="none" w="med" len="med"/>
+                      <a:tailEnd type="none" w="med" len="med"/>
+                    </a:lnL>
+                    <a:lnR w="6350" cap="flat" cmpd="sng" algn="ctr">
+                      <a:solidFill>
+                        <a:schemeClr val="tx1"/>
+                      </a:solidFill>
+                      <a:prstDash val="solid"/>
+                      <a:round/>
+                      <a:headEnd type="none" w="med" len="med"/>
+                      <a:tailEnd type="none" w="med" len="med"/>
+                    </a:lnR>
+                    <a:lnT w="6350" cap="flat" cmpd="sng" algn="ctr">
+                      <a:solidFill>
+                        <a:schemeClr val="tx1"/>
+                      </a:solidFill>
+                      <a:prstDash val="solid"/>
+                      <a:round/>
+                      <a:headEnd type="none" w="med" len="med"/>
+                      <a:tailEnd type="none" w="med" len="med"/>
+                    </a:lnT>
+                    <a:lnB w="6350" cap="flat" cmpd="sng" algn="ctr">
+                      <a:solidFill>
+                        <a:schemeClr val="tx1"/>
+                      </a:solidFill>
+                      <a:prstDash val="solid"/>
+                      <a:round/>
+                      <a:headEnd type="none" w="med" len="med"/>
+                      <a:tailEnd type="none" w="med" len="med"/>
+                    </a:lnB>
+                    <a:solidFill>
+                      <a:schemeClr val="bg1">
+                        <a:lumMod val="85000"/>
+                      </a:schemeClr>
+                    </a:solidFill>
+                  </a:tcPr>
+                </a:tc>
+                <a:extLst>
+                  <a:ext uri="{0D108BD9-81ED-4DB2-BD59-A6C34878D82A}">
+                    <a16:rowId xmlns:a16="http://schemas.microsoft.com/office/drawing/2014/main" val="3855316104"/>
+                  </a:ext>
+                </a:extLst>
+              </a:tr>
+              <a:tr h="370840">
+                <a:tc>
+                  <a:txBody>
+                    <a:bodyPr/>
+                    <a:lstStyle/>
+                    <a:p>
+                      <a:endParaRPr lang="es-MX"/>
+                    </a:p>
+                  </a:txBody>
+                  <a:tcPr>
+                    <a:lnL w="6350" cap="flat" cmpd="sng" algn="ctr">
+                      <a:solidFill>
+                        <a:schemeClr val="tx1"/>
+                      </a:solidFill>
+                      <a:prstDash val="solid"/>
+                      <a:round/>
+                      <a:headEnd type="none" w="med" len="med"/>
+                      <a:tailEnd type="none" w="med" len="med"/>
+                    </a:lnL>
+                    <a:lnR w="6350" cap="flat" cmpd="sng" algn="ctr">
+                      <a:solidFill>
+                        <a:schemeClr val="tx1"/>
+                      </a:solidFill>
+                      <a:prstDash val="solid"/>
+                      <a:round/>
+                      <a:headEnd type="none" w="med" len="med"/>
+                      <a:tailEnd type="none" w="med" len="med"/>
+                    </a:lnR>
+                    <a:lnT w="6350" cap="flat" cmpd="sng" algn="ctr">
+                      <a:solidFill>
+                        <a:schemeClr val="tx1"/>
+                      </a:solidFill>
+                      <a:prstDash val="solid"/>
+                      <a:round/>
+                      <a:headEnd type="none" w="med" len="med"/>
+                      <a:tailEnd type="none" w="med" len="med"/>
+                    </a:lnT>
+                    <a:lnB w="6350" cap="flat" cmpd="sng" algn="ctr">
+                      <a:solidFill>
+                        <a:schemeClr val="tx1"/>
+                      </a:solidFill>
+                      <a:prstDash val="solid"/>
+                      <a:round/>
+                      <a:headEnd type="none" w="med" len="med"/>
+                      <a:tailEnd type="none" w="med" len="med"/>
+                    </a:lnB>
+                    <a:solidFill>
+                      <a:schemeClr val="bg1">
+                        <a:lumMod val="85000"/>
+                      </a:schemeClr>
+                    </a:solidFill>
+                  </a:tcPr>
+                </a:tc>
+                <a:tc>
+                  <a:txBody>
+                    <a:bodyPr/>
+                    <a:lstStyle/>
+                    <a:p>
+                      <a:endParaRPr lang="es-MX"/>
+                    </a:p>
+                  </a:txBody>
+                  <a:tcPr>
+                    <a:lnL w="6350" cap="flat" cmpd="sng" algn="ctr">
+                      <a:solidFill>
+                        <a:schemeClr val="tx1"/>
+                      </a:solidFill>
+                      <a:prstDash val="solid"/>
+                      <a:round/>
+                      <a:headEnd type="none" w="med" len="med"/>
+                      <a:tailEnd type="none" w="med" len="med"/>
+                    </a:lnL>
+                    <a:lnR w="6350" cap="flat" cmpd="sng" algn="ctr">
+                      <a:solidFill>
+                        <a:schemeClr val="tx1"/>
+                      </a:solidFill>
+                      <a:prstDash val="solid"/>
+                      <a:round/>
+                      <a:headEnd type="none" w="med" len="med"/>
+                      <a:tailEnd type="none" w="med" len="med"/>
+                    </a:lnR>
+                    <a:lnT w="6350" cap="flat" cmpd="sng" algn="ctr">
+                      <a:solidFill>
+                        <a:schemeClr val="tx1"/>
+                      </a:solidFill>
+                      <a:prstDash val="solid"/>
+                      <a:round/>
+                      <a:headEnd type="none" w="med" len="med"/>
+                      <a:tailEnd type="none" w="med" len="med"/>
+                    </a:lnT>
+                    <a:lnB w="6350" cap="flat" cmpd="sng" algn="ctr">
+                      <a:solidFill>
+                        <a:schemeClr val="tx1"/>
+                      </a:solidFill>
+                      <a:prstDash val="solid"/>
+                      <a:round/>
+                      <a:headEnd type="none" w="med" len="med"/>
+                      <a:tailEnd type="none" w="med" len="med"/>
+                    </a:lnB>
+                    <a:solidFill>
+                      <a:schemeClr val="bg1">
+                        <a:lumMod val="85000"/>
+                      </a:schemeClr>
+                    </a:solidFill>
+                  </a:tcPr>
+                </a:tc>
+                <a:tc>
+                  <a:txBody>
+                    <a:bodyPr/>
+                    <a:lstStyle/>
+                    <a:p>
+                      <a:endParaRPr lang="es-MX"/>
+                    </a:p>
+                  </a:txBody>
+                  <a:tcPr>
+                    <a:lnL w="6350" cap="flat" cmpd="sng" algn="ctr">
+                      <a:solidFill>
+                        <a:schemeClr val="tx1"/>
+                      </a:solidFill>
+                      <a:prstDash val="solid"/>
+                      <a:round/>
+                      <a:headEnd type="none" w="med" len="med"/>
+                      <a:tailEnd type="none" w="med" len="med"/>
+                    </a:lnL>
+                    <a:lnR w="6350" cap="flat" cmpd="sng" algn="ctr">
+                      <a:solidFill>
+                        <a:schemeClr val="tx1"/>
+                      </a:solidFill>
+                      <a:prstDash val="solid"/>
+                      <a:round/>
+                      <a:headEnd type="none" w="med" len="med"/>
+                      <a:tailEnd type="none" w="med" len="med"/>
+                    </a:lnR>
+                    <a:lnT w="6350" cap="flat" cmpd="sng" algn="ctr">
+                      <a:solidFill>
+                        <a:schemeClr val="tx1"/>
+                      </a:solidFill>
+                      <a:prstDash val="solid"/>
+                      <a:round/>
+                      <a:headEnd type="none" w="med" len="med"/>
+                      <a:tailEnd type="none" w="med" len="med"/>
+                    </a:lnT>
+                    <a:lnB w="6350" cap="flat" cmpd="sng" algn="ctr">
+                      <a:solidFill>
+                        <a:schemeClr val="tx1"/>
+                      </a:solidFill>
+                      <a:prstDash val="solid"/>
+                      <a:round/>
+                      <a:headEnd type="none" w="med" len="med"/>
+                      <a:tailEnd type="none" w="med" len="med"/>
+                    </a:lnB>
+                    <a:solidFill>
+                      <a:schemeClr val="bg1">
+                        <a:lumMod val="85000"/>
+                      </a:schemeClr>
+                    </a:solidFill>
+                  </a:tcPr>
+                </a:tc>
+                <a:tc>
+                  <a:txBody>
+                    <a:bodyPr/>
+                    <a:lstStyle/>
+                    <a:p>
+                      <a:endParaRPr lang="es-MX"/>
+                    </a:p>
+                  </a:txBody>
+                  <a:tcPr>
+                    <a:lnL w="6350" cap="flat" cmpd="sng" algn="ctr">
+                      <a:solidFill>
+                        <a:schemeClr val="tx1"/>
+                      </a:solidFill>
+                      <a:prstDash val="solid"/>
+                      <a:round/>
+                      <a:headEnd type="none" w="med" len="med"/>
+                      <a:tailEnd type="none" w="med" len="med"/>
+                    </a:lnL>
+                    <a:lnR w="6350" cap="flat" cmpd="sng" algn="ctr">
+                      <a:solidFill>
+                        <a:schemeClr val="tx1"/>
+                      </a:solidFill>
+                      <a:prstDash val="solid"/>
+                      <a:round/>
+                      <a:headEnd type="none" w="med" len="med"/>
+                      <a:tailEnd type="none" w="med" len="med"/>
+                    </a:lnR>
+                    <a:lnT w="6350" cap="flat" cmpd="sng" algn="ctr">
+                      <a:solidFill>
+                        <a:schemeClr val="tx1"/>
+                      </a:solidFill>
+                      <a:prstDash val="solid"/>
+                      <a:round/>
+                      <a:headEnd type="none" w="med" len="med"/>
+                      <a:tailEnd type="none" w="med" len="med"/>
+                    </a:lnT>
+                    <a:lnB w="6350" cap="flat" cmpd="sng" algn="ctr">
+                      <a:solidFill>
+                        <a:schemeClr val="tx1"/>
+                      </a:solidFill>
+                      <a:prstDash val="solid"/>
+                      <a:round/>
+                      <a:headEnd type="none" w="med" len="med"/>
+                      <a:tailEnd type="none" w="med" len="med"/>
+                    </a:lnB>
+                    <a:solidFill>
+                      <a:schemeClr val="bg1">
+                        <a:lumMod val="85000"/>
+                      </a:schemeClr>
+                    </a:solidFill>
+                  </a:tcPr>
+                </a:tc>
+                <a:tc>
+                  <a:txBody>
+                    <a:bodyPr/>
+                    <a:lstStyle/>
+                    <a:p>
+                      <a:endParaRPr lang="es-MX" dirty="0"/>
+                    </a:p>
+                  </a:txBody>
+                  <a:tcPr>
+                    <a:lnL w="6350" cap="flat" cmpd="sng" algn="ctr">
+                      <a:solidFill>
+                        <a:schemeClr val="tx1"/>
+                      </a:solidFill>
+                      <a:prstDash val="solid"/>
+                      <a:round/>
+                      <a:headEnd type="none" w="med" len="med"/>
+                      <a:tailEnd type="none" w="med" len="med"/>
+                    </a:lnL>
+                    <a:lnR w="6350" cap="flat" cmpd="sng" algn="ctr">
+                      <a:solidFill>
+                        <a:schemeClr val="tx1"/>
+                      </a:solidFill>
+                      <a:prstDash val="solid"/>
+                      <a:round/>
+                      <a:headEnd type="none" w="med" len="med"/>
+                      <a:tailEnd type="none" w="med" len="med"/>
+                    </a:lnR>
+                    <a:lnT w="6350" cap="flat" cmpd="sng" algn="ctr">
+                      <a:solidFill>
+                        <a:schemeClr val="tx1"/>
+                      </a:solidFill>
+                      <a:prstDash val="solid"/>
+                      <a:round/>
+                      <a:headEnd type="none" w="med" len="med"/>
+                      <a:tailEnd type="none" w="med" len="med"/>
+                    </a:lnT>
+                    <a:lnB w="6350" cap="flat" cmpd="sng" algn="ctr">
+                      <a:solidFill>
+                        <a:schemeClr val="tx1"/>
+                      </a:solidFill>
+                      <a:prstDash val="solid"/>
+                      <a:round/>
+                      <a:headEnd type="none" w="med" len="med"/>
+                      <a:tailEnd type="none" w="med" len="med"/>
+                    </a:lnB>
+                    <a:solidFill>
+                      <a:schemeClr val="bg1">
+                        <a:lumMod val="85000"/>
+                      </a:schemeClr>
+                    </a:solidFill>
+                  </a:tcPr>
+                </a:tc>
+                <a:tc>
+                  <a:txBody>
+                    <a:bodyPr/>
+                    <a:lstStyle/>
+                    <a:p>
+                      <a:endParaRPr lang="es-MX" dirty="0"/>
+                    </a:p>
+                  </a:txBody>
+                  <a:tcPr>
+                    <a:lnL w="6350" cap="flat" cmpd="sng" algn="ctr">
+                      <a:solidFill>
+                        <a:schemeClr val="tx1"/>
+                      </a:solidFill>
+                      <a:prstDash val="solid"/>
+                      <a:round/>
+                      <a:headEnd type="none" w="med" len="med"/>
+                      <a:tailEnd type="none" w="med" len="med"/>
+                    </a:lnL>
+                    <a:lnR w="6350" cap="flat" cmpd="sng" algn="ctr">
+                      <a:solidFill>
+                        <a:schemeClr val="tx1"/>
+                      </a:solidFill>
+                      <a:prstDash val="solid"/>
+                      <a:round/>
+                      <a:headEnd type="none" w="med" len="med"/>
+                      <a:tailEnd type="none" w="med" len="med"/>
+                    </a:lnR>
+                    <a:lnT w="6350" cap="flat" cmpd="sng" algn="ctr">
+                      <a:solidFill>
+                        <a:schemeClr val="tx1"/>
+                      </a:solidFill>
+                      <a:prstDash val="solid"/>
+                      <a:round/>
+                      <a:headEnd type="none" w="med" len="med"/>
+                      <a:tailEnd type="none" w="med" len="med"/>
+                    </a:lnT>
+                    <a:lnB w="6350" cap="flat" cmpd="sng" algn="ctr">
+                      <a:solidFill>
+                        <a:schemeClr val="tx1"/>
+                      </a:solidFill>
+                      <a:prstDash val="solid"/>
+                      <a:round/>
+                      <a:headEnd type="none" w="med" len="med"/>
+                      <a:tailEnd type="none" w="med" len="med"/>
+                    </a:lnB>
+                    <a:solidFill>
+                      <a:schemeClr val="bg1">
+                        <a:lumMod val="85000"/>
+                      </a:schemeClr>
+                    </a:solidFill>
+                  </a:tcPr>
+                </a:tc>
+                <a:tc>
+                  <a:txBody>
+                    <a:bodyPr/>
+                    <a:lstStyle/>
+                    <a:p>
+                      <a:endParaRPr lang="es-MX" dirty="0"/>
+                    </a:p>
+                  </a:txBody>
+                  <a:tcPr>
+                    <a:lnL w="6350" cap="flat" cmpd="sng" algn="ctr">
+                      <a:solidFill>
+                        <a:schemeClr val="tx1"/>
+                      </a:solidFill>
+                      <a:prstDash val="solid"/>
+                      <a:round/>
+                      <a:headEnd type="none" w="med" len="med"/>
+                      <a:tailEnd type="none" w="med" len="med"/>
+                    </a:lnL>
+                    <a:lnR w="6350" cap="flat" cmpd="sng" algn="ctr">
+                      <a:solidFill>
+                        <a:schemeClr val="tx1"/>
+                      </a:solidFill>
+                      <a:prstDash val="solid"/>
+                      <a:round/>
+                      <a:headEnd type="none" w="med" len="med"/>
+                      <a:tailEnd type="none" w="med" len="med"/>
+                    </a:lnR>
+                    <a:lnT w="6350" cap="flat" cmpd="sng" algn="ctr">
+                      <a:solidFill>
+                        <a:schemeClr val="tx1"/>
+                      </a:solidFill>
+                      <a:prstDash val="solid"/>
+                      <a:round/>
+                      <a:headEnd type="none" w="med" len="med"/>
+                      <a:tailEnd type="none" w="med" len="med"/>
+                    </a:lnT>
+                    <a:lnB w="6350" cap="flat" cmpd="sng" algn="ctr">
+                      <a:solidFill>
+                        <a:schemeClr val="tx1"/>
+                      </a:solidFill>
+                      <a:prstDash val="solid"/>
+                      <a:round/>
+                      <a:headEnd type="none" w="med" len="med"/>
+                      <a:tailEnd type="none" w="med" len="med"/>
+                    </a:lnB>
+                    <a:solidFill>
+                      <a:schemeClr val="bg1">
+                        <a:lumMod val="85000"/>
+                      </a:schemeClr>
+                    </a:solidFill>
+                  </a:tcPr>
+                </a:tc>
+                <a:extLst>
+                  <a:ext uri="{0D108BD9-81ED-4DB2-BD59-A6C34878D82A}">
+                    <a16:rowId xmlns:a16="http://schemas.microsoft.com/office/drawing/2014/main" val="2018621346"/>
+                  </a:ext>
+                </a:extLst>
+              </a:tr>
+              <a:tr h="370840">
+                <a:tc>
+                  <a:txBody>
+                    <a:bodyPr/>
+                    <a:lstStyle/>
+                    <a:p>
+                      <a:endParaRPr lang="es-MX"/>
+                    </a:p>
+                  </a:txBody>
+                  <a:tcPr>
+                    <a:lnL w="6350" cap="flat" cmpd="sng" algn="ctr">
+                      <a:solidFill>
+                        <a:schemeClr val="tx1"/>
+                      </a:solidFill>
+                      <a:prstDash val="solid"/>
+                      <a:round/>
+                      <a:headEnd type="none" w="med" len="med"/>
+                      <a:tailEnd type="none" w="med" len="med"/>
+                    </a:lnL>
+                    <a:lnR w="6350" cap="flat" cmpd="sng" algn="ctr">
+                      <a:solidFill>
+                        <a:schemeClr val="tx1"/>
+                      </a:solidFill>
+                      <a:prstDash val="solid"/>
+                      <a:round/>
+                      <a:headEnd type="none" w="med" len="med"/>
+                      <a:tailEnd type="none" w="med" len="med"/>
+                    </a:lnR>
+                    <a:lnT w="6350" cap="flat" cmpd="sng" algn="ctr">
+                      <a:solidFill>
+                        <a:schemeClr val="tx1"/>
+                      </a:solidFill>
+                      <a:prstDash val="solid"/>
+                      <a:round/>
+                      <a:headEnd type="none" w="med" len="med"/>
+                      <a:tailEnd type="none" w="med" len="med"/>
+                    </a:lnT>
+                    <a:lnB w="6350" cap="flat" cmpd="sng" algn="ctr">
+                      <a:solidFill>
+                        <a:schemeClr val="tx1"/>
+                      </a:solidFill>
+                      <a:prstDash val="solid"/>
+                      <a:round/>
+                      <a:headEnd type="none" w="med" len="med"/>
+                      <a:tailEnd type="none" w="med" len="med"/>
+                    </a:lnB>
+                    <a:solidFill>
+                      <a:schemeClr val="bg1">
+                        <a:lumMod val="85000"/>
+                      </a:schemeClr>
+                    </a:solidFill>
+                  </a:tcPr>
+                </a:tc>
+                <a:tc>
+                  <a:txBody>
+                    <a:bodyPr/>
+                    <a:lstStyle/>
+                    <a:p>
+                      <a:endParaRPr lang="es-MX" dirty="0"/>
+                    </a:p>
+                  </a:txBody>
+                  <a:tcPr>
+                    <a:lnL w="6350" cap="flat" cmpd="sng" algn="ctr">
+                      <a:solidFill>
+                        <a:schemeClr val="tx1"/>
+                      </a:solidFill>
+                      <a:prstDash val="solid"/>
+                      <a:round/>
+                      <a:headEnd type="none" w="med" len="med"/>
+                      <a:tailEnd type="none" w="med" len="med"/>
+                    </a:lnL>
+                    <a:lnR w="6350" cap="flat" cmpd="sng" algn="ctr">
+                      <a:solidFill>
+                        <a:schemeClr val="tx1"/>
+                      </a:solidFill>
+                      <a:prstDash val="solid"/>
+                      <a:round/>
+                      <a:headEnd type="none" w="med" len="med"/>
+                      <a:tailEnd type="none" w="med" len="med"/>
+                    </a:lnR>
+                    <a:lnT w="6350" cap="flat" cmpd="sng" algn="ctr">
+                      <a:solidFill>
+                        <a:schemeClr val="tx1"/>
+                      </a:solidFill>
+                      <a:prstDash val="solid"/>
+                      <a:round/>
+                      <a:headEnd type="none" w="med" len="med"/>
+                      <a:tailEnd type="none" w="med" len="med"/>
+                    </a:lnT>
+                    <a:lnB w="6350" cap="flat" cmpd="sng" algn="ctr">
+                      <a:solidFill>
+                        <a:schemeClr val="tx1"/>
+                      </a:solidFill>
+                      <a:prstDash val="solid"/>
+                      <a:round/>
+                      <a:headEnd type="none" w="med" len="med"/>
+                      <a:tailEnd type="none" w="med" len="med"/>
+                    </a:lnB>
+                    <a:solidFill>
+                      <a:schemeClr val="bg1">
+                        <a:lumMod val="85000"/>
+                      </a:schemeClr>
+                    </a:solidFill>
+                  </a:tcPr>
+                </a:tc>
+                <a:tc>
+                  <a:txBody>
+                    <a:bodyPr/>
+                    <a:lstStyle/>
+                    <a:p>
+                      <a:endParaRPr lang="es-MX"/>
+                    </a:p>
+                  </a:txBody>
+                  <a:tcPr>
+                    <a:lnL w="6350" cap="flat" cmpd="sng" algn="ctr">
+                      <a:solidFill>
+                        <a:schemeClr val="tx1"/>
+                      </a:solidFill>
+                      <a:prstDash val="solid"/>
+                      <a:round/>
+                      <a:headEnd type="none" w="med" len="med"/>
+                      <a:tailEnd type="none" w="med" len="med"/>
+                    </a:lnL>
+                    <a:lnR w="6350" cap="flat" cmpd="sng" algn="ctr">
+                      <a:solidFill>
+                        <a:schemeClr val="tx1"/>
+                      </a:solidFill>
+                      <a:prstDash val="solid"/>
+                      <a:round/>
+                      <a:headEnd type="none" w="med" len="med"/>
+                      <a:tailEnd type="none" w="med" len="med"/>
+                    </a:lnR>
+                    <a:lnT w="6350" cap="flat" cmpd="sng" algn="ctr">
+                      <a:solidFill>
+                        <a:schemeClr val="tx1"/>
+                      </a:solidFill>
+                      <a:prstDash val="solid"/>
+                      <a:round/>
+                      <a:headEnd type="none" w="med" len="med"/>
+                      <a:tailEnd type="none" w="med" len="med"/>
+                    </a:lnT>
+                    <a:lnB w="6350" cap="flat" cmpd="sng" algn="ctr">
+                      <a:solidFill>
+                        <a:schemeClr val="tx1"/>
+                      </a:solidFill>
+                      <a:prstDash val="solid"/>
+                      <a:round/>
+                      <a:headEnd type="none" w="med" len="med"/>
+                      <a:tailEnd type="none" w="med" len="med"/>
+                    </a:lnB>
+                    <a:solidFill>
+                      <a:schemeClr val="bg1">
+                        <a:lumMod val="85000"/>
+                      </a:schemeClr>
+                    </a:solidFill>
+                  </a:tcPr>
+                </a:tc>
+                <a:tc>
+                  <a:txBody>
+                    <a:bodyPr/>
+                    <a:lstStyle/>
+                    <a:p>
+                      <a:endParaRPr lang="es-MX"/>
+                    </a:p>
+                  </a:txBody>
+                  <a:tcPr>
+                    <a:lnL w="6350" cap="flat" cmpd="sng" algn="ctr">
+                      <a:solidFill>
+                        <a:schemeClr val="tx1"/>
+                      </a:solidFill>
+                      <a:prstDash val="solid"/>
+                      <a:round/>
+                      <a:headEnd type="none" w="med" len="med"/>
+                      <a:tailEnd type="none" w="med" len="med"/>
+                    </a:lnL>
+                    <a:lnR w="6350" cap="flat" cmpd="sng" algn="ctr">
+                      <a:solidFill>
+                        <a:schemeClr val="tx1"/>
+                      </a:solidFill>
+                      <a:prstDash val="solid"/>
+                      <a:round/>
+                      <a:headEnd type="none" w="med" len="med"/>
+                      <a:tailEnd type="none" w="med" len="med"/>
+                    </a:lnR>
+                    <a:lnT w="6350" cap="flat" cmpd="sng" algn="ctr">
+                      <a:solidFill>
+                        <a:schemeClr val="tx1"/>
+                      </a:solidFill>
+                      <a:prstDash val="solid"/>
+                      <a:round/>
+                      <a:headEnd type="none" w="med" len="med"/>
+                      <a:tailEnd type="none" w="med" len="med"/>
+                    </a:lnT>
+                    <a:lnB w="6350" cap="flat" cmpd="sng" algn="ctr">
+                      <a:solidFill>
+                        <a:schemeClr val="tx1"/>
+                      </a:solidFill>
+                      <a:prstDash val="solid"/>
+                      <a:round/>
+                      <a:headEnd type="none" w="med" len="med"/>
+                      <a:tailEnd type="none" w="med" len="med"/>
+                    </a:lnB>
+                    <a:solidFill>
+                      <a:schemeClr val="bg1">
+                        <a:lumMod val="85000"/>
+                      </a:schemeClr>
+                    </a:solidFill>
+                  </a:tcPr>
+                </a:tc>
+                <a:tc>
+                  <a:txBody>
+                    <a:bodyPr/>
+                    <a:lstStyle/>
+                    <a:p>
+                      <a:endParaRPr lang="es-MX" dirty="0"/>
+                    </a:p>
+                  </a:txBody>
+                  <a:tcPr>
+                    <a:lnL w="6350" cap="flat" cmpd="sng" algn="ctr">
+                      <a:solidFill>
+                        <a:schemeClr val="tx1"/>
+                      </a:solidFill>
+                      <a:prstDash val="solid"/>
+                      <a:round/>
+                      <a:headEnd type="none" w="med" len="med"/>
+                      <a:tailEnd type="none" w="med" len="med"/>
+                    </a:lnL>
+                    <a:lnR w="6350" cap="flat" cmpd="sng" algn="ctr">
+                      <a:solidFill>
+                        <a:schemeClr val="tx1"/>
+                      </a:solidFill>
+                      <a:prstDash val="solid"/>
+                      <a:round/>
+                      <a:headEnd type="none" w="med" len="med"/>
+                      <a:tailEnd type="none" w="med" len="med"/>
+                    </a:lnR>
+                    <a:lnT w="6350" cap="flat" cmpd="sng" algn="ctr">
+                      <a:solidFill>
+                        <a:schemeClr val="tx1"/>
+                      </a:solidFill>
+                      <a:prstDash val="solid"/>
+                      <a:round/>
+                      <a:headEnd type="none" w="med" len="med"/>
+                      <a:tailEnd type="none" w="med" len="med"/>
+                    </a:lnT>
+                    <a:lnB w="6350" cap="flat" cmpd="sng" algn="ctr">
+                      <a:solidFill>
+                        <a:schemeClr val="tx1"/>
+                      </a:solidFill>
+                      <a:prstDash val="solid"/>
+                      <a:round/>
+                      <a:headEnd type="none" w="med" len="med"/>
+                      <a:tailEnd type="none" w="med" len="med"/>
+                    </a:lnB>
+                    <a:solidFill>
+                      <a:schemeClr val="bg1">
+                        <a:lumMod val="85000"/>
+                      </a:schemeClr>
+                    </a:solidFill>
+                  </a:tcPr>
+                </a:tc>
+                <a:tc>
+                  <a:txBody>
+                    <a:bodyPr/>
+                    <a:lstStyle/>
+                    <a:p>
+                      <a:endParaRPr lang="es-MX" dirty="0"/>
+                    </a:p>
+                  </a:txBody>
+                  <a:tcPr>
+                    <a:lnL w="6350" cap="flat" cmpd="sng" algn="ctr">
+                      <a:solidFill>
+                        <a:schemeClr val="tx1"/>
+                      </a:solidFill>
+                      <a:prstDash val="solid"/>
+                      <a:round/>
+                      <a:headEnd type="none" w="med" len="med"/>
+                      <a:tailEnd type="none" w="med" len="med"/>
+                    </a:lnL>
+                    <a:lnR w="6350" cap="flat" cmpd="sng" algn="ctr">
+                      <a:solidFill>
+                        <a:schemeClr val="tx1"/>
+                      </a:solidFill>
+                      <a:prstDash val="solid"/>
+                      <a:round/>
+                      <a:headEnd type="none" w="med" len="med"/>
+                      <a:tailEnd type="none" w="med" len="med"/>
+                    </a:lnR>
+                    <a:lnT w="6350" cap="flat" cmpd="sng" algn="ctr">
+                      <a:solidFill>
+                        <a:schemeClr val="tx1"/>
+                      </a:solidFill>
+                      <a:prstDash val="solid"/>
+                      <a:round/>
+                      <a:headEnd type="none" w="med" len="med"/>
+                      <a:tailEnd type="none" w="med" len="med"/>
+                    </a:lnT>
+                    <a:lnB w="6350" cap="flat" cmpd="sng" algn="ctr">
+                      <a:solidFill>
+                        <a:schemeClr val="tx1"/>
+                      </a:solidFill>
+                      <a:prstDash val="solid"/>
+                      <a:round/>
+                      <a:headEnd type="none" w="med" len="med"/>
+                      <a:tailEnd type="none" w="med" len="med"/>
+                    </a:lnB>
+                    <a:solidFill>
+                      <a:schemeClr val="bg1">
+                        <a:lumMod val="85000"/>
+                      </a:schemeClr>
+                    </a:solidFill>
+                  </a:tcPr>
+                </a:tc>
+                <a:tc>
+                  <a:txBody>
+                    <a:bodyPr/>
+                    <a:lstStyle/>
+                    <a:p>
+                      <a:endParaRPr lang="es-MX" dirty="0"/>
+                    </a:p>
+                  </a:txBody>
+                  <a:tcPr>
+                    <a:lnL w="6350" cap="flat" cmpd="sng" algn="ctr">
+                      <a:solidFill>
+                        <a:schemeClr val="tx1"/>
+                      </a:solidFill>
+                      <a:prstDash val="solid"/>
+                      <a:round/>
+                      <a:headEnd type="none" w="med" len="med"/>
+                      <a:tailEnd type="none" w="med" len="med"/>
+                    </a:lnL>
+                    <a:lnR w="6350" cap="flat" cmpd="sng" algn="ctr">
+                      <a:solidFill>
+                        <a:schemeClr val="tx1"/>
+                      </a:solidFill>
+                      <a:prstDash val="solid"/>
+                      <a:round/>
+                      <a:headEnd type="none" w="med" len="med"/>
+                      <a:tailEnd type="none" w="med" len="med"/>
+                    </a:lnR>
+                    <a:lnT w="6350" cap="flat" cmpd="sng" algn="ctr">
+                      <a:solidFill>
+                        <a:schemeClr val="tx1"/>
+                      </a:solidFill>
+                      <a:prstDash val="solid"/>
+                      <a:round/>
+                      <a:headEnd type="none" w="med" len="med"/>
+                      <a:tailEnd type="none" w="med" len="med"/>
+                    </a:lnT>
+                    <a:lnB w="6350" cap="flat" cmpd="sng" algn="ctr">
+                      <a:solidFill>
+                        <a:schemeClr val="tx1"/>
+                      </a:solidFill>
+                      <a:prstDash val="solid"/>
+                      <a:round/>
+                      <a:headEnd type="none" w="med" len="med"/>
+                      <a:tailEnd type="none" w="med" len="med"/>
+                    </a:lnB>
+                    <a:solidFill>
+                      <a:schemeClr val="bg1">
+                        <a:lumMod val="85000"/>
+                      </a:schemeClr>
+                    </a:solidFill>
+                  </a:tcPr>
+                </a:tc>
+                <a:extLst>
+                  <a:ext uri="{0D108BD9-81ED-4DB2-BD59-A6C34878D82A}">
+                    <a16:rowId xmlns:a16="http://schemas.microsoft.com/office/drawing/2014/main" val="1351984755"/>
+                  </a:ext>
+                </a:extLst>
+              </a:tr>
+            </a:tbl>
+          </a:graphicData>
+        </a:graphic>
+      </p:graphicFrame>
+    </p:spTree>
+    <p:extLst>
+      <p:ext uri="{BB962C8B-B14F-4D97-AF65-F5344CB8AC3E}">
+        <p14:creationId xmlns:p14="http://schemas.microsoft.com/office/powerpoint/2010/main" val="1367546155"/>
+      </p:ext>
+    </p:extLst>
+  </p:cSld>
+  <p:clrMapOvr>
+    <a:masterClrMapping/>
+  </p:clrMapOvr>
+</p:sld>
+</file>
+
+<file path=ppt/slides/slide12.xml><?xml version="1.0" encoding="utf-8"?>
+<p:sld xmlns:a="http://schemas.openxmlformats.org/drawingml/2006/main" xmlns:r="http://schemas.openxmlformats.org/officeDocument/2006/relationships" xmlns:p="http://schemas.openxmlformats.org/presentationml/2006/main">
+  <p:cSld>
+    <p:spTree>
+      <p:nvGrpSpPr>
+        <p:cNvPr id="1" name="Shape 110"/>
+        <p:cNvGrpSpPr/>
+        <p:nvPr/>
+      </p:nvGrpSpPr>
+      <p:grpSpPr>
+        <a:xfrm>
+          <a:off x="0" y="0"/>
+          <a:ext cx="0" cy="0"/>
+          <a:chOff x="0" y="0"/>
+          <a:chExt cx="0" cy="0"/>
+        </a:xfrm>
+      </p:grpSpPr>
+      <p:sp>
+        <p:nvSpPr>
+          <p:cNvPr id="111" name="Google Shape;111;p4"/>
+          <p:cNvSpPr txBox="1"/>
+          <p:nvPr/>
+        </p:nvSpPr>
+        <p:spPr>
+          <a:xfrm>
+            <a:off x="510558" y="196996"/>
+            <a:ext cx="11658658" cy="1007542"/>
+          </a:xfrm>
+          <a:prstGeom prst="rect">
+            <a:avLst/>
+          </a:prstGeom>
+          <a:noFill/>
+          <a:ln>
+            <a:noFill/>
+          </a:ln>
+        </p:spPr>
+        <p:txBody>
+          <a:bodyPr spcFirstLastPara="1" wrap="square" lIns="91425" tIns="45700" rIns="91425" bIns="45700" anchor="t" anchorCtr="0">
+            <a:noAutofit/>
+          </a:bodyPr>
+          <a:lstStyle/>
+          <a:p>
+            <a:pPr lvl="1">
+              <a:lnSpc>
+                <a:spcPct val="85000"/>
+              </a:lnSpc>
+              <a:buClr>
+                <a:schemeClr val="accent1"/>
+              </a:buClr>
+              <a:buSzPts val="3200"/>
+            </a:pPr>
+            <a:r>
+              <a:rPr lang="es-ES" sz="3200" b="1" dirty="0">
+                <a:solidFill>
+                  <a:schemeClr val="accent1"/>
+                </a:solidFill>
+                <a:latin typeface="Calibri"/>
+                <a:ea typeface="Calibri"/>
+                <a:cs typeface="Calibri"/>
+                <a:sym typeface="Calibri"/>
+              </a:rPr>
+              <a:t>A</a:t>
+            </a:r>
+            <a:r>
+              <a:rPr lang="es-MX" sz="3200" b="1" dirty="0" err="1">
+                <a:solidFill>
+                  <a:schemeClr val="accent1"/>
+                </a:solidFill>
+                <a:latin typeface="Calibri"/>
+                <a:ea typeface="Calibri"/>
+                <a:cs typeface="Calibri"/>
+                <a:sym typeface="Calibri"/>
+              </a:rPr>
+              <a:t>nálisis</a:t>
+            </a:r>
+            <a:r>
+              <a:rPr lang="es-MX" sz="3200" b="1" dirty="0">
+                <a:solidFill>
+                  <a:schemeClr val="accent1"/>
+                </a:solidFill>
+                <a:latin typeface="Calibri"/>
+                <a:ea typeface="Calibri"/>
+                <a:cs typeface="Calibri"/>
+                <a:sym typeface="Calibri"/>
+              </a:rPr>
               <a:t> </a:t>
             </a:r>
             <a:endParaRPr sz="3200" b="1" dirty="0">
@@ -12802,7 +16204,7 @@
 </p:sld>
 </file>
 
-<file path=ppt/slides/slide12.xml><?xml version="1.0" encoding="utf-8"?>
+<file path=ppt/slides/slide13.xml><?xml version="1.0" encoding="utf-8"?>
 <p:sld xmlns:a="http://schemas.openxmlformats.org/drawingml/2006/main" xmlns:r="http://schemas.openxmlformats.org/officeDocument/2006/relationships" xmlns:p="http://schemas.openxmlformats.org/presentationml/2006/main">
   <p:cSld>
     <p:spTree>

</xml_diff>

<commit_message>
Emarejando HPi3 y Desktop dell con archivo de proyecto final de diplomaod ds unam v1
</commit_message>
<xml_diff>
--- a/Diplomado_DS_Proyecto_Final/Proyecto_final_Diplomado_DS_UNAM_v2.pptx
+++ b/Diplomado_DS_Proyecto_Final/Proyecto_final_Diplomado_DS_UNAM_v2.pptx
@@ -5,7 +5,7 @@
     <p:sldMasterId id="2147483648" r:id="rId1"/>
   </p:sldMasterIdLst>
   <p:notesMasterIdLst>
-    <p:notesMasterId r:id="rId19"/>
+    <p:notesMasterId r:id="rId21"/>
   </p:notesMasterIdLst>
   <p:sldIdLst>
     <p:sldId id="256" r:id="rId2"/>
@@ -25,6 +25,8 @@
     <p:sldId id="275" r:id="rId16"/>
     <p:sldId id="276" r:id="rId17"/>
     <p:sldId id="270" r:id="rId18"/>
+    <p:sldId id="277" r:id="rId19"/>
+    <p:sldId id="278" r:id="rId20"/>
   </p:sldIdLst>
   <p:sldSz cx="12192000" cy="6858000"/>
   <p:notesSz cx="6858000" cy="9144000"/>
@@ -273,7 +275,7 @@
       </p15:sldGuideLst>
     </p:ext>
     <p:ext uri="GoogleSlidesCustomDataVersion2">
-      <go:slidesCustomData xmlns="" xmlns:mc="http://schemas.openxmlformats.org/markup-compatibility/2006" xmlns:mv="urn:schemas-microsoft-com:mac:vml" xmlns:c="http://schemas.openxmlformats.org/drawingml/2006/chart" xmlns:dgm="http://schemas.openxmlformats.org/drawingml/2006/diagram" xmlns:o="urn:schemas-microsoft-com:office:office" xmlns:v="urn:schemas-microsoft-com:vml" xmlns:pvml="urn:schemas-microsoft-com:office:powerpoint" xmlns:com="http://schemas.openxmlformats.org/drawingml/2006/compatibility" xmlns:p14="http://schemas.microsoft.com/office/powerpoint/2010/main" xmlns:p15="http://schemas.microsoft.com/office/powerpoint/2012/main" xmlns:ahyp="http://schemas.microsoft.com/office/drawing/2018/hyperlinkcolor" xmlns:go="http://customooxmlschemas.google.com/" r:id="rId20" roundtripDataSignature="AMtx7mgHnMHIZxhnZr2j+tVR2DpQdbinhg=="/>
+      <go:slidesCustomData xmlns:go="http://customooxmlschemas.google.com/" xmlns:ahyp="http://schemas.microsoft.com/office/drawing/2018/hyperlinkcolor" xmlns:p15="http://schemas.microsoft.com/office/powerpoint/2012/main" xmlns:p14="http://schemas.microsoft.com/office/powerpoint/2010/main" xmlns:com="http://schemas.openxmlformats.org/drawingml/2006/compatibility" xmlns:pvml="urn:schemas-microsoft-com:office:powerpoint" xmlns:v="urn:schemas-microsoft-com:vml" xmlns:o="urn:schemas-microsoft-com:office:office" xmlns:dgm="http://schemas.openxmlformats.org/drawingml/2006/diagram" xmlns:c="http://schemas.openxmlformats.org/drawingml/2006/chart" xmlns:mv="urn:schemas-microsoft-com:mac:vml" xmlns:mc="http://schemas.openxmlformats.org/markup-compatibility/2006" xmlns="" r:id="rId22" roundtripDataSignature="AMtx7mgHnMHIZxhnZr2j+tVR2DpQdbinhg=="/>
     </p:ext>
   </p:extLst>
 </p:presentation>
@@ -2439,6 +2441,224 @@
     <p:extLst>
       <p:ext uri="{BB962C8B-B14F-4D97-AF65-F5344CB8AC3E}">
         <p14:creationId xmlns:p14="http://schemas.microsoft.com/office/powerpoint/2010/main" val="2872610994"/>
+      </p:ext>
+    </p:extLst>
+  </p:cSld>
+  <p:clrMapOvr>
+    <a:masterClrMapping/>
+  </p:clrMapOvr>
+</p:notes>
+</file>
+
+<file path=ppt/notesSlides/notesSlide18.xml><?xml version="1.0" encoding="utf-8"?>
+<p:notes xmlns:a="http://schemas.openxmlformats.org/drawingml/2006/main" xmlns:r="http://schemas.openxmlformats.org/officeDocument/2006/relationships" xmlns:p="http://schemas.openxmlformats.org/presentationml/2006/main" showMasterSp="0" showMasterPhAnim="0">
+  <p:cSld>
+    <p:spTree>
+      <p:nvGrpSpPr>
+        <p:cNvPr id="1" name="Shape 107"/>
+        <p:cNvGrpSpPr/>
+        <p:nvPr/>
+      </p:nvGrpSpPr>
+      <p:grpSpPr>
+        <a:xfrm>
+          <a:off x="0" y="0"/>
+          <a:ext cx="0" cy="0"/>
+          <a:chOff x="0" y="0"/>
+          <a:chExt cx="0" cy="0"/>
+        </a:xfrm>
+      </p:grpSpPr>
+      <p:sp>
+        <p:nvSpPr>
+          <p:cNvPr id="108" name="Google Shape;108;p4:notes"/>
+          <p:cNvSpPr txBox="1">
+            <a:spLocks noGrp="1"/>
+          </p:cNvSpPr>
+          <p:nvPr>
+            <p:ph type="body" idx="1"/>
+          </p:nvPr>
+        </p:nvSpPr>
+        <p:spPr>
+          <a:xfrm>
+            <a:off x="685800" y="4400550"/>
+            <a:ext cx="5486400" cy="3600450"/>
+          </a:xfrm>
+          <a:prstGeom prst="rect">
+            <a:avLst/>
+          </a:prstGeom>
+        </p:spPr>
+        <p:txBody>
+          <a:bodyPr spcFirstLastPara="1" wrap="square" lIns="91425" tIns="45700" rIns="91425" bIns="45700" anchor="t" anchorCtr="0">
+            <a:noAutofit/>
+          </a:bodyPr>
+          <a:lstStyle/>
+          <a:p>
+            <a:pPr marL="0" lvl="0" indent="0" algn="l" rtl="0">
+              <a:spcBef>
+                <a:spcPts val="0"/>
+              </a:spcBef>
+              <a:spcAft>
+                <a:spcPts val="0"/>
+              </a:spcAft>
+              <a:buNone/>
+            </a:pPr>
+            <a:endParaRPr/>
+          </a:p>
+        </p:txBody>
+      </p:sp>
+      <p:sp>
+        <p:nvSpPr>
+          <p:cNvPr id="109" name="Google Shape;109;p4:notes"/>
+          <p:cNvSpPr>
+            <a:spLocks noGrp="1" noRot="1" noChangeAspect="1"/>
+          </p:cNvSpPr>
+          <p:nvPr>
+            <p:ph type="sldImg" idx="2"/>
+          </p:nvPr>
+        </p:nvSpPr>
+        <p:spPr>
+          <a:xfrm>
+            <a:off x="685800" y="1143000"/>
+            <a:ext cx="5486400" cy="3086100"/>
+          </a:xfrm>
+          <a:custGeom>
+            <a:avLst/>
+            <a:gdLst/>
+            <a:ahLst/>
+            <a:cxnLst/>
+            <a:rect l="l" t="t" r="r" b="b"/>
+            <a:pathLst>
+              <a:path w="120000" h="120000" extrusionOk="0">
+                <a:moveTo>
+                  <a:pt x="0" y="0"/>
+                </a:moveTo>
+                <a:lnTo>
+                  <a:pt x="120000" y="0"/>
+                </a:lnTo>
+                <a:lnTo>
+                  <a:pt x="120000" y="120000"/>
+                </a:lnTo>
+                <a:lnTo>
+                  <a:pt x="0" y="120000"/>
+                </a:lnTo>
+                <a:close/>
+              </a:path>
+            </a:pathLst>
+          </a:custGeom>
+        </p:spPr>
+      </p:sp>
+    </p:spTree>
+    <p:extLst>
+      <p:ext uri="{BB962C8B-B14F-4D97-AF65-F5344CB8AC3E}">
+        <p14:creationId xmlns:p14="http://schemas.microsoft.com/office/powerpoint/2010/main" val="890619390"/>
+      </p:ext>
+    </p:extLst>
+  </p:cSld>
+  <p:clrMapOvr>
+    <a:masterClrMapping/>
+  </p:clrMapOvr>
+</p:notes>
+</file>
+
+<file path=ppt/notesSlides/notesSlide19.xml><?xml version="1.0" encoding="utf-8"?>
+<p:notes xmlns:a="http://schemas.openxmlformats.org/drawingml/2006/main" xmlns:r="http://schemas.openxmlformats.org/officeDocument/2006/relationships" xmlns:p="http://schemas.openxmlformats.org/presentationml/2006/main" showMasterSp="0" showMasterPhAnim="0">
+  <p:cSld>
+    <p:spTree>
+      <p:nvGrpSpPr>
+        <p:cNvPr id="1" name="Shape 107"/>
+        <p:cNvGrpSpPr/>
+        <p:nvPr/>
+      </p:nvGrpSpPr>
+      <p:grpSpPr>
+        <a:xfrm>
+          <a:off x="0" y="0"/>
+          <a:ext cx="0" cy="0"/>
+          <a:chOff x="0" y="0"/>
+          <a:chExt cx="0" cy="0"/>
+        </a:xfrm>
+      </p:grpSpPr>
+      <p:sp>
+        <p:nvSpPr>
+          <p:cNvPr id="108" name="Google Shape;108;p4:notes"/>
+          <p:cNvSpPr txBox="1">
+            <a:spLocks noGrp="1"/>
+          </p:cNvSpPr>
+          <p:nvPr>
+            <p:ph type="body" idx="1"/>
+          </p:nvPr>
+        </p:nvSpPr>
+        <p:spPr>
+          <a:xfrm>
+            <a:off x="685800" y="4400550"/>
+            <a:ext cx="5486400" cy="3600450"/>
+          </a:xfrm>
+          <a:prstGeom prst="rect">
+            <a:avLst/>
+          </a:prstGeom>
+        </p:spPr>
+        <p:txBody>
+          <a:bodyPr spcFirstLastPara="1" wrap="square" lIns="91425" tIns="45700" rIns="91425" bIns="45700" anchor="t" anchorCtr="0">
+            <a:noAutofit/>
+          </a:bodyPr>
+          <a:lstStyle/>
+          <a:p>
+            <a:pPr marL="0" lvl="0" indent="0" algn="l" rtl="0">
+              <a:spcBef>
+                <a:spcPts val="0"/>
+              </a:spcBef>
+              <a:spcAft>
+                <a:spcPts val="0"/>
+              </a:spcAft>
+              <a:buNone/>
+            </a:pPr>
+            <a:endParaRPr/>
+          </a:p>
+        </p:txBody>
+      </p:sp>
+      <p:sp>
+        <p:nvSpPr>
+          <p:cNvPr id="109" name="Google Shape;109;p4:notes"/>
+          <p:cNvSpPr>
+            <a:spLocks noGrp="1" noRot="1" noChangeAspect="1"/>
+          </p:cNvSpPr>
+          <p:nvPr>
+            <p:ph type="sldImg" idx="2"/>
+          </p:nvPr>
+        </p:nvSpPr>
+        <p:spPr>
+          <a:xfrm>
+            <a:off x="685800" y="1143000"/>
+            <a:ext cx="5486400" cy="3086100"/>
+          </a:xfrm>
+          <a:custGeom>
+            <a:avLst/>
+            <a:gdLst/>
+            <a:ahLst/>
+            <a:cxnLst/>
+            <a:rect l="l" t="t" r="r" b="b"/>
+            <a:pathLst>
+              <a:path w="120000" h="120000" extrusionOk="0">
+                <a:moveTo>
+                  <a:pt x="0" y="0"/>
+                </a:moveTo>
+                <a:lnTo>
+                  <a:pt x="120000" y="0"/>
+                </a:lnTo>
+                <a:lnTo>
+                  <a:pt x="120000" y="120000"/>
+                </a:lnTo>
+                <a:lnTo>
+                  <a:pt x="0" y="120000"/>
+                </a:lnTo>
+                <a:close/>
+              </a:path>
+            </a:pathLst>
+          </a:custGeom>
+        </p:spPr>
+      </p:sp>
+    </p:spTree>
+    <p:extLst>
+      <p:ext uri="{BB962C8B-B14F-4D97-AF65-F5344CB8AC3E}">
+        <p14:creationId xmlns:p14="http://schemas.microsoft.com/office/powerpoint/2010/main" val="1149753895"/>
       </p:ext>
     </p:extLst>
   </p:cSld>
@@ -9945,7 +10165,7 @@
                 <a:cs typeface="Arial"/>
                 <a:sym typeface="Arial"/>
               </a:rPr>
-              <a:t>07 Octubre de 2023</a:t>
+              <a:t>Octubre de 2023</a:t>
             </a:r>
             <a:br>
               <a:rPr lang="es-MX" sz="3200" b="1" dirty="0">
@@ -10205,7 +10425,7 @@
         <p:spPr>
           <a:xfrm>
             <a:off x="1401233" y="1204539"/>
-            <a:ext cx="9389533" cy="2011680"/>
+            <a:ext cx="5913967" cy="2011680"/>
           </a:xfrm>
           <a:prstGeom prst="rect">
             <a:avLst/>
@@ -10578,6 +10798,36 @@
           </a:p>
         </p:txBody>
       </p:sp>
+      <p:pic>
+        <p:nvPicPr>
+          <p:cNvPr id="6" name="Imagen 5">
+            <a:extLst>
+              <a:ext uri="{FF2B5EF4-FFF2-40B4-BE49-F238E27FC236}">
+                <a16:creationId xmlns:a16="http://schemas.microsoft.com/office/drawing/2014/main" id="{49EE6C3A-2E3F-AA82-82FC-DA709AD35095}"/>
+              </a:ext>
+            </a:extLst>
+          </p:cNvPr>
+          <p:cNvPicPr>
+            <a:picLocks noChangeAspect="1"/>
+          </p:cNvPicPr>
+          <p:nvPr/>
+        </p:nvPicPr>
+        <p:blipFill>
+          <a:blip r:embed="rId8"/>
+          <a:stretch>
+            <a:fillRect/>
+          </a:stretch>
+        </p:blipFill>
+        <p:spPr>
+          <a:xfrm>
+            <a:off x="8188169" y="1161617"/>
+            <a:ext cx="3273132" cy="2161502"/>
+          </a:xfrm>
+          <a:prstGeom prst="rect">
+            <a:avLst/>
+          </a:prstGeom>
+        </p:spPr>
+      </p:pic>
     </p:spTree>
     <p:extLst>
       <p:ext uri="{BB962C8B-B14F-4D97-AF65-F5344CB8AC3E}">
@@ -16260,8 +16510,8 @@
         </p:blipFill>
         <p:spPr>
           <a:xfrm>
-            <a:off x="1052892" y="1179059"/>
-            <a:ext cx="9401159" cy="2092591"/>
+            <a:off x="612157" y="1382845"/>
+            <a:ext cx="6849768" cy="1818699"/>
           </a:xfrm>
           <a:prstGeom prst="rect">
             <a:avLst/>
@@ -16382,6 +16632,36 @@
           <a:xfrm>
             <a:off x="2990437" y="3952183"/>
             <a:ext cx="2620645" cy="1825755"/>
+          </a:xfrm>
+          <a:prstGeom prst="rect">
+            <a:avLst/>
+          </a:prstGeom>
+        </p:spPr>
+      </p:pic>
+      <p:pic>
+        <p:nvPicPr>
+          <p:cNvPr id="4" name="Imagen 3">
+            <a:extLst>
+              <a:ext uri="{FF2B5EF4-FFF2-40B4-BE49-F238E27FC236}">
+                <a16:creationId xmlns:a16="http://schemas.microsoft.com/office/drawing/2014/main" id="{E90722C6-835C-BD1C-8764-428695374923}"/>
+              </a:ext>
+            </a:extLst>
+          </p:cNvPr>
+          <p:cNvPicPr>
+            <a:picLocks noChangeAspect="1"/>
+          </p:cNvPicPr>
+          <p:nvPr/>
+        </p:nvPicPr>
+        <p:blipFill>
+          <a:blip r:embed="rId8"/>
+          <a:stretch>
+            <a:fillRect/>
+          </a:stretch>
+        </p:blipFill>
+        <p:spPr>
+          <a:xfrm>
+            <a:off x="7920566" y="1009151"/>
+            <a:ext cx="3458634" cy="2284002"/>
           </a:xfrm>
           <a:prstGeom prst="rect">
             <a:avLst/>
@@ -16522,14 +16802,14 @@
           <p:nvPr>
             <p:extLst>
               <p:ext uri="{D42A27DB-BD31-4B8C-83A1-F6EECF244321}">
-                <p14:modId xmlns:p14="http://schemas.microsoft.com/office/powerpoint/2010/main" val="1704252369"/>
+                <p14:modId xmlns:p14="http://schemas.microsoft.com/office/powerpoint/2010/main" val="836106669"/>
               </p:ext>
             </p:extLst>
           </p:nvPr>
         </p:nvGraphicFramePr>
         <p:xfrm>
           <a:off x="331892" y="1157968"/>
-          <a:ext cx="11349550" cy="2753360"/>
+          <a:ext cx="11216641" cy="2636520"/>
         </p:xfrm>
         <a:graphic>
           <a:graphicData uri="http://schemas.openxmlformats.org/drawingml/2006/table">
@@ -16538,52 +16818,45 @@
                 <a:tableStyleId>{5C22544A-7EE6-4342-B048-85BDC9FD1C3A}</a:tableStyleId>
               </a:tblPr>
               <a:tblGrid>
-                <a:gridCol w="1804733">
+                <a:gridCol w="2249633">
                   <a:extLst>
                     <a:ext uri="{9D8B030D-6E8A-4147-A177-3AD203B41FA5}">
                       <a16:colId xmlns:a16="http://schemas.microsoft.com/office/drawing/2014/main" val="896100951"/>
                     </a:ext>
                   </a:extLst>
                 </a:gridCol>
-                <a:gridCol w="1804733">
+                <a:gridCol w="2249633">
                   <a:extLst>
                     <a:ext uri="{9D8B030D-6E8A-4147-A177-3AD203B41FA5}">
                       <a16:colId xmlns:a16="http://schemas.microsoft.com/office/drawing/2014/main" val="1128444383"/>
                     </a:ext>
                   </a:extLst>
                 </a:gridCol>
-                <a:gridCol w="2097069">
+                <a:gridCol w="2614035">
                   <a:extLst>
                     <a:ext uri="{9D8B030D-6E8A-4147-A177-3AD203B41FA5}">
                       <a16:colId xmlns:a16="http://schemas.microsoft.com/office/drawing/2014/main" val="3823021968"/>
                     </a:ext>
                   </a:extLst>
                 </a:gridCol>
-                <a:gridCol w="1097280">
+                <a:gridCol w="1367780">
                   <a:extLst>
                     <a:ext uri="{9D8B030D-6E8A-4147-A177-3AD203B41FA5}">
                       <a16:colId xmlns:a16="http://schemas.microsoft.com/office/drawing/2014/main" val="938150115"/>
                     </a:ext>
                   </a:extLst>
                 </a:gridCol>
-                <a:gridCol w="1097280">
+                <a:gridCol w="1367780">
                   <a:extLst>
                     <a:ext uri="{9D8B030D-6E8A-4147-A177-3AD203B41FA5}">
                       <a16:colId xmlns:a16="http://schemas.microsoft.com/office/drawing/2014/main" val="4020079597"/>
                     </a:ext>
                   </a:extLst>
                 </a:gridCol>
-                <a:gridCol w="1097280">
+                <a:gridCol w="1367780">
                   <a:extLst>
                     <a:ext uri="{9D8B030D-6E8A-4147-A177-3AD203B41FA5}">
                       <a16:colId xmlns:a16="http://schemas.microsoft.com/office/drawing/2014/main" val="1155112631"/>
-                    </a:ext>
-                  </a:extLst>
-                </a:gridCol>
-                <a:gridCol w="2351175">
-                  <a:extLst>
-                    <a:ext uri="{9D8B030D-6E8A-4147-A177-3AD203B41FA5}">
-                      <a16:colId xmlns:a16="http://schemas.microsoft.com/office/drawing/2014/main" val="725785473"/>
                     </a:ext>
                   </a:extLst>
                 </a:gridCol>
@@ -16732,33 +17005,6 @@
                       <a:r>
                         <a:rPr lang="es-ES" dirty="0"/>
                         <a:t>AIC</a:t>
-                      </a:r>
-                      <a:endParaRPr lang="es-MX" dirty="0"/>
-                    </a:p>
-                  </a:txBody>
-                  <a:tcPr>
-                    <a:lnB w="6350" cap="flat" cmpd="sng" algn="ctr">
-                      <a:solidFill>
-                        <a:schemeClr val="tx1"/>
-                      </a:solidFill>
-                      <a:prstDash val="solid"/>
-                      <a:round/>
-                      <a:headEnd type="none" w="med" len="med"/>
-                      <a:tailEnd type="none" w="med" len="med"/>
-                    </a:lnB>
-                    <a:solidFill>
-                      <a:srgbClr val="FF9900"/>
-                    </a:solidFill>
-                  </a:tcPr>
-                </a:tc>
-                <a:tc>
-                  <a:txBody>
-                    <a:bodyPr/>
-                    <a:lstStyle/>
-                    <a:p>
-                      <a:r>
-                        <a:rPr lang="es-ES" dirty="0"/>
-                        <a:t>Comentario</a:t>
                       </a:r>
                       <a:endParaRPr lang="es-MX" dirty="0"/>
                     </a:p>
@@ -17073,75 +17319,6 @@
                         <a:rPr lang="es-ES" sz="1300" dirty="0"/>
                         <a:t>2227</a:t>
                       </a:r>
-                      <a:endParaRPr lang="es-MX" sz="1300" dirty="0"/>
-                    </a:p>
-                  </a:txBody>
-                  <a:tcPr>
-                    <a:lnL w="6350" cap="flat" cmpd="sng" algn="ctr">
-                      <a:solidFill>
-                        <a:schemeClr val="tx1"/>
-                      </a:solidFill>
-                      <a:prstDash val="solid"/>
-                      <a:round/>
-                      <a:headEnd type="none" w="med" len="med"/>
-                      <a:tailEnd type="none" w="med" len="med"/>
-                    </a:lnL>
-                    <a:lnR w="6350" cap="flat" cmpd="sng" algn="ctr">
-                      <a:solidFill>
-                        <a:schemeClr val="tx1"/>
-                      </a:solidFill>
-                      <a:prstDash val="solid"/>
-                      <a:round/>
-                      <a:headEnd type="none" w="med" len="med"/>
-                      <a:tailEnd type="none" w="med" len="med"/>
-                    </a:lnR>
-                    <a:lnT w="6350" cap="flat" cmpd="sng" algn="ctr">
-                      <a:solidFill>
-                        <a:schemeClr val="tx1"/>
-                      </a:solidFill>
-                      <a:prstDash val="solid"/>
-                      <a:round/>
-                      <a:headEnd type="none" w="med" len="med"/>
-                      <a:tailEnd type="none" w="med" len="med"/>
-                    </a:lnT>
-                    <a:lnB w="6350" cap="flat" cmpd="sng" algn="ctr">
-                      <a:solidFill>
-                        <a:schemeClr val="tx1"/>
-                      </a:solidFill>
-                      <a:prstDash val="solid"/>
-                      <a:round/>
-                      <a:headEnd type="none" w="med" len="med"/>
-                      <a:tailEnd type="none" w="med" len="med"/>
-                    </a:lnB>
-                    <a:solidFill>
-                      <a:srgbClr val="FFFFCC"/>
-                    </a:solidFill>
-                  </a:tcPr>
-                </a:tc>
-                <a:tc>
-                  <a:txBody>
-                    <a:bodyPr/>
-                    <a:lstStyle/>
-                    <a:p>
-                      <a:pPr marL="0" marR="0" lvl="0" indent="0" algn="l" defTabSz="914400" rtl="0" eaLnBrk="1" fontAlgn="auto" latinLnBrk="0" hangingPunct="1">
-                        <a:lnSpc>
-                          <a:spcPct val="100000"/>
-                        </a:lnSpc>
-                        <a:spcBef>
-                          <a:spcPts val="0"/>
-                        </a:spcBef>
-                        <a:spcAft>
-                          <a:spcPts val="0"/>
-                        </a:spcAft>
-                        <a:buClr>
-                          <a:srgbClr val="000000"/>
-                        </a:buClr>
-                        <a:buSzTx/>
-                        <a:buFont typeface="Arial"/>
-                        <a:buNone/>
-                        <a:tabLst/>
-                        <a:defRPr/>
-                      </a:pPr>
                       <a:endParaRPr lang="es-MX" sz="1300" dirty="0"/>
                     </a:p>
                   </a:txBody>
@@ -17492,58 +17669,6 @@
                         <a:rPr lang="es-ES" sz="1300" dirty="0"/>
                         <a:t>2226</a:t>
                       </a:r>
-                      <a:endParaRPr lang="es-MX" sz="1300" dirty="0"/>
-                    </a:p>
-                  </a:txBody>
-                  <a:tcPr>
-                    <a:lnL w="6350" cap="flat" cmpd="sng" algn="ctr">
-                      <a:solidFill>
-                        <a:schemeClr val="tx1"/>
-                      </a:solidFill>
-                      <a:prstDash val="solid"/>
-                      <a:round/>
-                      <a:headEnd type="none" w="med" len="med"/>
-                      <a:tailEnd type="none" w="med" len="med"/>
-                    </a:lnL>
-                    <a:lnR w="6350" cap="flat" cmpd="sng" algn="ctr">
-                      <a:solidFill>
-                        <a:schemeClr val="tx1"/>
-                      </a:solidFill>
-                      <a:prstDash val="solid"/>
-                      <a:round/>
-                      <a:headEnd type="none" w="med" len="med"/>
-                      <a:tailEnd type="none" w="med" len="med"/>
-                    </a:lnR>
-                    <a:lnT w="6350" cap="flat" cmpd="sng" algn="ctr">
-                      <a:solidFill>
-                        <a:schemeClr val="tx1"/>
-                      </a:solidFill>
-                      <a:prstDash val="solid"/>
-                      <a:round/>
-                      <a:headEnd type="none" w="med" len="med"/>
-                      <a:tailEnd type="none" w="med" len="med"/>
-                    </a:lnT>
-                    <a:lnB w="6350" cap="flat" cmpd="sng" algn="ctr">
-                      <a:solidFill>
-                        <a:schemeClr val="tx1"/>
-                      </a:solidFill>
-                      <a:prstDash val="solid"/>
-                      <a:round/>
-                      <a:headEnd type="none" w="med" len="med"/>
-                      <a:tailEnd type="none" w="med" len="med"/>
-                    </a:lnB>
-                    <a:solidFill>
-                      <a:schemeClr val="bg1">
-                        <a:lumMod val="85000"/>
-                      </a:schemeClr>
-                    </a:solidFill>
-                  </a:tcPr>
-                </a:tc>
-                <a:tc>
-                  <a:txBody>
-                    <a:bodyPr/>
-                    <a:lstStyle/>
-                    <a:p>
                       <a:endParaRPr lang="es-MX" sz="1300" dirty="0"/>
                     </a:p>
                   </a:txBody>
@@ -17956,58 +18081,6 @@
                     </a:solidFill>
                   </a:tcPr>
                 </a:tc>
-                <a:tc>
-                  <a:txBody>
-                    <a:bodyPr/>
-                    <a:lstStyle/>
-                    <a:p>
-                      <a:endParaRPr lang="es-MX" dirty="0"/>
-                    </a:p>
-                  </a:txBody>
-                  <a:tcPr>
-                    <a:lnL w="6350" cap="flat" cmpd="sng" algn="ctr">
-                      <a:solidFill>
-                        <a:schemeClr val="tx1"/>
-                      </a:solidFill>
-                      <a:prstDash val="solid"/>
-                      <a:round/>
-                      <a:headEnd type="none" w="med" len="med"/>
-                      <a:tailEnd type="none" w="med" len="med"/>
-                    </a:lnL>
-                    <a:lnR w="6350" cap="flat" cmpd="sng" algn="ctr">
-                      <a:solidFill>
-                        <a:schemeClr val="tx1"/>
-                      </a:solidFill>
-                      <a:prstDash val="solid"/>
-                      <a:round/>
-                      <a:headEnd type="none" w="med" len="med"/>
-                      <a:tailEnd type="none" w="med" len="med"/>
-                    </a:lnR>
-                    <a:lnT w="6350" cap="flat" cmpd="sng" algn="ctr">
-                      <a:solidFill>
-                        <a:schemeClr val="tx1"/>
-                      </a:solidFill>
-                      <a:prstDash val="solid"/>
-                      <a:round/>
-                      <a:headEnd type="none" w="med" len="med"/>
-                      <a:tailEnd type="none" w="med" len="med"/>
-                    </a:lnT>
-                    <a:lnB w="6350" cap="flat" cmpd="sng" algn="ctr">
-                      <a:solidFill>
-                        <a:schemeClr val="tx1"/>
-                      </a:solidFill>
-                      <a:prstDash val="solid"/>
-                      <a:round/>
-                      <a:headEnd type="none" w="med" len="med"/>
-                      <a:tailEnd type="none" w="med" len="med"/>
-                    </a:lnB>
-                    <a:solidFill>
-                      <a:schemeClr val="bg1">
-                        <a:lumMod val="85000"/>
-                      </a:schemeClr>
-                    </a:solidFill>
-                  </a:tcPr>
-                </a:tc>
                 <a:extLst>
                   <a:ext uri="{0D108BD9-81ED-4DB2-BD59-A6C34878D82A}">
                     <a16:rowId xmlns:a16="http://schemas.microsoft.com/office/drawing/2014/main" val="649816840"/>
@@ -18304,75 +18377,6 @@
                         <a:t>2226</a:t>
                       </a:r>
                       <a:endParaRPr lang="es-MX" sz="1300" dirty="0"/>
-                    </a:p>
-                  </a:txBody>
-                  <a:tcPr>
-                    <a:lnL w="6350" cap="flat" cmpd="sng" algn="ctr">
-                      <a:solidFill>
-                        <a:schemeClr val="tx1"/>
-                      </a:solidFill>
-                      <a:prstDash val="solid"/>
-                      <a:round/>
-                      <a:headEnd type="none" w="med" len="med"/>
-                      <a:tailEnd type="none" w="med" len="med"/>
-                    </a:lnL>
-                    <a:lnR w="6350" cap="flat" cmpd="sng" algn="ctr">
-                      <a:solidFill>
-                        <a:schemeClr val="tx1"/>
-                      </a:solidFill>
-                      <a:prstDash val="solid"/>
-                      <a:round/>
-                      <a:headEnd type="none" w="med" len="med"/>
-                      <a:tailEnd type="none" w="med" len="med"/>
-                    </a:lnR>
-                    <a:lnT w="6350" cap="flat" cmpd="sng" algn="ctr">
-                      <a:solidFill>
-                        <a:schemeClr val="tx1"/>
-                      </a:solidFill>
-                      <a:prstDash val="solid"/>
-                      <a:round/>
-                      <a:headEnd type="none" w="med" len="med"/>
-                      <a:tailEnd type="none" w="med" len="med"/>
-                    </a:lnT>
-                    <a:lnB w="6350" cap="flat" cmpd="sng" algn="ctr">
-                      <a:solidFill>
-                        <a:schemeClr val="tx1"/>
-                      </a:solidFill>
-                      <a:prstDash val="solid"/>
-                      <a:round/>
-                      <a:headEnd type="none" w="med" len="med"/>
-                      <a:tailEnd type="none" w="med" len="med"/>
-                    </a:lnB>
-                    <a:solidFill>
-                      <a:srgbClr val="D9D9D9"/>
-                    </a:solidFill>
-                  </a:tcPr>
-                </a:tc>
-                <a:tc>
-                  <a:txBody>
-                    <a:bodyPr/>
-                    <a:lstStyle/>
-                    <a:p>
-                      <a:pPr marL="0" marR="0" lvl="0" indent="0" algn="l" defTabSz="914400" rtl="0" eaLnBrk="1" fontAlgn="auto" latinLnBrk="0" hangingPunct="1">
-                        <a:lnSpc>
-                          <a:spcPct val="100000"/>
-                        </a:lnSpc>
-                        <a:spcBef>
-                          <a:spcPts val="0"/>
-                        </a:spcBef>
-                        <a:spcAft>
-                          <a:spcPts val="0"/>
-                        </a:spcAft>
-                        <a:buClr>
-                          <a:srgbClr val="000000"/>
-                        </a:buClr>
-                        <a:buSzTx/>
-                        <a:buFont typeface="Arial"/>
-                        <a:buNone/>
-                        <a:tabLst/>
-                        <a:defRPr/>
-                      </a:pPr>
-                      <a:endParaRPr lang="es-MX" sz="1400" dirty="0"/>
                     </a:p>
                   </a:txBody>
                   <a:tcPr>
@@ -18736,77 +18740,6 @@
                         <a:t>2179</a:t>
                       </a:r>
                       <a:endParaRPr lang="es-MX" sz="1300" dirty="0"/>
-                    </a:p>
-                  </a:txBody>
-                  <a:tcPr>
-                    <a:lnL w="6350" cap="flat" cmpd="sng" algn="ctr">
-                      <a:solidFill>
-                        <a:schemeClr val="tx1"/>
-                      </a:solidFill>
-                      <a:prstDash val="solid"/>
-                      <a:round/>
-                      <a:headEnd type="none" w="med" len="med"/>
-                      <a:tailEnd type="none" w="med" len="med"/>
-                    </a:lnL>
-                    <a:lnR w="6350" cap="flat" cmpd="sng" algn="ctr">
-                      <a:solidFill>
-                        <a:schemeClr val="tx1"/>
-                      </a:solidFill>
-                      <a:prstDash val="solid"/>
-                      <a:round/>
-                      <a:headEnd type="none" w="med" len="med"/>
-                      <a:tailEnd type="none" w="med" len="med"/>
-                    </a:lnR>
-                    <a:lnT w="6350" cap="flat" cmpd="sng" algn="ctr">
-                      <a:solidFill>
-                        <a:schemeClr val="tx1"/>
-                      </a:solidFill>
-                      <a:prstDash val="solid"/>
-                      <a:round/>
-                      <a:headEnd type="none" w="med" len="med"/>
-                      <a:tailEnd type="none" w="med" len="med"/>
-                    </a:lnT>
-                    <a:lnB w="6350" cap="flat" cmpd="sng" algn="ctr">
-                      <a:solidFill>
-                        <a:schemeClr val="tx1"/>
-                      </a:solidFill>
-                      <a:prstDash val="solid"/>
-                      <a:round/>
-                      <a:headEnd type="none" w="med" len="med"/>
-                      <a:tailEnd type="none" w="med" len="med"/>
-                    </a:lnB>
-                    <a:solidFill>
-                      <a:schemeClr val="bg1">
-                        <a:lumMod val="85000"/>
-                      </a:schemeClr>
-                    </a:solidFill>
-                  </a:tcPr>
-                </a:tc>
-                <a:tc>
-                  <a:txBody>
-                    <a:bodyPr/>
-                    <a:lstStyle/>
-                    <a:p>
-                      <a:pPr marL="0" marR="0" lvl="0" indent="0" algn="l" defTabSz="914400" rtl="0" eaLnBrk="1" fontAlgn="auto" latinLnBrk="0" hangingPunct="1">
-                        <a:lnSpc>
-                          <a:spcPct val="100000"/>
-                        </a:lnSpc>
-                        <a:spcBef>
-                          <a:spcPts val="0"/>
-                        </a:spcBef>
-                        <a:spcAft>
-                          <a:spcPts val="0"/>
-                        </a:spcAft>
-                        <a:buClr>
-                          <a:srgbClr val="000000"/>
-                        </a:buClr>
-                        <a:buSzTx/>
-                        <a:buFont typeface="Arial"/>
-                        <a:buNone/>
-                        <a:tabLst/>
-                        <a:defRPr/>
-                      </a:pPr>
-                      <a:endParaRPr lang="es-MX" sz="1400" dirty="0"/>
                     </a:p>
                   </a:txBody>
                   <a:tcPr>
@@ -21987,7 +21920,7 @@
         <p:spPr>
           <a:xfrm>
             <a:off x="1286932" y="1269441"/>
-            <a:ext cx="10261601" cy="4278094"/>
+            <a:ext cx="10261601" cy="4524315"/>
           </a:xfrm>
           <a:prstGeom prst="rect">
             <a:avLst/>
@@ -22022,7 +21955,61 @@
               <a:rPr lang="es-MX" sz="1600" b="1" dirty="0">
                 <a:latin typeface="Calibri" panose="020F0502020204030204" pitchFamily="34" charset="0"/>
               </a:rPr>
-              <a:t>cambios de tendencia repentinos muy marcados.</a:t>
+              <a:t>cambios de tendencia repentinos muy marcados. </a:t>
+            </a:r>
+            <a:r>
+              <a:rPr lang="es-MX" sz="1600" dirty="0">
+                <a:latin typeface="Calibri" panose="020F0502020204030204" pitchFamily="34" charset="0"/>
+              </a:rPr>
+              <a:t>Ambos tipos de modelos tienen en general un </a:t>
+            </a:r>
+            <a:r>
+              <a:rPr lang="es-MX" sz="1600" b="1" dirty="0">
+                <a:latin typeface="Calibri" panose="020F0502020204030204" pitchFamily="34" charset="0"/>
+              </a:rPr>
+              <a:t>mejor </a:t>
+            </a:r>
+            <a:r>
+              <a:rPr lang="es-MX" sz="1600" b="1" dirty="0" err="1">
+                <a:latin typeface="Calibri" panose="020F0502020204030204" pitchFamily="34" charset="0"/>
+              </a:rPr>
+              <a:t>perfomance</a:t>
+            </a:r>
+            <a:r>
+              <a:rPr lang="es-MX" sz="1600" b="1" dirty="0">
+                <a:latin typeface="Calibri" panose="020F0502020204030204" pitchFamily="34" charset="0"/>
+              </a:rPr>
+              <a:t> </a:t>
+            </a:r>
+            <a:r>
+              <a:rPr lang="es-MX" sz="1600" dirty="0">
+                <a:latin typeface="Calibri" panose="020F0502020204030204" pitchFamily="34" charset="0"/>
+              </a:rPr>
+              <a:t>en término de error </a:t>
+            </a:r>
+            <a:r>
+              <a:rPr lang="es-MX" sz="1600" b="1" dirty="0">
+                <a:latin typeface="Calibri" panose="020F0502020204030204" pitchFamily="34" charset="0"/>
+              </a:rPr>
+              <a:t>si se </a:t>
+            </a:r>
+            <a:r>
+              <a:rPr lang="es-MX" sz="1600" b="1" dirty="0" err="1">
+                <a:latin typeface="Calibri" panose="020F0502020204030204" pitchFamily="34" charset="0"/>
+              </a:rPr>
+              <a:t>pre-tratan</a:t>
+            </a:r>
+            <a:r>
+              <a:rPr lang="es-MX" sz="1600" b="1" dirty="0">
+                <a:latin typeface="Calibri" panose="020F0502020204030204" pitchFamily="34" charset="0"/>
+              </a:rPr>
+              <a:t> los datos </a:t>
+            </a:r>
+            <a:r>
+              <a:rPr lang="es-MX" sz="1600" dirty="0">
+                <a:latin typeface="Calibri" panose="020F0502020204030204" pitchFamily="34" charset="0"/>
+              </a:rPr>
+              <a:t>de la serie de entrenamiento </a:t>
             </a:r>
           </a:p>
           <a:p>
@@ -22045,7 +22032,19 @@
               <a:rPr lang="es-MX" sz="1600" dirty="0">
                 <a:latin typeface="Calibri" panose="020F0502020204030204" pitchFamily="34" charset="0"/>
               </a:rPr>
-              <a:t>Los modelos de series de tiempo son </a:t>
+              <a:t>Los modelos de </a:t>
+            </a:r>
+            <a:r>
+              <a:rPr lang="es-MX" sz="1600" b="1" dirty="0">
+                <a:latin typeface="Calibri" panose="020F0502020204030204" pitchFamily="34" charset="0"/>
+              </a:rPr>
+              <a:t>series de tiempo </a:t>
+            </a:r>
+            <a:r>
+              <a:rPr lang="es-MX" sz="1600" dirty="0">
+                <a:latin typeface="Calibri" panose="020F0502020204030204" pitchFamily="34" charset="0"/>
+              </a:rPr>
+              <a:t>son </a:t>
             </a:r>
             <a:r>
               <a:rPr lang="es-MX" sz="1600" b="1" dirty="0">
@@ -22090,7 +22089,19 @@
               <a:rPr lang="es-MX" sz="1600" dirty="0">
                 <a:latin typeface="Calibri" panose="020F0502020204030204" pitchFamily="34" charset="0"/>
               </a:rPr>
-              <a:t>Los modelos de LSTM </a:t>
+              <a:t>Los modelos de </a:t>
+            </a:r>
+            <a:r>
+              <a:rPr lang="es-MX" sz="1600" b="1" dirty="0">
+                <a:latin typeface="Calibri" panose="020F0502020204030204" pitchFamily="34" charset="0"/>
+              </a:rPr>
+              <a:t>LSTM</a:t>
+            </a:r>
+            <a:r>
+              <a:rPr lang="es-MX" sz="1600" dirty="0">
+                <a:latin typeface="Calibri" panose="020F0502020204030204" pitchFamily="34" charset="0"/>
+              </a:rPr>
+              <a:t> </a:t>
             </a:r>
             <a:r>
               <a:rPr lang="es-MX" sz="1600" b="1" dirty="0">
@@ -22372,8 +22383,356 @@
 </p:sld>
 </file>
 
+<file path=ppt/slides/slide18.xml><?xml version="1.0" encoding="utf-8"?>
+<p:sld xmlns:a="http://schemas.openxmlformats.org/drawingml/2006/main" xmlns:r="http://schemas.openxmlformats.org/officeDocument/2006/relationships" xmlns:p="http://schemas.openxmlformats.org/presentationml/2006/main">
+  <p:cSld>
+    <p:spTree>
+      <p:nvGrpSpPr>
+        <p:cNvPr id="1" name="Shape 110"/>
+        <p:cNvGrpSpPr/>
+        <p:nvPr/>
+      </p:nvGrpSpPr>
+      <p:grpSpPr>
+        <a:xfrm>
+          <a:off x="0" y="0"/>
+          <a:ext cx="0" cy="0"/>
+          <a:chOff x="0" y="0"/>
+          <a:chExt cx="0" cy="0"/>
+        </a:xfrm>
+      </p:grpSpPr>
+      <p:sp>
+        <p:nvSpPr>
+          <p:cNvPr id="111" name="Google Shape;111;p4"/>
+          <p:cNvSpPr txBox="1"/>
+          <p:nvPr/>
+        </p:nvSpPr>
+        <p:spPr>
+          <a:xfrm>
+            <a:off x="510558" y="196996"/>
+            <a:ext cx="11658658" cy="1007542"/>
+          </a:xfrm>
+          <a:prstGeom prst="rect">
+            <a:avLst/>
+          </a:prstGeom>
+          <a:noFill/>
+          <a:ln>
+            <a:noFill/>
+          </a:ln>
+        </p:spPr>
+        <p:txBody>
+          <a:bodyPr spcFirstLastPara="1" wrap="square" lIns="91425" tIns="45700" rIns="91425" bIns="45700" anchor="t" anchorCtr="0">
+            <a:noAutofit/>
+          </a:bodyPr>
+          <a:lstStyle/>
+          <a:p>
+            <a:pPr lvl="1">
+              <a:lnSpc>
+                <a:spcPct val="85000"/>
+              </a:lnSpc>
+              <a:buClr>
+                <a:schemeClr val="accent1"/>
+              </a:buClr>
+              <a:buSzPts val="3200"/>
+            </a:pPr>
+            <a:r>
+              <a:rPr lang="es-ES" sz="3200" b="1" dirty="0">
+                <a:solidFill>
+                  <a:schemeClr val="accent1"/>
+                </a:solidFill>
+                <a:latin typeface="Calibri"/>
+                <a:ea typeface="Calibri"/>
+                <a:cs typeface="Calibri"/>
+                <a:sym typeface="Calibri"/>
+              </a:rPr>
+              <a:t>Siguientes pasos </a:t>
+            </a:r>
+            <a:endParaRPr sz="3200" b="1" dirty="0">
+              <a:solidFill>
+                <a:schemeClr val="accent1"/>
+              </a:solidFill>
+              <a:latin typeface="Calibri"/>
+              <a:ea typeface="Calibri"/>
+              <a:cs typeface="Calibri"/>
+              <a:sym typeface="Calibri"/>
+            </a:endParaRPr>
+          </a:p>
+        </p:txBody>
+      </p:sp>
+      <p:sp>
+        <p:nvSpPr>
+          <p:cNvPr id="4" name="CuadroTexto 3">
+            <a:extLst>
+              <a:ext uri="{FF2B5EF4-FFF2-40B4-BE49-F238E27FC236}">
+                <a16:creationId xmlns:a16="http://schemas.microsoft.com/office/drawing/2014/main" id="{ECAB82E2-D770-9359-87FF-FC648CC6339F}"/>
+              </a:ext>
+            </a:extLst>
+          </p:cNvPr>
+          <p:cNvSpPr txBox="1"/>
+          <p:nvPr/>
+        </p:nvSpPr>
+        <p:spPr>
+          <a:xfrm>
+            <a:off x="1286932" y="1269441"/>
+            <a:ext cx="10261601" cy="4216539"/>
+          </a:xfrm>
+          <a:prstGeom prst="rect">
+            <a:avLst/>
+          </a:prstGeom>
+          <a:noFill/>
+        </p:spPr>
+        <p:txBody>
+          <a:bodyPr wrap="square">
+            <a:spAutoFit/>
+          </a:bodyPr>
+          <a:lstStyle/>
+          <a:p>
+            <a:pPr marL="285750" indent="-285750">
+              <a:buFont typeface="Wingdings" panose="05000000000000000000" pitchFamily="2" charset="2"/>
+              <a:buChar char="ü"/>
+            </a:pPr>
+            <a:r>
+              <a:rPr lang="es-MX" sz="2000" dirty="0">
+                <a:latin typeface="Calibri" panose="020F0502020204030204" pitchFamily="34" charset="0"/>
+              </a:rPr>
+              <a:t>Probar más combinaciones de número de neuronas y pretratamiento de datos (</a:t>
+            </a:r>
+            <a:r>
+              <a:rPr lang="es-MX" sz="2000" dirty="0" err="1">
+                <a:latin typeface="Calibri" panose="020F0502020204030204" pitchFamily="34" charset="0"/>
+              </a:rPr>
+              <a:t>e.g</a:t>
+            </a:r>
+            <a:r>
+              <a:rPr lang="es-MX" sz="2000" dirty="0">
+                <a:latin typeface="Calibri" panose="020F0502020204030204" pitchFamily="34" charset="0"/>
+              </a:rPr>
+              <a:t>. estandarizar y no normalizar) evaluando la posible mejora en el error de pronóstico</a:t>
+            </a:r>
+          </a:p>
+          <a:p>
+            <a:pPr marL="285750" indent="-285750">
+              <a:buFont typeface="Wingdings" panose="05000000000000000000" pitchFamily="2" charset="2"/>
+              <a:buChar char="ü"/>
+            </a:pPr>
+            <a:endParaRPr lang="es-MX" sz="2000" dirty="0">
+              <a:latin typeface="Calibri" panose="020F0502020204030204" pitchFamily="34" charset="0"/>
+            </a:endParaRPr>
+          </a:p>
+          <a:p>
+            <a:pPr marL="285750" indent="-285750">
+              <a:buFont typeface="Wingdings" panose="05000000000000000000" pitchFamily="2" charset="2"/>
+              <a:buChar char="ü"/>
+            </a:pPr>
+            <a:endParaRPr lang="es-MX" sz="2000" dirty="0">
+              <a:latin typeface="Calibri" panose="020F0502020204030204" pitchFamily="34" charset="0"/>
+            </a:endParaRPr>
+          </a:p>
+          <a:p>
+            <a:pPr marL="285750" indent="-285750">
+              <a:buFont typeface="Wingdings" panose="05000000000000000000" pitchFamily="2" charset="2"/>
+              <a:buChar char="ü"/>
+            </a:pPr>
+            <a:r>
+              <a:rPr lang="es-MX" sz="2000" dirty="0">
+                <a:latin typeface="Calibri" panose="020F0502020204030204" pitchFamily="34" charset="0"/>
+              </a:rPr>
+              <a:t>Probar otras arquitecturas de redes(</a:t>
+            </a:r>
+            <a:r>
+              <a:rPr lang="es-MX" sz="2000" dirty="0" err="1">
+                <a:latin typeface="Calibri" panose="020F0502020204030204" pitchFamily="34" charset="0"/>
+              </a:rPr>
+              <a:t>e.g</a:t>
+            </a:r>
+            <a:r>
+              <a:rPr lang="es-MX" sz="2000" dirty="0">
+                <a:latin typeface="Calibri" panose="020F0502020204030204" pitchFamily="34" charset="0"/>
+              </a:rPr>
+              <a:t>. GRU o FFNN) evaluando la posible mejora en el error de pronóstico</a:t>
+            </a:r>
+          </a:p>
+          <a:p>
+            <a:endParaRPr lang="es-MX" sz="2000" dirty="0">
+              <a:latin typeface="Calibri" panose="020F0502020204030204" pitchFamily="34" charset="0"/>
+            </a:endParaRPr>
+          </a:p>
+          <a:p>
+            <a:pPr marL="285750" indent="-285750">
+              <a:buFont typeface="Wingdings" panose="05000000000000000000" pitchFamily="2" charset="2"/>
+              <a:buChar char="ü"/>
+            </a:pPr>
+            <a:endParaRPr lang="es-MX" sz="2000" dirty="0">
+              <a:latin typeface="Calibri" panose="020F0502020204030204" pitchFamily="34" charset="0"/>
+            </a:endParaRPr>
+          </a:p>
+          <a:p>
+            <a:pPr marL="285750" indent="-285750">
+              <a:buFont typeface="Wingdings" panose="05000000000000000000" pitchFamily="2" charset="2"/>
+              <a:buChar char="ü"/>
+            </a:pPr>
+            <a:r>
+              <a:rPr lang="es-MX" sz="2000" dirty="0">
+                <a:latin typeface="Calibri" panose="020F0502020204030204" pitchFamily="34" charset="0"/>
+              </a:rPr>
+              <a:t>Generar una herramienta (</a:t>
+            </a:r>
+            <a:r>
+              <a:rPr lang="es-MX" sz="2000" dirty="0" err="1">
+                <a:latin typeface="Calibri" panose="020F0502020204030204" pitchFamily="34" charset="0"/>
+              </a:rPr>
+              <a:t>e.g</a:t>
+            </a:r>
+            <a:r>
+              <a:rPr lang="es-MX" sz="2000" dirty="0">
+                <a:latin typeface="Calibri" panose="020F0502020204030204" pitchFamily="34" charset="0"/>
+              </a:rPr>
+              <a:t>. Streamlit) que permita al usuario cargar un </a:t>
+            </a:r>
+            <a:r>
+              <a:rPr lang="es-MX" sz="2000" dirty="0" err="1">
+                <a:latin typeface="Calibri" panose="020F0502020204030204" pitchFamily="34" charset="0"/>
+              </a:rPr>
+              <a:t>csv</a:t>
+            </a:r>
+            <a:r>
+              <a:rPr lang="es-MX" sz="2000" dirty="0">
+                <a:latin typeface="Calibri" panose="020F0502020204030204" pitchFamily="34" charset="0"/>
+              </a:rPr>
+              <a:t> con n datos históricos y poder hacer </a:t>
+            </a:r>
+            <a:r>
+              <a:rPr lang="es-MX" sz="2000" dirty="0" err="1">
+                <a:latin typeface="Calibri" panose="020F0502020204030204" pitchFamily="34" charset="0"/>
+              </a:rPr>
+              <a:t>forecast</a:t>
+            </a:r>
+            <a:r>
+              <a:rPr lang="es-MX" sz="2000" dirty="0">
+                <a:latin typeface="Calibri" panose="020F0502020204030204" pitchFamily="34" charset="0"/>
+              </a:rPr>
+              <a:t> de los siguiente X meses a manera de apoyo continuo y dinámico en la toma de decisiones </a:t>
+            </a:r>
+          </a:p>
+          <a:p>
+            <a:endParaRPr lang="es-MX" sz="1600" dirty="0">
+              <a:latin typeface="Calibri" panose="020F0502020204030204" pitchFamily="34" charset="0"/>
+            </a:endParaRPr>
+          </a:p>
+          <a:p>
+            <a:endParaRPr lang="es-MX" sz="1600" dirty="0">
+              <a:latin typeface="Calibri" panose="020F0502020204030204" pitchFamily="34" charset="0"/>
+            </a:endParaRPr>
+          </a:p>
+          <a:p>
+            <a:endParaRPr lang="es-MX" sz="1600" dirty="0">
+              <a:latin typeface="Calibri" panose="020F0502020204030204" pitchFamily="34" charset="0"/>
+            </a:endParaRPr>
+          </a:p>
+        </p:txBody>
+      </p:sp>
+    </p:spTree>
+    <p:extLst>
+      <p:ext uri="{BB962C8B-B14F-4D97-AF65-F5344CB8AC3E}">
+        <p14:creationId xmlns:p14="http://schemas.microsoft.com/office/powerpoint/2010/main" val="4259764361"/>
+      </p:ext>
+    </p:extLst>
+  </p:cSld>
+  <p:clrMapOvr>
+    <a:masterClrMapping/>
+  </p:clrMapOvr>
+</p:sld>
+</file>
+
+<file path=ppt/slides/slide19.xml><?xml version="1.0" encoding="utf-8"?>
+<p:sld xmlns:a="http://schemas.openxmlformats.org/drawingml/2006/main" xmlns:r="http://schemas.openxmlformats.org/officeDocument/2006/relationships" xmlns:p="http://schemas.openxmlformats.org/presentationml/2006/main">
+  <p:cSld>
+    <p:spTree>
+      <p:nvGrpSpPr>
+        <p:cNvPr id="1" name="Shape 110"/>
+        <p:cNvGrpSpPr/>
+        <p:nvPr/>
+      </p:nvGrpSpPr>
+      <p:grpSpPr>
+        <a:xfrm>
+          <a:off x="0" y="0"/>
+          <a:ext cx="0" cy="0"/>
+          <a:chOff x="0" y="0"/>
+          <a:chExt cx="0" cy="0"/>
+        </a:xfrm>
+      </p:grpSpPr>
+      <p:sp>
+        <p:nvSpPr>
+          <p:cNvPr id="111" name="Google Shape;111;p4"/>
+          <p:cNvSpPr txBox="1"/>
+          <p:nvPr/>
+        </p:nvSpPr>
+        <p:spPr>
+          <a:xfrm>
+            <a:off x="3657600" y="2899829"/>
+            <a:ext cx="5675971" cy="503771"/>
+          </a:xfrm>
+          <a:prstGeom prst="rect">
+            <a:avLst/>
+          </a:prstGeom>
+          <a:noFill/>
+          <a:ln>
+            <a:noFill/>
+          </a:ln>
+        </p:spPr>
+        <p:txBody>
+          <a:bodyPr spcFirstLastPara="1" wrap="square" lIns="91425" tIns="45700" rIns="91425" bIns="45700" anchor="t" anchorCtr="0">
+            <a:noAutofit/>
+          </a:bodyPr>
+          <a:lstStyle/>
+          <a:p>
+            <a:pPr lvl="1">
+              <a:lnSpc>
+                <a:spcPct val="85000"/>
+              </a:lnSpc>
+              <a:buClr>
+                <a:schemeClr val="accent1"/>
+              </a:buClr>
+              <a:buSzPts val="3200"/>
+            </a:pPr>
+            <a:r>
+              <a:rPr lang="es-ES" sz="3200" b="1" dirty="0">
+                <a:solidFill>
+                  <a:schemeClr val="accent1"/>
+                </a:solidFill>
+                <a:latin typeface="Calibri"/>
+                <a:ea typeface="Calibri"/>
+                <a:cs typeface="Calibri"/>
+                <a:sym typeface="Calibri"/>
+              </a:rPr>
+              <a:t>GRACIAS POR SU ATENCIÓN!!!</a:t>
+            </a:r>
+            <a:endParaRPr sz="3200" b="1" dirty="0">
+              <a:solidFill>
+                <a:schemeClr val="accent1"/>
+              </a:solidFill>
+              <a:latin typeface="Calibri"/>
+              <a:ea typeface="Calibri"/>
+              <a:cs typeface="Calibri"/>
+              <a:sym typeface="Calibri"/>
+            </a:endParaRPr>
+          </a:p>
+        </p:txBody>
+      </p:sp>
+    </p:spTree>
+    <p:extLst>
+      <p:ext uri="{BB962C8B-B14F-4D97-AF65-F5344CB8AC3E}">
+        <p14:creationId xmlns:p14="http://schemas.microsoft.com/office/powerpoint/2010/main" val="225128318"/>
+      </p:ext>
+    </p:extLst>
+  </p:cSld>
+  <p:clrMapOvr>
+    <a:masterClrMapping/>
+  </p:clrMapOvr>
+</p:sld>
+</file>
+
 <file path=ppt/slides/slide2.xml><?xml version="1.0" encoding="utf-8"?>
-<p:sld xmlns:a="http://schemas.openxmlformats.org/drawingml/2006/main" xmlns:r="http://schemas.openxmlformats.org/officeDocument/2006/relationships" xmlns:p="http://schemas.openxmlformats.org/presentationml/2006/main">
+<p:sld xmlns:a="http://schemas.openxmlformats.org/drawingml/2006/main" xmlns:r="http://schemas.openxmlformats.org/officeDocument/2006/relationships" xmlns:p="http://schemas.openxmlformats.org/presentationml/2006/main" show="0">
   <p:cSld>
     <p:spTree>
       <p:nvGrpSpPr>
@@ -23063,23 +23422,8 @@
                 <a:cs typeface="Calibri"/>
                 <a:sym typeface="Calibri"/>
               </a:rPr>
-              <a:t>Título propuesto</a:t>
+              <a:t>Título del proyecto </a:t>
             </a:r>
-            <a:endParaRPr dirty="0"/>
-          </a:p>
-          <a:p>
-            <a:pPr marL="0" marR="0" lvl="0" indent="0" algn="l" rtl="0">
-              <a:lnSpc>
-                <a:spcPct val="90000"/>
-              </a:lnSpc>
-              <a:spcBef>
-                <a:spcPts val="600"/>
-              </a:spcBef>
-              <a:spcAft>
-                <a:spcPts val="0"/>
-              </a:spcAft>
-              <a:buNone/>
-            </a:pPr>
             <a:endParaRPr sz="2800" b="1" dirty="0">
               <a:solidFill>
                 <a:srgbClr val="3F3F3F"/>
@@ -23113,7 +23457,7 @@
                 <a:cs typeface="Calibri Light" panose="020F0302020204030204" pitchFamily="34" charset="0"/>
                 <a:sym typeface="Calibri"/>
               </a:rPr>
-              <a:t>Aplicación de modelos de Aprendizaje supervisado (series de tiempo) y Redes Neuronales para pronóstico de demanda de gas natural en México</a:t>
+              <a:t>Aplicación de modelos de Aprendizaje supervisado (series de tiempo) y Redes Neuronales (LSTM) para pronóstico de demanda de gas natural en México</a:t>
             </a:r>
             <a:endParaRPr sz="3200" dirty="0">
               <a:solidFill>
@@ -30824,7 +31168,7 @@
                 <a:cs typeface="Calibri"/>
                 <a:sym typeface="Calibri"/>
               </a:rPr>
-              <a:t>Métodos y Modelos: Pronóstico con modelos de Redes Neuronales NN (FFNN, LSTM)</a:t>
+              <a:t>Métodos y Modelos: Pronóstico con modelos de Redes Neuronales NN (LSTM)</a:t>
             </a:r>
             <a:endParaRPr sz="3200" b="1" dirty="0">
               <a:solidFill>
@@ -30921,7 +31265,7 @@
         <p:spPr>
           <a:xfrm>
             <a:off x="4372325" y="1460023"/>
-            <a:ext cx="4618304" cy="575542"/>
+            <a:ext cx="4618304" cy="332399"/>
           </a:xfrm>
           <a:prstGeom prst="rect">
             <a:avLst/>
@@ -30954,67 +31298,6 @@
               </a:rPr>
               <a:t>Verificación colinealidad y correlación de las variables independientes </a:t>
             </a:r>
-            <a:r>
-              <a:rPr lang="es-MX" sz="1200" dirty="0">
-                <a:solidFill>
-                  <a:schemeClr val="tx1"/>
-                </a:solidFill>
-                <a:latin typeface="Calibri Light" panose="020F0302020204030204" pitchFamily="34" charset="0"/>
-                <a:ea typeface="Calibri"/>
-                <a:cs typeface="Calibri Light" panose="020F0302020204030204" pitchFamily="34" charset="0"/>
-                <a:sym typeface="Calibri"/>
-              </a:rPr>
-              <a:t>(PIB</a:t>
-            </a:r>
-            <a:r>
-              <a:rPr lang="es-MX" sz="1200" dirty="0">
-                <a:solidFill>
-                  <a:schemeClr val="tx1"/>
-                </a:solidFill>
-                <a:latin typeface="Calibri Light" panose="020F0302020204030204" pitchFamily="34" charset="0"/>
-                <a:cs typeface="Calibri Light" panose="020F0302020204030204" pitchFamily="34" charset="0"/>
-              </a:rPr>
-              <a:t>, población, y cambio peso-dólar, </a:t>
-            </a:r>
-            <a:r>
-              <a:rPr lang="es-MX" sz="1200" dirty="0" err="1">
-                <a:solidFill>
-                  <a:schemeClr val="tx1"/>
-                </a:solidFill>
-                <a:latin typeface="Calibri Light" panose="020F0302020204030204" pitchFamily="34" charset="0"/>
-                <a:cs typeface="Calibri Light" panose="020F0302020204030204" pitchFamily="34" charset="0"/>
-              </a:rPr>
-              <a:t>etc</a:t>
-            </a:r>
-            <a:r>
-              <a:rPr lang="es-MX" sz="1200" dirty="0">
-                <a:solidFill>
-                  <a:schemeClr val="tx1"/>
-                </a:solidFill>
-                <a:latin typeface="Calibri Light" panose="020F0302020204030204" pitchFamily="34" charset="0"/>
-                <a:cs typeface="Calibri Light" panose="020F0302020204030204" pitchFamily="34" charset="0"/>
-              </a:rPr>
-              <a:t>) </a:t>
-            </a:r>
-            <a:endParaRPr lang="es-MX" sz="1200" b="1" dirty="0">
-              <a:solidFill>
-                <a:schemeClr val="tx1"/>
-              </a:solidFill>
-              <a:latin typeface="Calibri Light" panose="020F0302020204030204" pitchFamily="34" charset="0"/>
-              <a:ea typeface="Calibri"/>
-              <a:cs typeface="Calibri Light" panose="020F0302020204030204" pitchFamily="34" charset="0"/>
-              <a:sym typeface="Calibri"/>
-            </a:endParaRPr>
-          </a:p>
-          <a:p>
-            <a:pPr>
-              <a:lnSpc>
-                <a:spcPct val="90000"/>
-              </a:lnSpc>
-              <a:spcBef>
-                <a:spcPts val="600"/>
-              </a:spcBef>
-            </a:pPr>
             <a:r>
               <a:rPr lang="es-MX" sz="1200" dirty="0">
                 <a:solidFill>

</xml_diff>